<commit_message>
adding Image Source file
</commit_message>
<xml_diff>
--- a/input/images/Source/Risk Adjustment Images.pptx
+++ b/input/images/Source/Risk Adjustment Images.pptx
@@ -6,12 +6,13 @@
     <p:sldMasterId id="2147483660" r:id="rId2"/>
   </p:sldMasterIdLst>
   <p:notesMasterIdLst>
-    <p:notesMasterId r:id="rId6"/>
+    <p:notesMasterId r:id="rId7"/>
   </p:notesMasterIdLst>
   <p:sldIdLst>
     <p:sldId id="256" r:id="rId3"/>
     <p:sldId id="267" r:id="rId4"/>
     <p:sldId id="268" r:id="rId5"/>
+    <p:sldId id="269" r:id="rId6"/>
   </p:sldIdLst>
   <p:sldSz cx="12192000" cy="6858000"/>
   <p:notesSz cx="6858000" cy="9144000"/>
@@ -110,6 +111,11 @@
       </a:defRPr>
     </a:lvl9pPr>
   </p:defaultTextStyle>
+  <p:extLst>
+    <p:ext uri="{EFAFB233-063F-42B5-8137-9DF3F51BA10A}">
+      <p15:sldGuideLst xmlns:p15="http://schemas.microsoft.com/office/powerpoint/2012/main"/>
+    </p:ext>
+  </p:extLst>
 </p:presentation>
 </file>
 
@@ -1812,7 +1818,7 @@
           <a:p>
             <a:fld id="{23F303CC-BC6F-44EE-9A09-81F690F71D2E}" type="datetime1">
               <a:rPr lang="en-US" altLang="en-US" smtClean="0"/>
-              <a:t>8/16/2021</a:t>
+              <a:t>8/19/2021</a:t>
             </a:fld>
             <a:endParaRPr lang="en-US" altLang="en-US" dirty="0"/>
           </a:p>
@@ -9123,7 +9129,7 @@
           <a:p>
             <a:fld id="{7CE3BD8C-C39F-4FFF-9CD5-05E4806DBFF3}" type="datetime1">
               <a:rPr lang="en-US" altLang="en-US" smtClean="0"/>
-              <a:t>8/16/2021</a:t>
+              <a:t>8/19/2021</a:t>
             </a:fld>
             <a:endParaRPr lang="en-US" altLang="en-US"/>
           </a:p>
@@ -11586,6 +11592,154 @@
     <p:extLst>
       <p:ext uri="{BB962C8B-B14F-4D97-AF65-F5344CB8AC3E}">
         <p14:creationId xmlns:p14="http://schemas.microsoft.com/office/powerpoint/2010/main" val="2056869718"/>
+      </p:ext>
+    </p:extLst>
+  </p:cSld>
+  <p:clrMapOvr>
+    <a:masterClrMapping/>
+  </p:clrMapOvr>
+</p:sld>
+</file>
+
+<file path=ppt/slides/slide4.xml><?xml version="1.0" encoding="utf-8"?>
+<p:sld xmlns:a="http://schemas.openxmlformats.org/drawingml/2006/main" xmlns:r="http://schemas.openxmlformats.org/officeDocument/2006/relationships" xmlns:p="http://schemas.openxmlformats.org/presentationml/2006/main">
+  <p:cSld>
+    <p:spTree>
+      <p:nvGrpSpPr>
+        <p:cNvPr id="1" name=""/>
+        <p:cNvGrpSpPr/>
+        <p:nvPr/>
+      </p:nvGrpSpPr>
+      <p:grpSpPr>
+        <a:xfrm>
+          <a:off x="0" y="0"/>
+          <a:ext cx="0" cy="0"/>
+          <a:chOff x="0" y="0"/>
+          <a:chExt cx="0" cy="0"/>
+        </a:xfrm>
+      </p:grpSpPr>
+      <p:sp>
+        <p:nvSpPr>
+          <p:cNvPr id="2" name="Title 1">
+            <a:extLst>
+              <a:ext uri="{FF2B5EF4-FFF2-40B4-BE49-F238E27FC236}">
+                <a16:creationId xmlns:a16="http://schemas.microsoft.com/office/drawing/2014/main" id="{CA312D2E-9348-4F8D-937D-6AA79DDE4A3B}"/>
+              </a:ext>
+            </a:extLst>
+          </p:cNvPr>
+          <p:cNvSpPr>
+            <a:spLocks noGrp="1"/>
+          </p:cNvSpPr>
+          <p:nvPr>
+            <p:ph type="title"/>
+          </p:nvPr>
+        </p:nvSpPr>
+        <p:spPr/>
+        <p:txBody>
+          <a:bodyPr/>
+          <a:lstStyle/>
+          <a:p>
+            <a:r>
+              <a:rPr lang="en-US" dirty="0"/>
+              <a:t>Resource Diagram</a:t>
+            </a:r>
+          </a:p>
+        </p:txBody>
+      </p:sp>
+      <p:sp>
+        <p:nvSpPr>
+          <p:cNvPr id="3" name="Text Placeholder 2">
+            <a:extLst>
+              <a:ext uri="{FF2B5EF4-FFF2-40B4-BE49-F238E27FC236}">
+                <a16:creationId xmlns:a16="http://schemas.microsoft.com/office/drawing/2014/main" id="{BB3CD43F-8553-40B1-9050-7F83A248717D}"/>
+              </a:ext>
+            </a:extLst>
+          </p:cNvPr>
+          <p:cNvSpPr>
+            <a:spLocks noGrp="1"/>
+          </p:cNvSpPr>
+          <p:nvPr>
+            <p:ph type="body" sz="quarter" idx="13"/>
+          </p:nvPr>
+        </p:nvSpPr>
+        <p:spPr/>
+        <p:txBody>
+          <a:bodyPr/>
+          <a:lstStyle/>
+          <a:p>
+            <a:endParaRPr lang="en-US"/>
+          </a:p>
+        </p:txBody>
+      </p:sp>
+      <p:sp>
+        <p:nvSpPr>
+          <p:cNvPr id="4" name="Footer Placeholder 3">
+            <a:extLst>
+              <a:ext uri="{FF2B5EF4-FFF2-40B4-BE49-F238E27FC236}">
+                <a16:creationId xmlns:a16="http://schemas.microsoft.com/office/drawing/2014/main" id="{398C3AFC-73DA-4BEE-9920-A96CBA4DB9DA}"/>
+              </a:ext>
+            </a:extLst>
+          </p:cNvPr>
+          <p:cNvSpPr>
+            <a:spLocks noGrp="1"/>
+          </p:cNvSpPr>
+          <p:nvPr>
+            <p:ph type="ftr" sz="quarter" idx="10"/>
+          </p:nvPr>
+        </p:nvSpPr>
+        <p:spPr/>
+        <p:txBody>
+          <a:bodyPr/>
+          <a:lstStyle/>
+          <a:p>
+            <a:r>
+              <a:rPr lang="en-US" b="1"/>
+              <a:t>© 2019 Health Level Seven ® International. Licensed under Creative Commons Attribution 4.0 International</a:t>
+            </a:r>
+          </a:p>
+          <a:p>
+            <a:r>
+              <a:rPr lang="en-US" b="1"/>
+              <a:t>HL7, Health Level Seven, FHIR and the FHIR flame logo are registered trademarks of Health Level Seven International. Reg. U.S. TM Office.</a:t>
+            </a:r>
+            <a:endParaRPr lang="en-US" b="1" dirty="0"/>
+          </a:p>
+        </p:txBody>
+      </p:sp>
+      <p:sp>
+        <p:nvSpPr>
+          <p:cNvPr id="5" name="Slide Number Placeholder 4">
+            <a:extLst>
+              <a:ext uri="{FF2B5EF4-FFF2-40B4-BE49-F238E27FC236}">
+                <a16:creationId xmlns:a16="http://schemas.microsoft.com/office/drawing/2014/main" id="{46F8B53C-135E-405E-BA3A-8FEF468B0C17}"/>
+              </a:ext>
+            </a:extLst>
+          </p:cNvPr>
+          <p:cNvSpPr>
+            <a:spLocks noGrp="1"/>
+          </p:cNvSpPr>
+          <p:nvPr>
+            <p:ph type="sldNum" sz="quarter" idx="11"/>
+          </p:nvPr>
+        </p:nvSpPr>
+        <p:spPr/>
+        <p:txBody>
+          <a:bodyPr/>
+          <a:lstStyle/>
+          <a:p>
+            <a:fld id="{6CACE926-AEF5-4BFE-8BD7-24414108CB7B}" type="slidenum">
+              <a:rPr lang="en-US" altLang="en-US" smtClean="0"/>
+              <a:pPr/>
+              <a:t>4</a:t>
+            </a:fld>
+            <a:endParaRPr lang="en-US" altLang="en-US" dirty="0"/>
+          </a:p>
+        </p:txBody>
+      </p:sp>
+    </p:spTree>
+    <p:extLst>
+      <p:ext uri="{BB962C8B-B14F-4D97-AF65-F5344CB8AC3E}">
+        <p14:creationId xmlns:p14="http://schemas.microsoft.com/office/powerpoint/2010/main" val="3236408681"/>
       </p:ext>
     </p:extLst>
   </p:cSld>

</xml_diff>

<commit_message>
Updates to Guidance including images and image source
</commit_message>
<xml_diff>
--- a/input/images/Source/Risk Adjustment Images.pptx
+++ b/input/images/Source/Risk Adjustment Images.pptx
@@ -6,14 +6,15 @@
     <p:sldMasterId id="2147483660" r:id="rId2"/>
   </p:sldMasterIdLst>
   <p:notesMasterIdLst>
-    <p:notesMasterId r:id="rId8"/>
+    <p:notesMasterId r:id="rId9"/>
   </p:notesMasterIdLst>
   <p:sldIdLst>
     <p:sldId id="256" r:id="rId3"/>
     <p:sldId id="267" r:id="rId4"/>
     <p:sldId id="268" r:id="rId5"/>
     <p:sldId id="269" r:id="rId6"/>
-    <p:sldId id="270" r:id="rId7"/>
+    <p:sldId id="2966" r:id="rId7"/>
+    <p:sldId id="270" r:id="rId8"/>
   </p:sldIdLst>
   <p:sldSz cx="12192000" cy="6858000"/>
   <p:notesSz cx="6858000" cy="9144000"/>
@@ -11252,7 +11253,10 @@
             <a:pPr marL="0" indent="0">
               <a:buNone/>
             </a:pPr>
-            <a:endParaRPr lang="en-US" dirty="0"/>
+            <a:r>
+              <a:rPr lang="en-US" dirty="0"/>
+              <a:t> </a:t>
+            </a:r>
           </a:p>
         </p:txBody>
       </p:sp>
@@ -11385,7 +11389,7 @@
         </p:blipFill>
         <p:spPr>
           <a:xfrm>
-            <a:off x="4445355" y="2979090"/>
+            <a:off x="3683355" y="3080690"/>
             <a:ext cx="814124" cy="899821"/>
           </a:xfrm>
           <a:prstGeom prst="rect">
@@ -11407,7 +11411,7 @@
         </p:nvSpPr>
         <p:spPr>
           <a:xfrm>
-            <a:off x="7185595" y="2182145"/>
+            <a:off x="8282875" y="3157505"/>
             <a:ext cx="1259821" cy="707694"/>
           </a:xfrm>
           <a:prstGeom prst="rect">
@@ -11457,7 +11461,7 @@
         </p:nvSpPr>
         <p:spPr>
           <a:xfrm>
-            <a:off x="3782252" y="2416348"/>
+            <a:off x="2136332" y="3442508"/>
             <a:ext cx="2115679" cy="297454"/>
           </a:xfrm>
           <a:prstGeom prst="rect">
@@ -11497,10 +11501,10 @@
       </p:sp>
       <p:sp>
         <p:nvSpPr>
-          <p:cNvPr id="11" name="Arrow: Right 10">
-            <a:extLst>
-              <a:ext uri="{FF2B5EF4-FFF2-40B4-BE49-F238E27FC236}">
-                <a16:creationId xmlns:a16="http://schemas.microsoft.com/office/drawing/2014/main" id="{4435FF3E-23CA-4C74-B11B-A2260403BF70}"/>
+          <p:cNvPr id="8" name="Arrow: U-Turn 7">
+            <a:extLst>
+              <a:ext uri="{FF2B5EF4-FFF2-40B4-BE49-F238E27FC236}">
+                <a16:creationId xmlns:a16="http://schemas.microsoft.com/office/drawing/2014/main" id="{BBA494F5-C840-4276-B567-19F510FB3BE8}"/>
               </a:ext>
             </a:extLst>
           </p:cNvPr>
@@ -11508,11 +11512,11 @@
           <p:nvPr/>
         </p:nvSpPr>
         <p:spPr>
-          <a:xfrm>
-            <a:off x="5539666" y="3426781"/>
-            <a:ext cx="1775534" cy="674703"/>
-          </a:xfrm>
-          <a:prstGeom prst="rightArrow">
+          <a:xfrm flipH="1">
+            <a:off x="3931920" y="2326640"/>
+            <a:ext cx="3911600" cy="426720"/>
+          </a:xfrm>
+          <a:prstGeom prst="uturnArrow">
             <a:avLst/>
           </a:prstGeom>
         </p:spPr>
@@ -11535,19 +11539,20 @@
           <a:lstStyle/>
           <a:p>
             <a:pPr algn="ctr"/>
-            <a:r>
-              <a:rPr lang="en-US" sz="1200" dirty="0"/>
-              <a:t>Risk Adjustment Bundle</a:t>
-            </a:r>
-          </a:p>
-        </p:txBody>
-      </p:sp>
-      <p:sp>
-        <p:nvSpPr>
-          <p:cNvPr id="12" name="Arrow: Left 11">
-            <a:extLst>
-              <a:ext uri="{FF2B5EF4-FFF2-40B4-BE49-F238E27FC236}">
-                <a16:creationId xmlns:a16="http://schemas.microsoft.com/office/drawing/2014/main" id="{8DBA6246-9EC4-4965-9A61-20688F61A89F}"/>
+            <a:endParaRPr lang="en-US">
+              <a:solidFill>
+                <a:schemeClr val="tx1"/>
+              </a:solidFill>
+            </a:endParaRPr>
+          </a:p>
+        </p:txBody>
+      </p:sp>
+      <p:sp>
+        <p:nvSpPr>
+          <p:cNvPr id="13" name="Arrow: U-Turn 12">
+            <a:extLst>
+              <a:ext uri="{FF2B5EF4-FFF2-40B4-BE49-F238E27FC236}">
+                <a16:creationId xmlns:a16="http://schemas.microsoft.com/office/drawing/2014/main" id="{174416F3-D18D-44B8-B799-1F518BBC5027}"/>
               </a:ext>
             </a:extLst>
           </p:cNvPr>
@@ -11555,11 +11560,11 @@
           <p:nvPr/>
         </p:nvSpPr>
         <p:spPr>
-          <a:xfrm>
-            <a:off x="5495278" y="2885241"/>
-            <a:ext cx="1828800" cy="585927"/>
-          </a:xfrm>
-          <a:prstGeom prst="leftArrow">
+          <a:xfrm flipV="1">
+            <a:off x="4013200" y="4104640"/>
+            <a:ext cx="3870960" cy="497840"/>
+          </a:xfrm>
+          <a:prstGeom prst="uturnArrow">
             <a:avLst/>
           </a:prstGeom>
         </p:spPr>
@@ -11582,9 +11587,118 @@
           <a:lstStyle/>
           <a:p>
             <a:pPr algn="ctr"/>
-            <a:r>
-              <a:rPr lang="en-US" sz="1400" dirty="0"/>
+            <a:endParaRPr lang="en-US">
+              <a:solidFill>
+                <a:schemeClr val="tx1"/>
+              </a:solidFill>
+            </a:endParaRPr>
+          </a:p>
+        </p:txBody>
+      </p:sp>
+      <p:sp>
+        <p:nvSpPr>
+          <p:cNvPr id="14" name="Rectangle 13">
+            <a:extLst>
+              <a:ext uri="{FF2B5EF4-FFF2-40B4-BE49-F238E27FC236}">
+                <a16:creationId xmlns:a16="http://schemas.microsoft.com/office/drawing/2014/main" id="{330FFA72-BBBD-4DBC-800E-90E49E5C0B79}"/>
+              </a:ext>
+            </a:extLst>
+          </p:cNvPr>
+          <p:cNvSpPr/>
+          <p:nvPr/>
+        </p:nvSpPr>
+        <p:spPr>
+          <a:xfrm>
+            <a:off x="4998720" y="2225040"/>
+            <a:ext cx="1778000" cy="335280"/>
+          </a:xfrm>
+          <a:prstGeom prst="rect">
+            <a:avLst/>
+          </a:prstGeom>
+          <a:solidFill>
+            <a:schemeClr val="bg1"/>
+          </a:solidFill>
+        </p:spPr>
+        <p:style>
+          <a:lnRef idx="1">
+            <a:schemeClr val="accent1"/>
+          </a:lnRef>
+          <a:fillRef idx="3">
+            <a:schemeClr val="accent1"/>
+          </a:fillRef>
+          <a:effectRef idx="2">
+            <a:schemeClr val="accent1"/>
+          </a:effectRef>
+          <a:fontRef idx="minor">
+            <a:schemeClr val="lt1"/>
+          </a:fontRef>
+        </p:style>
+        <p:txBody>
+          <a:bodyPr rtlCol="0" anchor="ctr"/>
+          <a:lstStyle/>
+          <a:p>
+            <a:pPr algn="ctr"/>
+            <a:r>
+              <a:rPr lang="en-US" dirty="0">
+                <a:solidFill>
+                  <a:schemeClr val="tx1"/>
+                </a:solidFill>
+              </a:rPr>
               <a:t>$report</a:t>
+            </a:r>
+          </a:p>
+        </p:txBody>
+      </p:sp>
+      <p:sp>
+        <p:nvSpPr>
+          <p:cNvPr id="16" name="Rectangle 15">
+            <a:extLst>
+              <a:ext uri="{FF2B5EF4-FFF2-40B4-BE49-F238E27FC236}">
+                <a16:creationId xmlns:a16="http://schemas.microsoft.com/office/drawing/2014/main" id="{6908AAC3-35FE-4372-8B8E-78FD5F752EEB}"/>
+              </a:ext>
+            </a:extLst>
+          </p:cNvPr>
+          <p:cNvSpPr/>
+          <p:nvPr/>
+        </p:nvSpPr>
+        <p:spPr>
+          <a:xfrm>
+            <a:off x="5029200" y="4297680"/>
+            <a:ext cx="1778000" cy="396240"/>
+          </a:xfrm>
+          <a:prstGeom prst="rect">
+            <a:avLst/>
+          </a:prstGeom>
+          <a:solidFill>
+            <a:schemeClr val="bg1"/>
+          </a:solidFill>
+        </p:spPr>
+        <p:style>
+          <a:lnRef idx="1">
+            <a:schemeClr val="accent1"/>
+          </a:lnRef>
+          <a:fillRef idx="3">
+            <a:schemeClr val="accent1"/>
+          </a:fillRef>
+          <a:effectRef idx="2">
+            <a:schemeClr val="accent1"/>
+          </a:effectRef>
+          <a:fontRef idx="minor">
+            <a:schemeClr val="lt1"/>
+          </a:fontRef>
+        </p:style>
+        <p:txBody>
+          <a:bodyPr rtlCol="0" anchor="ctr"/>
+          <a:lstStyle/>
+          <a:p>
+            <a:pPr algn="ctr"/>
+            <a:r>
+              <a:rPr lang="en-US" sz="1400" dirty="0">
+                <a:solidFill>
+                  <a:schemeClr val="tx1"/>
+                </a:solidFill>
+              </a:rPr>
+              <a:t>Risk Adjustment Care Gap Reports</a:t>
             </a:r>
           </a:p>
         </p:txBody>
@@ -11772,6 +11886,211 @@
           <p:cNvPr id="2" name="Title 1">
             <a:extLst>
               <a:ext uri="{FF2B5EF4-FFF2-40B4-BE49-F238E27FC236}">
+                <a16:creationId xmlns:a16="http://schemas.microsoft.com/office/drawing/2014/main" id="{D839B762-5734-44CA-BA78-76FD98019C0D}"/>
+              </a:ext>
+            </a:extLst>
+          </p:cNvPr>
+          <p:cNvSpPr>
+            <a:spLocks noGrp="1"/>
+          </p:cNvSpPr>
+          <p:nvPr>
+            <p:ph type="title"/>
+          </p:nvPr>
+        </p:nvSpPr>
+        <p:spPr/>
+        <p:txBody>
+          <a:bodyPr/>
+          <a:lstStyle/>
+          <a:p>
+            <a:r>
+              <a:rPr lang="en-US" dirty="0"/>
+              <a:t>Example Risk Adjustment Report</a:t>
+            </a:r>
+          </a:p>
+        </p:txBody>
+      </p:sp>
+      <p:sp>
+        <p:nvSpPr>
+          <p:cNvPr id="4" name="Footer Placeholder 3">
+            <a:extLst>
+              <a:ext uri="{FF2B5EF4-FFF2-40B4-BE49-F238E27FC236}">
+                <a16:creationId xmlns:a16="http://schemas.microsoft.com/office/drawing/2014/main" id="{C18F18B0-D93F-44AA-9787-691A06C0D216}"/>
+              </a:ext>
+            </a:extLst>
+          </p:cNvPr>
+          <p:cNvSpPr>
+            <a:spLocks noGrp="1"/>
+          </p:cNvSpPr>
+          <p:nvPr>
+            <p:ph type="ftr" sz="quarter" idx="10"/>
+          </p:nvPr>
+        </p:nvSpPr>
+        <p:spPr/>
+        <p:txBody>
+          <a:bodyPr/>
+          <a:lstStyle/>
+          <a:p>
+            <a:pPr defTabSz="609585" fontAlgn="base">
+              <a:spcBef>
+                <a:spcPct val="0"/>
+              </a:spcBef>
+              <a:spcAft>
+                <a:spcPct val="0"/>
+              </a:spcAft>
+            </a:pPr>
+            <a:r>
+              <a:rPr lang="en-US" b="1">
+                <a:latin typeface="Arial" panose="020B0604020202020204" pitchFamily="34" charset="0"/>
+                <a:ea typeface="ヒラギノ角ゴ Pro W3" pitchFamily="-126" charset="-128"/>
+              </a:rPr>
+              <a:t>© 2019 Health Level Seven ® International. Licensed under Creative Commons Attribution 4.0 International</a:t>
+            </a:r>
+          </a:p>
+          <a:p>
+            <a:pPr defTabSz="609585" fontAlgn="base">
+              <a:spcBef>
+                <a:spcPct val="0"/>
+              </a:spcBef>
+              <a:spcAft>
+                <a:spcPct val="0"/>
+              </a:spcAft>
+            </a:pPr>
+            <a:r>
+              <a:rPr lang="en-US" b="1">
+                <a:latin typeface="Arial" panose="020B0604020202020204" pitchFamily="34" charset="0"/>
+                <a:ea typeface="ヒラギノ角ゴ Pro W3" pitchFamily="-126" charset="-128"/>
+              </a:rPr>
+              <a:t>HL7, Health Level Seven, FHIR and the FHIR flame logo are registered trademarks of Health Level Seven International. Reg. U.S. TM Office.</a:t>
+            </a:r>
+            <a:endParaRPr lang="en-US" b="1" dirty="0">
+              <a:latin typeface="Arial" panose="020B0604020202020204" pitchFamily="34" charset="0"/>
+              <a:ea typeface="ヒラギノ角ゴ Pro W3" pitchFamily="-126" charset="-128"/>
+            </a:endParaRPr>
+          </a:p>
+        </p:txBody>
+      </p:sp>
+      <p:sp>
+        <p:nvSpPr>
+          <p:cNvPr id="5" name="Slide Number Placeholder 4">
+            <a:extLst>
+              <a:ext uri="{FF2B5EF4-FFF2-40B4-BE49-F238E27FC236}">
+                <a16:creationId xmlns:a16="http://schemas.microsoft.com/office/drawing/2014/main" id="{8536C7B4-DF79-45E4-A016-77A29D38BF35}"/>
+              </a:ext>
+            </a:extLst>
+          </p:cNvPr>
+          <p:cNvSpPr>
+            <a:spLocks noGrp="1"/>
+          </p:cNvSpPr>
+          <p:nvPr>
+            <p:ph type="sldNum" sz="quarter" idx="11"/>
+          </p:nvPr>
+        </p:nvSpPr>
+        <p:spPr/>
+        <p:txBody>
+          <a:bodyPr/>
+          <a:lstStyle/>
+          <a:p>
+            <a:pPr defTabSz="609585" fontAlgn="base">
+              <a:spcBef>
+                <a:spcPct val="0"/>
+              </a:spcBef>
+              <a:spcAft>
+                <a:spcPct val="0"/>
+              </a:spcAft>
+            </a:pPr>
+            <a:fld id="{6CACE926-AEF5-4BFE-8BD7-24414108CB7B}" type="slidenum">
+              <a:rPr lang="en-US" altLang="en-US">
+                <a:solidFill>
+                  <a:prstClr val="black"/>
+                </a:solidFill>
+                <a:latin typeface="Arial" panose="020B0604020202020204" pitchFamily="34" charset="0"/>
+                <a:ea typeface="ヒラギノ角ゴ Pro W3" pitchFamily="-126" charset="-128"/>
+              </a:rPr>
+              <a:pPr defTabSz="609585" fontAlgn="base">
+                <a:spcBef>
+                  <a:spcPct val="0"/>
+                </a:spcBef>
+                <a:spcAft>
+                  <a:spcPct val="0"/>
+                </a:spcAft>
+              </a:pPr>
+              <a:t>5</a:t>
+            </a:fld>
+            <a:endParaRPr lang="en-US" altLang="en-US" dirty="0">
+              <a:solidFill>
+                <a:prstClr val="black"/>
+              </a:solidFill>
+              <a:latin typeface="Arial" panose="020B0604020202020204" pitchFamily="34" charset="0"/>
+              <a:ea typeface="ヒラギノ角ゴ Pro W3" pitchFamily="-126" charset="-128"/>
+            </a:endParaRPr>
+          </a:p>
+        </p:txBody>
+      </p:sp>
+      <p:pic>
+        <p:nvPicPr>
+          <p:cNvPr id="7" name="Picture 6">
+            <a:extLst>
+              <a:ext uri="{FF2B5EF4-FFF2-40B4-BE49-F238E27FC236}">
+                <a16:creationId xmlns:a16="http://schemas.microsoft.com/office/drawing/2014/main" id="{0826DA6F-F2AB-4016-A214-D6219D201496}"/>
+              </a:ext>
+            </a:extLst>
+          </p:cNvPr>
+          <p:cNvPicPr>
+            <a:picLocks noChangeAspect="1"/>
+          </p:cNvPicPr>
+          <p:nvPr/>
+        </p:nvPicPr>
+        <p:blipFill>
+          <a:blip r:embed="rId2"/>
+          <a:stretch>
+            <a:fillRect/>
+          </a:stretch>
+        </p:blipFill>
+        <p:spPr>
+          <a:xfrm>
+            <a:off x="1743456" y="1258209"/>
+            <a:ext cx="7660640" cy="5130203"/>
+          </a:xfrm>
+          <a:prstGeom prst="rect">
+            <a:avLst/>
+          </a:prstGeom>
+        </p:spPr>
+      </p:pic>
+    </p:spTree>
+    <p:extLst>
+      <p:ext uri="{BB962C8B-B14F-4D97-AF65-F5344CB8AC3E}">
+        <p14:creationId xmlns:p14="http://schemas.microsoft.com/office/powerpoint/2010/main" val="498929417"/>
+      </p:ext>
+    </p:extLst>
+  </p:cSld>
+  <p:clrMapOvr>
+    <a:masterClrMapping/>
+  </p:clrMapOvr>
+</p:sld>
+</file>
+
+<file path=ppt/slides/slide6.xml><?xml version="1.0" encoding="utf-8"?>
+<p:sld xmlns:a="http://schemas.openxmlformats.org/drawingml/2006/main" xmlns:r="http://schemas.openxmlformats.org/officeDocument/2006/relationships" xmlns:p="http://schemas.openxmlformats.org/presentationml/2006/main">
+  <p:cSld>
+    <p:spTree>
+      <p:nvGrpSpPr>
+        <p:cNvPr id="1" name=""/>
+        <p:cNvGrpSpPr/>
+        <p:nvPr/>
+      </p:nvGrpSpPr>
+      <p:grpSpPr>
+        <a:xfrm>
+          <a:off x="0" y="0"/>
+          <a:ext cx="0" cy="0"/>
+          <a:chOff x="0" y="0"/>
+          <a:chExt cx="0" cy="0"/>
+        </a:xfrm>
+      </p:grpSpPr>
+      <p:sp>
+        <p:nvSpPr>
+          <p:cNvPr id="2" name="Title 1">
+            <a:extLst>
+              <a:ext uri="{FF2B5EF4-FFF2-40B4-BE49-F238E27FC236}">
                 <a16:creationId xmlns:a16="http://schemas.microsoft.com/office/drawing/2014/main" id="{4D7CB190-0D7D-494C-9311-B0617D77885B}"/>
               </a:ext>
             </a:extLst>
@@ -11879,7 +12198,7 @@
             <a:fld id="{6CACE926-AEF5-4BFE-8BD7-24414108CB7B}" type="slidenum">
               <a:rPr lang="en-US" altLang="en-US" smtClean="0"/>
               <a:pPr/>
-              <a:t>5</a:t>
+              <a:t>6</a:t>
             </a:fld>
             <a:endParaRPr lang="en-US" altLang="en-US" dirty="0"/>
           </a:p>

</xml_diff>

<commit_message>
Updates to Guidance pagecontent/guidance.md
</commit_message>
<xml_diff>
--- a/input/images/Source/Risk Adjustment Images.pptx
+++ b/input/images/Source/Risk Adjustment Images.pptx
@@ -207,7 +207,7 @@
           <a:p>
             <a:fld id="{4337D45E-38B5-4093-B633-D3DDCA61416C}" type="datetimeFigureOut">
               <a:rPr lang="en-US" smtClean="0"/>
-              <a:t>8/24/2021</a:t>
+              <a:t>8/26/2021</a:t>
             </a:fld>
             <a:endParaRPr lang="en-US"/>
           </a:p>
@@ -1127,7 +1127,7 @@
           <a:p>
             <a:fld id="{3E232C92-DF21-4A04-859B-AAF8BD4EC904}" type="datetimeFigureOut">
               <a:rPr lang="en-US" smtClean="0"/>
-              <a:t>8/24/2021</a:t>
+              <a:t>8/26/2021</a:t>
             </a:fld>
             <a:endParaRPr lang="en-US"/>
           </a:p>
@@ -1325,7 +1325,7 @@
           <a:p>
             <a:fld id="{3E232C92-DF21-4A04-859B-AAF8BD4EC904}" type="datetimeFigureOut">
               <a:rPr lang="en-US" smtClean="0"/>
-              <a:t>8/24/2021</a:t>
+              <a:t>8/26/2021</a:t>
             </a:fld>
             <a:endParaRPr lang="en-US"/>
           </a:p>
@@ -1533,7 +1533,7 @@
           <a:p>
             <a:fld id="{3E232C92-DF21-4A04-859B-AAF8BD4EC904}" type="datetimeFigureOut">
               <a:rPr lang="en-US" smtClean="0"/>
-              <a:t>8/24/2021</a:t>
+              <a:t>8/26/2021</a:t>
             </a:fld>
             <a:endParaRPr lang="en-US"/>
           </a:p>
@@ -2099,7 +2099,7 @@
           <a:p>
             <a:fld id="{23F303CC-BC6F-44EE-9A09-81F690F71D2E}" type="datetime1">
               <a:rPr lang="en-US" altLang="en-US" smtClean="0"/>
-              <a:t>8/24/2021</a:t>
+              <a:t>8/26/2021</a:t>
             </a:fld>
             <a:endParaRPr lang="en-US" altLang="en-US" dirty="0"/>
           </a:p>
@@ -6391,7 +6391,7 @@
           <a:p>
             <a:fld id="{3E232C92-DF21-4A04-859B-AAF8BD4EC904}" type="datetimeFigureOut">
               <a:rPr lang="en-US" smtClean="0"/>
-              <a:t>8/24/2021</a:t>
+              <a:t>8/26/2021</a:t>
             </a:fld>
             <a:endParaRPr lang="en-US"/>
           </a:p>
@@ -7014,7 +7014,7 @@
           <a:p>
             <a:fld id="{3E232C92-DF21-4A04-859B-AAF8BD4EC904}" type="datetimeFigureOut">
               <a:rPr lang="en-US" smtClean="0"/>
-              <a:t>8/24/2021</a:t>
+              <a:t>8/26/2021</a:t>
             </a:fld>
             <a:endParaRPr lang="en-US"/>
           </a:p>
@@ -7279,7 +7279,7 @@
           <a:p>
             <a:fld id="{3E232C92-DF21-4A04-859B-AAF8BD4EC904}" type="datetimeFigureOut">
               <a:rPr lang="en-US" smtClean="0"/>
-              <a:t>8/24/2021</a:t>
+              <a:t>8/26/2021</a:t>
             </a:fld>
             <a:endParaRPr lang="en-US"/>
           </a:p>
@@ -7691,7 +7691,7 @@
           <a:p>
             <a:fld id="{3E232C92-DF21-4A04-859B-AAF8BD4EC904}" type="datetimeFigureOut">
               <a:rPr lang="en-US" smtClean="0"/>
-              <a:t>8/24/2021</a:t>
+              <a:t>8/26/2021</a:t>
             </a:fld>
             <a:endParaRPr lang="en-US"/>
           </a:p>
@@ -7832,7 +7832,7 @@
           <a:p>
             <a:fld id="{3E232C92-DF21-4A04-859B-AAF8BD4EC904}" type="datetimeFigureOut">
               <a:rPr lang="en-US" smtClean="0"/>
-              <a:t>8/24/2021</a:t>
+              <a:t>8/26/2021</a:t>
             </a:fld>
             <a:endParaRPr lang="en-US"/>
           </a:p>
@@ -7945,7 +7945,7 @@
           <a:p>
             <a:fld id="{3E232C92-DF21-4A04-859B-AAF8BD4EC904}" type="datetimeFigureOut">
               <a:rPr lang="en-US" smtClean="0"/>
-              <a:t>8/24/2021</a:t>
+              <a:t>8/26/2021</a:t>
             </a:fld>
             <a:endParaRPr lang="en-US"/>
           </a:p>
@@ -8256,7 +8256,7 @@
           <a:p>
             <a:fld id="{3E232C92-DF21-4A04-859B-AAF8BD4EC904}" type="datetimeFigureOut">
               <a:rPr lang="en-US" smtClean="0"/>
-              <a:t>8/24/2021</a:t>
+              <a:t>8/26/2021</a:t>
             </a:fld>
             <a:endParaRPr lang="en-US"/>
           </a:p>
@@ -8544,7 +8544,7 @@
           <a:p>
             <a:fld id="{3E232C92-DF21-4A04-859B-AAF8BD4EC904}" type="datetimeFigureOut">
               <a:rPr lang="en-US" smtClean="0"/>
-              <a:t>8/24/2021</a:t>
+              <a:t>8/26/2021</a:t>
             </a:fld>
             <a:endParaRPr lang="en-US"/>
           </a:p>
@@ -8785,7 +8785,7 @@
           <a:p>
             <a:fld id="{3E232C92-DF21-4A04-859B-AAF8BD4EC904}" type="datetimeFigureOut">
               <a:rPr lang="en-US" smtClean="0"/>
-              <a:t>8/24/2021</a:t>
+              <a:t>8/26/2021</a:t>
             </a:fld>
             <a:endParaRPr lang="en-US"/>
           </a:p>
@@ -9410,7 +9410,7 @@
           <a:p>
             <a:fld id="{7CE3BD8C-C39F-4FFF-9CD5-05E4806DBFF3}" type="datetime1">
               <a:rPr lang="en-US" altLang="en-US" smtClean="0"/>
-              <a:t>8/24/2021</a:t>
+              <a:t>8/26/2021</a:t>
             </a:fld>
             <a:endParaRPr lang="en-US" altLang="en-US"/>
           </a:p>
@@ -11869,38 +11869,9 @@
                 <a:latin typeface="Arial"/>
                 <a:ea typeface="ヒラギノ角ゴ Pro W3" pitchFamily="-126" charset="-128"/>
               </a:rPr>
-              <a:t>Provider/ Provider Group</a:t>
-            </a:r>
-          </a:p>
-        </p:txBody>
-      </p:sp>
-      <p:sp>
-        <p:nvSpPr>
-          <p:cNvPr id="10" name="TextBox 9">
-            <a:extLst>
-              <a:ext uri="{FF2B5EF4-FFF2-40B4-BE49-F238E27FC236}">
-                <a16:creationId xmlns:a16="http://schemas.microsoft.com/office/drawing/2014/main" id="{984AE2E2-20A9-4B44-A58D-4BBB1DF61213}"/>
-              </a:ext>
-            </a:extLst>
-          </p:cNvPr>
-          <p:cNvSpPr txBox="1"/>
-          <p:nvPr/>
-        </p:nvSpPr>
-        <p:spPr>
-          <a:xfrm>
-            <a:off x="2136332" y="3442508"/>
-            <a:ext cx="2115679" cy="297454"/>
-          </a:xfrm>
-          <a:prstGeom prst="rect">
-            <a:avLst/>
-          </a:prstGeom>
-          <a:noFill/>
-        </p:spPr>
-        <p:txBody>
-          <a:bodyPr wrap="square" rtlCol="0">
-            <a:spAutoFit/>
-          </a:bodyPr>
-          <a:lstStyle/>
+              <a:t>Client</a:t>
+            </a:r>
+          </a:p>
           <a:p>
             <a:pPr algn="ctr" defTabSz="609585" fontAlgn="base">
               <a:spcBef>
@@ -11914,6 +11885,56 @@
             <a:r>
               <a:rPr lang="en-US" sz="1333" b="1" dirty="0">
                 <a:solidFill>
+                  <a:srgbClr val="C00000"/>
+                </a:solidFill>
+                <a:latin typeface="Arial"/>
+                <a:ea typeface="ヒラギノ角ゴ Pro W3" pitchFamily="-126" charset="-128"/>
+              </a:rPr>
+              <a:t>(example Provider)</a:t>
+            </a:r>
+          </a:p>
+        </p:txBody>
+      </p:sp>
+      <p:sp>
+        <p:nvSpPr>
+          <p:cNvPr id="10" name="TextBox 9">
+            <a:extLst>
+              <a:ext uri="{FF2B5EF4-FFF2-40B4-BE49-F238E27FC236}">
+                <a16:creationId xmlns:a16="http://schemas.microsoft.com/office/drawing/2014/main" id="{984AE2E2-20A9-4B44-A58D-4BBB1DF61213}"/>
+              </a:ext>
+            </a:extLst>
+          </p:cNvPr>
+          <p:cNvSpPr txBox="1"/>
+          <p:nvPr/>
+        </p:nvSpPr>
+        <p:spPr>
+          <a:xfrm>
+            <a:off x="1831532" y="3442508"/>
+            <a:ext cx="2115679" cy="502573"/>
+          </a:xfrm>
+          <a:prstGeom prst="rect">
+            <a:avLst/>
+          </a:prstGeom>
+          <a:noFill/>
+        </p:spPr>
+        <p:txBody>
+          <a:bodyPr wrap="square" rtlCol="0">
+            <a:spAutoFit/>
+          </a:bodyPr>
+          <a:lstStyle/>
+          <a:p>
+            <a:pPr algn="ctr" defTabSz="609585" fontAlgn="base">
+              <a:spcBef>
+                <a:spcPct val="0"/>
+              </a:spcBef>
+              <a:spcAft>
+                <a:spcPct val="0"/>
+              </a:spcAft>
+              <a:defRPr/>
+            </a:pPr>
+            <a:r>
+              <a:rPr lang="en-US" sz="1333" b="1" dirty="0">
+                <a:solidFill>
                   <a:srgbClr val="F79646">
                     <a:lumMod val="50000"/>
                   </a:srgbClr>
@@ -11921,7 +11942,30 @@
                 <a:latin typeface="Arial"/>
                 <a:ea typeface="ヒラギノ角ゴ Pro W3" pitchFamily="-126" charset="-128"/>
               </a:rPr>
-              <a:t>Payer</a:t>
+              <a:t>Server</a:t>
+            </a:r>
+          </a:p>
+          <a:p>
+            <a:pPr algn="ctr" defTabSz="609585" fontAlgn="base">
+              <a:spcBef>
+                <a:spcPct val="0"/>
+              </a:spcBef>
+              <a:spcAft>
+                <a:spcPct val="0"/>
+              </a:spcAft>
+              <a:defRPr/>
+            </a:pPr>
+            <a:r>
+              <a:rPr lang="en-US" sz="1333" b="1" dirty="0">
+                <a:solidFill>
+                  <a:srgbClr val="F79646">
+                    <a:lumMod val="50000"/>
+                  </a:srgbClr>
+                </a:solidFill>
+                <a:latin typeface="Arial"/>
+                <a:ea typeface="ヒラギノ角ゴ Pro W3" pitchFamily="-126" charset="-128"/>
+              </a:rPr>
+              <a:t>(example Payer)</a:t>
             </a:r>
           </a:p>
         </p:txBody>

</xml_diff>

<commit_message>
Updated home page summary, how to read, scope, and added actors section
</commit_message>
<xml_diff>
--- a/input/images/Source/Risk Adjustment Images.pptx
+++ b/input/images/Source/Risk Adjustment Images.pptx
@@ -14,7 +14,7 @@
     <p:sldId id="2970" r:id="rId5"/>
     <p:sldId id="267" r:id="rId6"/>
     <p:sldId id="268" r:id="rId7"/>
-    <p:sldId id="269" r:id="rId8"/>
+    <p:sldId id="2971" r:id="rId8"/>
     <p:sldId id="2966" r:id="rId9"/>
     <p:sldId id="264" r:id="rId10"/>
     <p:sldId id="2969" r:id="rId11"/>
@@ -208,7 +208,7 @@
           <a:p>
             <a:fld id="{4337D45E-38B5-4093-B633-D3DDCA61416C}" type="datetimeFigureOut">
               <a:rPr lang="en-US" smtClean="0"/>
-              <a:t>10/12/2021</a:t>
+              <a:t>11/8/2021</a:t>
             </a:fld>
             <a:endParaRPr lang="en-US"/>
           </a:p>
@@ -879,15 +879,7 @@
           <a:p>
             <a:r>
               <a:rPr lang="en-US" dirty="0"/>
-              <a:t>Source is </a:t>
-            </a:r>
-            <a:r>
-              <a:rPr lang="en-US" dirty="0" err="1"/>
-              <a:t>visio</a:t>
-            </a:r>
-            <a:r>
-              <a:rPr lang="en-US" dirty="0"/>
-              <a:t>, </a:t>
+              <a:t>Used for risk-adjustment-gaps-workflow.png</a:t>
             </a:r>
           </a:p>
         </p:txBody>
@@ -909,7 +901,7 @@
           <a:p>
             <a:fld id="{1D553A4D-C549-44B5-B4F2-4FBA040D2BDB}" type="slidenum">
               <a:rPr lang="en-US" smtClean="0"/>
-              <a:t>7</a:t>
+              <a:t>6</a:t>
             </a:fld>
             <a:endParaRPr lang="en-US"/>
           </a:p>
@@ -918,7 +910,7 @@
     </p:spTree>
     <p:extLst>
       <p:ext uri="{BB962C8B-B14F-4D97-AF65-F5344CB8AC3E}">
-        <p14:creationId xmlns:p14="http://schemas.microsoft.com/office/powerpoint/2010/main" val="4071961976"/>
+        <p14:creationId xmlns:p14="http://schemas.microsoft.com/office/powerpoint/2010/main" val="2511305095"/>
       </p:ext>
     </p:extLst>
   </p:cSld>
@@ -974,6 +966,101 @@
           <a:p>
             <a:r>
               <a:rPr lang="en-US" dirty="0"/>
+              <a:t>Source is </a:t>
+            </a:r>
+            <a:r>
+              <a:rPr lang="en-US" dirty="0" err="1"/>
+              <a:t>visio</a:t>
+            </a:r>
+            <a:r>
+              <a:rPr lang="en-US" dirty="0"/>
+              <a:t>, </a:t>
+            </a:r>
+          </a:p>
+        </p:txBody>
+      </p:sp>
+      <p:sp>
+        <p:nvSpPr>
+          <p:cNvPr id="4" name="Slide Number Placeholder 3"/>
+          <p:cNvSpPr>
+            <a:spLocks noGrp="1"/>
+          </p:cNvSpPr>
+          <p:nvPr>
+            <p:ph type="sldNum" sz="quarter" idx="5"/>
+          </p:nvPr>
+        </p:nvSpPr>
+        <p:spPr/>
+        <p:txBody>
+          <a:bodyPr/>
+          <a:lstStyle/>
+          <a:p>
+            <a:fld id="{1D553A4D-C549-44B5-B4F2-4FBA040D2BDB}" type="slidenum">
+              <a:rPr lang="en-US" smtClean="0"/>
+              <a:t>7</a:t>
+            </a:fld>
+            <a:endParaRPr lang="en-US"/>
+          </a:p>
+        </p:txBody>
+      </p:sp>
+    </p:spTree>
+    <p:extLst>
+      <p:ext uri="{BB962C8B-B14F-4D97-AF65-F5344CB8AC3E}">
+        <p14:creationId xmlns:p14="http://schemas.microsoft.com/office/powerpoint/2010/main" val="4071961976"/>
+      </p:ext>
+    </p:extLst>
+  </p:cSld>
+  <p:clrMapOvr>
+    <a:masterClrMapping/>
+  </p:clrMapOvr>
+</p:notes>
+</file>
+
+<file path=ppt/notesSlides/notesSlide6.xml><?xml version="1.0" encoding="utf-8"?>
+<p:notes xmlns:a="http://schemas.openxmlformats.org/drawingml/2006/main" xmlns:r="http://schemas.openxmlformats.org/officeDocument/2006/relationships" xmlns:p="http://schemas.openxmlformats.org/presentationml/2006/main">
+  <p:cSld>
+    <p:spTree>
+      <p:nvGrpSpPr>
+        <p:cNvPr id="1" name=""/>
+        <p:cNvGrpSpPr/>
+        <p:nvPr/>
+      </p:nvGrpSpPr>
+      <p:grpSpPr>
+        <a:xfrm>
+          <a:off x="0" y="0"/>
+          <a:ext cx="0" cy="0"/>
+          <a:chOff x="0" y="0"/>
+          <a:chExt cx="0" cy="0"/>
+        </a:xfrm>
+      </p:grpSpPr>
+      <p:sp>
+        <p:nvSpPr>
+          <p:cNvPr id="2" name="Slide Image Placeholder 1"/>
+          <p:cNvSpPr>
+            <a:spLocks noGrp="1" noRot="1" noChangeAspect="1"/>
+          </p:cNvSpPr>
+          <p:nvPr>
+            <p:ph type="sldImg"/>
+          </p:nvPr>
+        </p:nvSpPr>
+        <p:spPr/>
+      </p:sp>
+      <p:sp>
+        <p:nvSpPr>
+          <p:cNvPr id="3" name="Notes Placeholder 2"/>
+          <p:cNvSpPr>
+            <a:spLocks noGrp="1"/>
+          </p:cNvSpPr>
+          <p:nvPr>
+            <p:ph type="body" idx="1"/>
+          </p:nvPr>
+        </p:nvSpPr>
+        <p:spPr/>
+        <p:txBody>
+          <a:bodyPr/>
+          <a:lstStyle/>
+          <a:p>
+            <a:r>
+              <a:rPr lang="en-US" dirty="0"/>
               <a:t>Resource Graph to match Report	</a:t>
             </a:r>
           </a:p>
@@ -1015,7 +1102,7 @@
 </p:notes>
 </file>
 
-<file path=ppt/notesSlides/notesSlide6.xml><?xml version="1.0" encoding="utf-8"?>
+<file path=ppt/notesSlides/notesSlide7.xml><?xml version="1.0" encoding="utf-8"?>
 <p:notes xmlns:a="http://schemas.openxmlformats.org/drawingml/2006/main" xmlns:r="http://schemas.openxmlformats.org/officeDocument/2006/relationships" xmlns:p="http://schemas.openxmlformats.org/presentationml/2006/main">
   <p:cSld>
     <p:spTree>
@@ -1255,7 +1342,7 @@
           <a:p>
             <a:fld id="{3E232C92-DF21-4A04-859B-AAF8BD4EC904}" type="datetimeFigureOut">
               <a:rPr lang="en-US" smtClean="0"/>
-              <a:t>10/12/2021</a:t>
+              <a:t>11/8/2021</a:t>
             </a:fld>
             <a:endParaRPr lang="en-US"/>
           </a:p>
@@ -1453,7 +1540,7 @@
           <a:p>
             <a:fld id="{3E232C92-DF21-4A04-859B-AAF8BD4EC904}" type="datetimeFigureOut">
               <a:rPr lang="en-US" smtClean="0"/>
-              <a:t>10/12/2021</a:t>
+              <a:t>11/8/2021</a:t>
             </a:fld>
             <a:endParaRPr lang="en-US"/>
           </a:p>
@@ -1661,7 +1748,7 @@
           <a:p>
             <a:fld id="{3E232C92-DF21-4A04-859B-AAF8BD4EC904}" type="datetimeFigureOut">
               <a:rPr lang="en-US" smtClean="0"/>
-              <a:t>10/12/2021</a:t>
+              <a:t>11/8/2021</a:t>
             </a:fld>
             <a:endParaRPr lang="en-US"/>
           </a:p>
@@ -2603,7 +2690,7 @@
           <a:p>
             <a:fld id="{23F303CC-BC6F-44EE-9A09-81F690F71D2E}" type="datetime1">
               <a:rPr lang="en-US" altLang="en-US" smtClean="0"/>
-              <a:t>10/12/2021</a:t>
+              <a:t>11/8/2021</a:t>
             </a:fld>
             <a:endParaRPr lang="en-US" altLang="en-US" dirty="0"/>
           </a:p>
@@ -6425,7 +6512,7 @@
           <a:p>
             <a:fld id="{3E232C92-DF21-4A04-859B-AAF8BD4EC904}" type="datetimeFigureOut">
               <a:rPr lang="en-US" smtClean="0"/>
-              <a:t>10/12/2021</a:t>
+              <a:t>11/8/2021</a:t>
             </a:fld>
             <a:endParaRPr lang="en-US"/>
           </a:p>
@@ -7518,7 +7605,7 @@
           <a:p>
             <a:fld id="{3E232C92-DF21-4A04-859B-AAF8BD4EC904}" type="datetimeFigureOut">
               <a:rPr lang="en-US" smtClean="0"/>
-              <a:t>10/12/2021</a:t>
+              <a:t>11/8/2021</a:t>
             </a:fld>
             <a:endParaRPr lang="en-US"/>
           </a:p>
@@ -7783,7 +7870,7 @@
           <a:p>
             <a:fld id="{3E232C92-DF21-4A04-859B-AAF8BD4EC904}" type="datetimeFigureOut">
               <a:rPr lang="en-US" smtClean="0"/>
-              <a:t>10/12/2021</a:t>
+              <a:t>11/8/2021</a:t>
             </a:fld>
             <a:endParaRPr lang="en-US"/>
           </a:p>
@@ -8195,7 +8282,7 @@
           <a:p>
             <a:fld id="{3E232C92-DF21-4A04-859B-AAF8BD4EC904}" type="datetimeFigureOut">
               <a:rPr lang="en-US" smtClean="0"/>
-              <a:t>10/12/2021</a:t>
+              <a:t>11/8/2021</a:t>
             </a:fld>
             <a:endParaRPr lang="en-US"/>
           </a:p>
@@ -8336,7 +8423,7 @@
           <a:p>
             <a:fld id="{3E232C92-DF21-4A04-859B-AAF8BD4EC904}" type="datetimeFigureOut">
               <a:rPr lang="en-US" smtClean="0"/>
-              <a:t>10/12/2021</a:t>
+              <a:t>11/8/2021</a:t>
             </a:fld>
             <a:endParaRPr lang="en-US"/>
           </a:p>
@@ -8449,7 +8536,7 @@
           <a:p>
             <a:fld id="{3E232C92-DF21-4A04-859B-AAF8BD4EC904}" type="datetimeFigureOut">
               <a:rPr lang="en-US" smtClean="0"/>
-              <a:t>10/12/2021</a:t>
+              <a:t>11/8/2021</a:t>
             </a:fld>
             <a:endParaRPr lang="en-US"/>
           </a:p>
@@ -8760,7 +8847,7 @@
           <a:p>
             <a:fld id="{3E232C92-DF21-4A04-859B-AAF8BD4EC904}" type="datetimeFigureOut">
               <a:rPr lang="en-US" smtClean="0"/>
-              <a:t>10/12/2021</a:t>
+              <a:t>11/8/2021</a:t>
             </a:fld>
             <a:endParaRPr lang="en-US"/>
           </a:p>
@@ -9048,7 +9135,7 @@
           <a:p>
             <a:fld id="{3E232C92-DF21-4A04-859B-AAF8BD4EC904}" type="datetimeFigureOut">
               <a:rPr lang="en-US" smtClean="0"/>
-              <a:t>10/12/2021</a:t>
+              <a:t>11/8/2021</a:t>
             </a:fld>
             <a:endParaRPr lang="en-US"/>
           </a:p>
@@ -9289,7 +9376,7 @@
           <a:p>
             <a:fld id="{3E232C92-DF21-4A04-859B-AAF8BD4EC904}" type="datetimeFigureOut">
               <a:rPr lang="en-US" smtClean="0"/>
-              <a:t>10/12/2021</a:t>
+              <a:t>11/8/2021</a:t>
             </a:fld>
             <a:endParaRPr lang="en-US"/>
           </a:p>
@@ -9915,7 +10002,7 @@
           <a:p>
             <a:fld id="{7CE3BD8C-C39F-4FFF-9CD5-05E4806DBFF3}" type="datetime1">
               <a:rPr lang="en-US" altLang="en-US" smtClean="0"/>
-              <a:t>10/12/2021</a:t>
+              <a:t>11/8/2021</a:t>
             </a:fld>
             <a:endParaRPr lang="en-US" altLang="en-US"/>
           </a:p>
@@ -17754,7 +17841,7 @@
           <p:cNvPr id="2" name="Title 1">
             <a:extLst>
               <a:ext uri="{FF2B5EF4-FFF2-40B4-BE49-F238E27FC236}">
-                <a16:creationId xmlns:a16="http://schemas.microsoft.com/office/drawing/2014/main" id="{CA312D2E-9348-4F8D-937D-6AA79DDE4A3B}"/>
+                <a16:creationId xmlns:a16="http://schemas.microsoft.com/office/drawing/2014/main" id="{DE4FC254-7E84-4C1E-B2B1-8F45C616E91E}"/>
               </a:ext>
             </a:extLst>
           </p:cNvPr>
@@ -17771,9 +17858,10 @@
           <a:lstStyle/>
           <a:p>
             <a:r>
-              <a:rPr lang="en-US" dirty="0"/>
-              <a:t>Guidance Page</a:t>
-            </a:r>
+              <a:rPr lang="en-US"/>
+              <a:t>Figure 1-3 (Home page)</a:t>
+            </a:r>
+            <a:endParaRPr lang="en-US" dirty="0"/>
           </a:p>
         </p:txBody>
       </p:sp>
@@ -17782,7 +17870,7 @@
           <p:cNvPr id="3" name="Text Placeholder 2">
             <a:extLst>
               <a:ext uri="{FF2B5EF4-FFF2-40B4-BE49-F238E27FC236}">
-                <a16:creationId xmlns:a16="http://schemas.microsoft.com/office/drawing/2014/main" id="{BB3CD43F-8553-40B1-9050-7F83A248717D}"/>
+                <a16:creationId xmlns:a16="http://schemas.microsoft.com/office/drawing/2014/main" id="{4025DF32-5ADE-4348-8F51-B2255B4D83D2}"/>
               </a:ext>
             </a:extLst>
           </p:cNvPr>
@@ -17798,7 +17886,13 @@
           <a:bodyPr/>
           <a:lstStyle/>
           <a:p>
-            <a:endParaRPr lang="en-US"/>
+            <a:pPr marL="0" indent="0">
+              <a:buNone/>
+            </a:pPr>
+            <a:r>
+              <a:rPr lang="en-US" dirty="0"/>
+              <a:t> </a:t>
+            </a:r>
           </a:p>
         </p:txBody>
       </p:sp>
@@ -17807,7 +17901,7 @@
           <p:cNvPr id="4" name="Footer Placeholder 3">
             <a:extLst>
               <a:ext uri="{FF2B5EF4-FFF2-40B4-BE49-F238E27FC236}">
-                <a16:creationId xmlns:a16="http://schemas.microsoft.com/office/drawing/2014/main" id="{398C3AFC-73DA-4BEE-9920-A96CBA4DB9DA}"/>
+                <a16:creationId xmlns:a16="http://schemas.microsoft.com/office/drawing/2014/main" id="{6F1D9FDC-5EC9-421B-B816-669D4CBA8D03}"/>
               </a:ext>
             </a:extLst>
           </p:cNvPr>
@@ -17842,7 +17936,7 @@
           <p:cNvPr id="5" name="Slide Number Placeholder 4">
             <a:extLst>
               <a:ext uri="{FF2B5EF4-FFF2-40B4-BE49-F238E27FC236}">
-                <a16:creationId xmlns:a16="http://schemas.microsoft.com/office/drawing/2014/main" id="{46F8B53C-135E-405E-BA3A-8FEF468B0C17}"/>
+                <a16:creationId xmlns:a16="http://schemas.microsoft.com/office/drawing/2014/main" id="{ABC91477-8158-43AE-8C67-AA1E9785A906}"/>
               </a:ext>
             </a:extLst>
           </p:cNvPr>
@@ -17867,10 +17961,434 @@
           </a:p>
         </p:txBody>
       </p:sp>
+      <p:pic>
+        <p:nvPicPr>
+          <p:cNvPr id="6" name="Graphic 5">
+            <a:extLst>
+              <a:ext uri="{FF2B5EF4-FFF2-40B4-BE49-F238E27FC236}">
+                <a16:creationId xmlns:a16="http://schemas.microsoft.com/office/drawing/2014/main" id="{842186CE-C3CB-491F-B90D-334B74F93238}"/>
+              </a:ext>
+            </a:extLst>
+          </p:cNvPr>
+          <p:cNvPicPr>
+            <a:picLocks noChangeAspect="1"/>
+          </p:cNvPicPr>
+          <p:nvPr/>
+        </p:nvPicPr>
+        <p:blipFill>
+          <a:blip r:embed="rId3">
+            <a:extLst>
+              <a:ext uri="{96DAC541-7B7A-43D3-8B79-37D633B846F1}">
+                <asvg:svgBlip xmlns:asvg="http://schemas.microsoft.com/office/drawing/2016/SVG/main" r:embed="rId4"/>
+              </a:ext>
+            </a:extLst>
+          </a:blip>
+          <a:stretch>
+            <a:fillRect/>
+          </a:stretch>
+        </p:blipFill>
+        <p:spPr>
+          <a:xfrm>
+            <a:off x="3428016" y="3173224"/>
+            <a:ext cx="659817" cy="996459"/>
+          </a:xfrm>
+          <a:prstGeom prst="rect">
+            <a:avLst/>
+          </a:prstGeom>
+        </p:spPr>
+      </p:pic>
+      <p:pic>
+        <p:nvPicPr>
+          <p:cNvPr id="7" name="Graphic 6">
+            <a:extLst>
+              <a:ext uri="{FF2B5EF4-FFF2-40B4-BE49-F238E27FC236}">
+                <a16:creationId xmlns:a16="http://schemas.microsoft.com/office/drawing/2014/main" id="{3E4BF30F-2D52-4FA7-8B6E-989427E65C55}"/>
+              </a:ext>
+            </a:extLst>
+          </p:cNvPr>
+          <p:cNvPicPr>
+            <a:picLocks noChangeAspect="1"/>
+          </p:cNvPicPr>
+          <p:nvPr/>
+        </p:nvPicPr>
+        <p:blipFill>
+          <a:blip r:embed="rId5">
+            <a:extLst>
+              <a:ext uri="{96DAC541-7B7A-43D3-8B79-37D633B846F1}">
+                <asvg:svgBlip xmlns:asvg="http://schemas.microsoft.com/office/drawing/2016/SVG/main" r:embed="rId6"/>
+              </a:ext>
+            </a:extLst>
+          </a:blip>
+          <a:stretch>
+            <a:fillRect/>
+          </a:stretch>
+        </p:blipFill>
+        <p:spPr>
+          <a:xfrm>
+            <a:off x="7464510" y="2979089"/>
+            <a:ext cx="814124" cy="899821"/>
+          </a:xfrm>
+          <a:prstGeom prst="rect">
+            <a:avLst/>
+          </a:prstGeom>
+        </p:spPr>
+      </p:pic>
+      <p:sp>
+        <p:nvSpPr>
+          <p:cNvPr id="9" name="TextBox 8">
+            <a:extLst>
+              <a:ext uri="{FF2B5EF4-FFF2-40B4-BE49-F238E27FC236}">
+                <a16:creationId xmlns:a16="http://schemas.microsoft.com/office/drawing/2014/main" id="{F400E8FA-0292-4288-B1BB-DA58B38789C1}"/>
+              </a:ext>
+            </a:extLst>
+          </p:cNvPr>
+          <p:cNvSpPr txBox="1"/>
+          <p:nvPr/>
+        </p:nvSpPr>
+        <p:spPr>
+          <a:xfrm>
+            <a:off x="1368638" y="3121037"/>
+            <a:ext cx="2162408" cy="584775"/>
+          </a:xfrm>
+          <a:prstGeom prst="rect">
+            <a:avLst/>
+          </a:prstGeom>
+          <a:noFill/>
+        </p:spPr>
+        <p:txBody>
+          <a:bodyPr wrap="square" rtlCol="0">
+            <a:spAutoFit/>
+          </a:bodyPr>
+          <a:lstStyle/>
+          <a:p>
+            <a:pPr algn="ctr" defTabSz="609585" fontAlgn="base">
+              <a:spcBef>
+                <a:spcPct val="0"/>
+              </a:spcBef>
+              <a:spcAft>
+                <a:spcPct val="0"/>
+              </a:spcAft>
+              <a:defRPr/>
+            </a:pPr>
+            <a:r>
+              <a:rPr lang="en-US" sz="1600" b="1" dirty="0">
+                <a:solidFill>
+                  <a:srgbClr val="C00000"/>
+                </a:solidFill>
+                <a:latin typeface="Arial"/>
+                <a:ea typeface="ヒラギノ角ゴ Pro W3" pitchFamily="-126" charset="-128"/>
+              </a:rPr>
+              <a:t>Client</a:t>
+            </a:r>
+          </a:p>
+          <a:p>
+            <a:pPr algn="ctr" defTabSz="609585" fontAlgn="base">
+              <a:spcBef>
+                <a:spcPct val="0"/>
+              </a:spcBef>
+              <a:spcAft>
+                <a:spcPct val="0"/>
+              </a:spcAft>
+              <a:defRPr/>
+            </a:pPr>
+            <a:r>
+              <a:rPr lang="en-US" sz="1600" b="1" dirty="0">
+                <a:solidFill>
+                  <a:srgbClr val="C00000"/>
+                </a:solidFill>
+                <a:latin typeface="Arial"/>
+                <a:ea typeface="ヒラギノ角ゴ Pro W3" pitchFamily="-126" charset="-128"/>
+              </a:rPr>
+              <a:t>(example Provider)</a:t>
+            </a:r>
+          </a:p>
+        </p:txBody>
+      </p:sp>
+      <p:sp>
+        <p:nvSpPr>
+          <p:cNvPr id="10" name="TextBox 9">
+            <a:extLst>
+              <a:ext uri="{FF2B5EF4-FFF2-40B4-BE49-F238E27FC236}">
+                <a16:creationId xmlns:a16="http://schemas.microsoft.com/office/drawing/2014/main" id="{984AE2E2-20A9-4B44-A58D-4BBB1DF61213}"/>
+              </a:ext>
+            </a:extLst>
+          </p:cNvPr>
+          <p:cNvSpPr txBox="1"/>
+          <p:nvPr/>
+        </p:nvSpPr>
+        <p:spPr>
+          <a:xfrm>
+            <a:off x="8076248" y="3100638"/>
+            <a:ext cx="2115679" cy="584775"/>
+          </a:xfrm>
+          <a:prstGeom prst="rect">
+            <a:avLst/>
+          </a:prstGeom>
+          <a:noFill/>
+        </p:spPr>
+        <p:txBody>
+          <a:bodyPr wrap="square" rtlCol="0">
+            <a:spAutoFit/>
+          </a:bodyPr>
+          <a:lstStyle/>
+          <a:p>
+            <a:pPr algn="ctr" defTabSz="609585" fontAlgn="base">
+              <a:spcBef>
+                <a:spcPct val="0"/>
+              </a:spcBef>
+              <a:spcAft>
+                <a:spcPct val="0"/>
+              </a:spcAft>
+              <a:defRPr/>
+            </a:pPr>
+            <a:r>
+              <a:rPr lang="en-US" sz="1600" b="1" dirty="0">
+                <a:solidFill>
+                  <a:srgbClr val="F79646">
+                    <a:lumMod val="50000"/>
+                  </a:srgbClr>
+                </a:solidFill>
+                <a:latin typeface="Arial"/>
+                <a:ea typeface="ヒラギノ角ゴ Pro W3" pitchFamily="-126" charset="-128"/>
+              </a:rPr>
+              <a:t>Server</a:t>
+            </a:r>
+          </a:p>
+          <a:p>
+            <a:pPr algn="ctr" defTabSz="609585" fontAlgn="base">
+              <a:spcBef>
+                <a:spcPct val="0"/>
+              </a:spcBef>
+              <a:spcAft>
+                <a:spcPct val="0"/>
+              </a:spcAft>
+              <a:defRPr/>
+            </a:pPr>
+            <a:r>
+              <a:rPr lang="en-US" sz="1600" b="1" dirty="0">
+                <a:solidFill>
+                  <a:srgbClr val="F79646">
+                    <a:lumMod val="50000"/>
+                  </a:srgbClr>
+                </a:solidFill>
+                <a:latin typeface="Arial"/>
+                <a:ea typeface="ヒラギノ角ゴ Pro W3" pitchFamily="-126" charset="-128"/>
+              </a:rPr>
+              <a:t>(example Payer)</a:t>
+            </a:r>
+          </a:p>
+        </p:txBody>
+      </p:sp>
+      <p:sp>
+        <p:nvSpPr>
+          <p:cNvPr id="8" name="Arrow: U-Turn 7">
+            <a:extLst>
+              <a:ext uri="{FF2B5EF4-FFF2-40B4-BE49-F238E27FC236}">
+                <a16:creationId xmlns:a16="http://schemas.microsoft.com/office/drawing/2014/main" id="{BBA494F5-C840-4276-B567-19F510FB3BE8}"/>
+              </a:ext>
+            </a:extLst>
+          </p:cNvPr>
+          <p:cNvSpPr/>
+          <p:nvPr/>
+        </p:nvSpPr>
+        <p:spPr>
+          <a:xfrm rot="10800000" flipH="1" flipV="1">
+            <a:off x="3604184" y="1851892"/>
+            <a:ext cx="4572963" cy="1202435"/>
+          </a:xfrm>
+          <a:prstGeom prst="uturnArrow">
+            <a:avLst/>
+          </a:prstGeom>
+        </p:spPr>
+        <p:style>
+          <a:lnRef idx="1">
+            <a:schemeClr val="accent1"/>
+          </a:lnRef>
+          <a:fillRef idx="3">
+            <a:schemeClr val="accent1"/>
+          </a:fillRef>
+          <a:effectRef idx="2">
+            <a:schemeClr val="accent1"/>
+          </a:effectRef>
+          <a:fontRef idx="minor">
+            <a:schemeClr val="lt1"/>
+          </a:fontRef>
+        </p:style>
+        <p:txBody>
+          <a:bodyPr rtlCol="0" anchor="ctr"/>
+          <a:lstStyle/>
+          <a:p>
+            <a:pPr algn="ctr"/>
+            <a:endParaRPr lang="en-US">
+              <a:solidFill>
+                <a:schemeClr val="tx1"/>
+              </a:solidFill>
+            </a:endParaRPr>
+          </a:p>
+        </p:txBody>
+      </p:sp>
+      <p:sp>
+        <p:nvSpPr>
+          <p:cNvPr id="13" name="Arrow: U-Turn 12">
+            <a:extLst>
+              <a:ext uri="{FF2B5EF4-FFF2-40B4-BE49-F238E27FC236}">
+                <a16:creationId xmlns:a16="http://schemas.microsoft.com/office/drawing/2014/main" id="{174416F3-D18D-44B8-B799-1F518BBC5027}"/>
+              </a:ext>
+            </a:extLst>
+          </p:cNvPr>
+          <p:cNvSpPr/>
+          <p:nvPr/>
+        </p:nvSpPr>
+        <p:spPr>
+          <a:xfrm rot="10800000">
+            <a:off x="3531047" y="3933241"/>
+            <a:ext cx="4472642" cy="1202435"/>
+          </a:xfrm>
+          <a:prstGeom prst="uturnArrow">
+            <a:avLst/>
+          </a:prstGeom>
+        </p:spPr>
+        <p:style>
+          <a:lnRef idx="1">
+            <a:schemeClr val="accent1"/>
+          </a:lnRef>
+          <a:fillRef idx="3">
+            <a:schemeClr val="accent1"/>
+          </a:fillRef>
+          <a:effectRef idx="2">
+            <a:schemeClr val="accent1"/>
+          </a:effectRef>
+          <a:fontRef idx="minor">
+            <a:schemeClr val="lt1"/>
+          </a:fontRef>
+        </p:style>
+        <p:txBody>
+          <a:bodyPr rtlCol="0" anchor="ctr"/>
+          <a:lstStyle/>
+          <a:p>
+            <a:pPr algn="ctr"/>
+            <a:endParaRPr lang="en-US">
+              <a:solidFill>
+                <a:schemeClr val="tx1"/>
+              </a:solidFill>
+            </a:endParaRPr>
+          </a:p>
+        </p:txBody>
+      </p:sp>
+      <p:sp>
+        <p:nvSpPr>
+          <p:cNvPr id="14" name="Rectangle 13">
+            <a:extLst>
+              <a:ext uri="{FF2B5EF4-FFF2-40B4-BE49-F238E27FC236}">
+                <a16:creationId xmlns:a16="http://schemas.microsoft.com/office/drawing/2014/main" id="{330FFA72-BBBD-4DBC-800E-90E49E5C0B79}"/>
+              </a:ext>
+            </a:extLst>
+          </p:cNvPr>
+          <p:cNvSpPr/>
+          <p:nvPr/>
+        </p:nvSpPr>
+        <p:spPr>
+          <a:xfrm>
+            <a:off x="4878367" y="1693366"/>
+            <a:ext cx="1778000" cy="598013"/>
+          </a:xfrm>
+          <a:prstGeom prst="rect">
+            <a:avLst/>
+          </a:prstGeom>
+          <a:solidFill>
+            <a:schemeClr val="bg1"/>
+          </a:solidFill>
+        </p:spPr>
+        <p:style>
+          <a:lnRef idx="1">
+            <a:schemeClr val="accent1"/>
+          </a:lnRef>
+          <a:fillRef idx="3">
+            <a:schemeClr val="accent1"/>
+          </a:fillRef>
+          <a:effectRef idx="2">
+            <a:schemeClr val="accent1"/>
+          </a:effectRef>
+          <a:fontRef idx="minor">
+            <a:schemeClr val="lt1"/>
+          </a:fontRef>
+        </p:style>
+        <p:txBody>
+          <a:bodyPr rtlCol="0" anchor="ctr"/>
+          <a:lstStyle/>
+          <a:p>
+            <a:pPr algn="ctr"/>
+            <a:r>
+              <a:rPr lang="en-US" sz="1600" b="1" dirty="0">
+                <a:solidFill>
+                  <a:schemeClr val="tx1"/>
+                </a:solidFill>
+              </a:rPr>
+              <a:t>$report</a:t>
+            </a:r>
+          </a:p>
+        </p:txBody>
+      </p:sp>
+      <p:sp>
+        <p:nvSpPr>
+          <p:cNvPr id="16" name="Rectangle 15">
+            <a:extLst>
+              <a:ext uri="{FF2B5EF4-FFF2-40B4-BE49-F238E27FC236}">
+                <a16:creationId xmlns:a16="http://schemas.microsoft.com/office/drawing/2014/main" id="{6908AAC3-35FE-4372-8B8E-78FD5F752EEB}"/>
+              </a:ext>
+            </a:extLst>
+          </p:cNvPr>
+          <p:cNvSpPr/>
+          <p:nvPr/>
+        </p:nvSpPr>
+        <p:spPr>
+          <a:xfrm>
+            <a:off x="4880094" y="4665336"/>
+            <a:ext cx="2021142" cy="658153"/>
+          </a:xfrm>
+          <a:prstGeom prst="rect">
+            <a:avLst/>
+          </a:prstGeom>
+          <a:solidFill>
+            <a:schemeClr val="bg1"/>
+          </a:solidFill>
+        </p:spPr>
+        <p:style>
+          <a:lnRef idx="1">
+            <a:schemeClr val="accent1"/>
+          </a:lnRef>
+          <a:fillRef idx="3">
+            <a:schemeClr val="accent1"/>
+          </a:fillRef>
+          <a:effectRef idx="2">
+            <a:schemeClr val="accent1"/>
+          </a:effectRef>
+          <a:fontRef idx="minor">
+            <a:schemeClr val="lt1"/>
+          </a:fontRef>
+        </p:style>
+        <p:txBody>
+          <a:bodyPr rtlCol="0" anchor="ctr"/>
+          <a:lstStyle/>
+          <a:p>
+            <a:pPr algn="ctr"/>
+            <a:r>
+              <a:rPr lang="en-US" sz="1400" b="1" dirty="0">
+                <a:solidFill>
+                  <a:schemeClr val="tx1"/>
+                </a:solidFill>
+                <a:latin typeface="Arial" panose="020B0604020202020204" pitchFamily="34" charset="0"/>
+                <a:cs typeface="Arial" panose="020B0604020202020204" pitchFamily="34" charset="0"/>
+              </a:rPr>
+              <a:t>Risk Adjustment Coding Gap Reports</a:t>
+            </a:r>
+          </a:p>
+        </p:txBody>
+      </p:sp>
     </p:spTree>
     <p:extLst>
       <p:ext uri="{BB962C8B-B14F-4D97-AF65-F5344CB8AC3E}">
-        <p14:creationId xmlns:p14="http://schemas.microsoft.com/office/powerpoint/2010/main" val="3236408681"/>
+        <p14:creationId xmlns:p14="http://schemas.microsoft.com/office/powerpoint/2010/main" val="841643404"/>
       </p:ext>
     </p:extLst>
   </p:cSld>

</xml_diff>

<commit_message>
FHIR-35774: applied fixes to Figure 3-2 and Figure 3-3 and image source files
</commit_message>
<xml_diff>
--- a/input/images/Source/Risk Adjustment Images.pptx
+++ b/input/images/Source/Risk Adjustment Images.pptx
@@ -211,7 +211,7 @@
           <a:p>
             <a:fld id="{4337D45E-38B5-4093-B633-D3DDCA61416C}" type="datetimeFigureOut">
               <a:rPr lang="en-US" smtClean="0"/>
-              <a:t>11/12/2021</a:t>
+              <a:t>1/16/2022</a:t>
             </a:fld>
             <a:endParaRPr lang="en-US"/>
           </a:p>
@@ -975,7 +975,10 @@
           <a:bodyPr/>
           <a:lstStyle/>
           <a:p>
-            <a:endParaRPr lang="en-US"/>
+            <a:r>
+              <a:rPr lang="en-US" dirty="0"/>
+              <a:t>Note: 1-16-2022 corrected HCC 18 from Diabetes with No Complication to Diabetes with Chronic Complication</a:t>
+            </a:r>
           </a:p>
         </p:txBody>
       </p:sp>
@@ -1524,7 +1527,7 @@
           <a:p>
             <a:fld id="{3E232C92-DF21-4A04-859B-AAF8BD4EC904}" type="datetimeFigureOut">
               <a:rPr lang="en-US" smtClean="0"/>
-              <a:t>11/12/2021</a:t>
+              <a:t>1/16/2022</a:t>
             </a:fld>
             <a:endParaRPr lang="en-US"/>
           </a:p>
@@ -1722,7 +1725,7 @@
           <a:p>
             <a:fld id="{3E232C92-DF21-4A04-859B-AAF8BD4EC904}" type="datetimeFigureOut">
               <a:rPr lang="en-US" smtClean="0"/>
-              <a:t>11/12/2021</a:t>
+              <a:t>1/16/2022</a:t>
             </a:fld>
             <a:endParaRPr lang="en-US"/>
           </a:p>
@@ -1930,7 +1933,7 @@
           <a:p>
             <a:fld id="{3E232C92-DF21-4A04-859B-AAF8BD4EC904}" type="datetimeFigureOut">
               <a:rPr lang="en-US" smtClean="0"/>
-              <a:t>11/12/2021</a:t>
+              <a:t>1/16/2022</a:t>
             </a:fld>
             <a:endParaRPr lang="en-US"/>
           </a:p>
@@ -2872,7 +2875,7 @@
           <a:p>
             <a:fld id="{23F303CC-BC6F-44EE-9A09-81F690F71D2E}" type="datetime1">
               <a:rPr lang="en-US" altLang="en-US" smtClean="0"/>
-              <a:t>11/12/2021</a:t>
+              <a:t>1/16/2022</a:t>
             </a:fld>
             <a:endParaRPr lang="en-US" altLang="en-US" dirty="0"/>
           </a:p>
@@ -6694,7 +6697,7 @@
           <a:p>
             <a:fld id="{3E232C92-DF21-4A04-859B-AAF8BD4EC904}" type="datetimeFigureOut">
               <a:rPr lang="en-US" smtClean="0"/>
-              <a:t>11/12/2021</a:t>
+              <a:t>1/16/2022</a:t>
             </a:fld>
             <a:endParaRPr lang="en-US"/>
           </a:p>
@@ -7710,7 +7713,7 @@
           <a:p>
             <a:fld id="{3E232C92-DF21-4A04-859B-AAF8BD4EC904}" type="datetimeFigureOut">
               <a:rPr lang="en-US" smtClean="0"/>
-              <a:t>11/12/2021</a:t>
+              <a:t>1/16/2022</a:t>
             </a:fld>
             <a:endParaRPr lang="en-US"/>
           </a:p>
@@ -7985,7 +7988,7 @@
           <a:p>
             <a:fld id="{3E232C92-DF21-4A04-859B-AAF8BD4EC904}" type="datetimeFigureOut">
               <a:rPr lang="en-US" smtClean="0"/>
-              <a:t>11/12/2021</a:t>
+              <a:t>1/16/2022</a:t>
             </a:fld>
             <a:endParaRPr lang="en-US"/>
           </a:p>
@@ -8250,7 +8253,7 @@
           <a:p>
             <a:fld id="{3E232C92-DF21-4A04-859B-AAF8BD4EC904}" type="datetimeFigureOut">
               <a:rPr lang="en-US" smtClean="0"/>
-              <a:t>11/12/2021</a:t>
+              <a:t>1/16/2022</a:t>
             </a:fld>
             <a:endParaRPr lang="en-US"/>
           </a:p>
@@ -8662,7 +8665,7 @@
           <a:p>
             <a:fld id="{3E232C92-DF21-4A04-859B-AAF8BD4EC904}" type="datetimeFigureOut">
               <a:rPr lang="en-US" smtClean="0"/>
-              <a:t>11/12/2021</a:t>
+              <a:t>1/16/2022</a:t>
             </a:fld>
             <a:endParaRPr lang="en-US"/>
           </a:p>
@@ -8803,7 +8806,7 @@
           <a:p>
             <a:fld id="{3E232C92-DF21-4A04-859B-AAF8BD4EC904}" type="datetimeFigureOut">
               <a:rPr lang="en-US" smtClean="0"/>
-              <a:t>11/12/2021</a:t>
+              <a:t>1/16/2022</a:t>
             </a:fld>
             <a:endParaRPr lang="en-US"/>
           </a:p>
@@ -8916,7 +8919,7 @@
           <a:p>
             <a:fld id="{3E232C92-DF21-4A04-859B-AAF8BD4EC904}" type="datetimeFigureOut">
               <a:rPr lang="en-US" smtClean="0"/>
-              <a:t>11/12/2021</a:t>
+              <a:t>1/16/2022</a:t>
             </a:fld>
             <a:endParaRPr lang="en-US"/>
           </a:p>
@@ -9227,7 +9230,7 @@
           <a:p>
             <a:fld id="{3E232C92-DF21-4A04-859B-AAF8BD4EC904}" type="datetimeFigureOut">
               <a:rPr lang="en-US" smtClean="0"/>
-              <a:t>11/12/2021</a:t>
+              <a:t>1/16/2022</a:t>
             </a:fld>
             <a:endParaRPr lang="en-US"/>
           </a:p>
@@ -9515,7 +9518,7 @@
           <a:p>
             <a:fld id="{3E232C92-DF21-4A04-859B-AAF8BD4EC904}" type="datetimeFigureOut">
               <a:rPr lang="en-US" smtClean="0"/>
-              <a:t>11/12/2021</a:t>
+              <a:t>1/16/2022</a:t>
             </a:fld>
             <a:endParaRPr lang="en-US"/>
           </a:p>
@@ -9756,7 +9759,7 @@
           <a:p>
             <a:fld id="{3E232C92-DF21-4A04-859B-AAF8BD4EC904}" type="datetimeFigureOut">
               <a:rPr lang="en-US" smtClean="0"/>
-              <a:t>11/12/2021</a:t>
+              <a:t>1/16/2022</a:t>
             </a:fld>
             <a:endParaRPr lang="en-US"/>
           </a:p>
@@ -10382,7 +10385,7 @@
           <a:p>
             <a:fld id="{7CE3BD8C-C39F-4FFF-9CD5-05E4806DBFF3}" type="datetime1">
               <a:rPr lang="en-US" altLang="en-US" smtClean="0"/>
-              <a:t>11/12/2021</a:t>
+              <a:t>1/16/2022</a:t>
             </a:fld>
             <a:endParaRPr lang="en-US" altLang="en-US"/>
           </a:p>
@@ -23490,7 +23493,7 @@
                   <a:prstClr val="white"/>
                 </a:solidFill>
               </a:rPr>
-              <a:t>    .code: 18 Diabetes with No Complication</a:t>
+              <a:t>    .code: 18 Diabetes with Chronic Complications</a:t>
             </a:r>
           </a:p>
           <a:p>

</xml_diff>

<commit_message>
Updated diagrams for Report Generation, added workflow diagram, moved items to Guidance page
</commit_message>
<xml_diff>
--- a/input/images/Source/Risk Adjustment Images.pptx
+++ b/input/images/Source/Risk Adjustment Images.pptx
@@ -214,7 +214,7 @@
           <a:p>
             <a:fld id="{4337D45E-38B5-4093-B633-D3DDCA61416C}" type="datetimeFigureOut">
               <a:rPr lang="en-US" smtClean="0"/>
-              <a:t>2/18/2022</a:t>
+              <a:t>11/3/2022</a:t>
             </a:fld>
             <a:endParaRPr lang="en-US"/>
           </a:p>
@@ -1940,7 +1940,7 @@
           <a:p>
             <a:fld id="{3E232C92-DF21-4A04-859B-AAF8BD4EC904}" type="datetimeFigureOut">
               <a:rPr lang="en-US" smtClean="0"/>
-              <a:t>2/18/2022</a:t>
+              <a:t>11/3/2022</a:t>
             </a:fld>
             <a:endParaRPr lang="en-US"/>
           </a:p>
@@ -2138,7 +2138,7 @@
           <a:p>
             <a:fld id="{3E232C92-DF21-4A04-859B-AAF8BD4EC904}" type="datetimeFigureOut">
               <a:rPr lang="en-US" smtClean="0"/>
-              <a:t>2/18/2022</a:t>
+              <a:t>11/3/2022</a:t>
             </a:fld>
             <a:endParaRPr lang="en-US"/>
           </a:p>
@@ -2346,7 +2346,7 @@
           <a:p>
             <a:fld id="{3E232C92-DF21-4A04-859B-AAF8BD4EC904}" type="datetimeFigureOut">
               <a:rPr lang="en-US" smtClean="0"/>
-              <a:t>2/18/2022</a:t>
+              <a:t>11/3/2022</a:t>
             </a:fld>
             <a:endParaRPr lang="en-US"/>
           </a:p>
@@ -3288,7 +3288,7 @@
           <a:p>
             <a:fld id="{23F303CC-BC6F-44EE-9A09-81F690F71D2E}" type="datetime1">
               <a:rPr lang="en-US" altLang="en-US" smtClean="0"/>
-              <a:t>2/18/2022</a:t>
+              <a:t>11/3/2022</a:t>
             </a:fld>
             <a:endParaRPr lang="en-US" altLang="en-US" dirty="0"/>
           </a:p>
@@ -7110,7 +7110,7 @@
           <a:p>
             <a:fld id="{3E232C92-DF21-4A04-859B-AAF8BD4EC904}" type="datetimeFigureOut">
               <a:rPr lang="en-US" smtClean="0"/>
-              <a:t>2/18/2022</a:t>
+              <a:t>11/3/2022</a:t>
             </a:fld>
             <a:endParaRPr lang="en-US"/>
           </a:p>
@@ -8126,7 +8126,7 @@
           <a:p>
             <a:fld id="{3E232C92-DF21-4A04-859B-AAF8BD4EC904}" type="datetimeFigureOut">
               <a:rPr lang="en-US" smtClean="0"/>
-              <a:t>2/18/2022</a:t>
+              <a:t>11/3/2022</a:t>
             </a:fld>
             <a:endParaRPr lang="en-US"/>
           </a:p>
@@ -8401,7 +8401,7 @@
           <a:p>
             <a:fld id="{3E232C92-DF21-4A04-859B-AAF8BD4EC904}" type="datetimeFigureOut">
               <a:rPr lang="en-US" smtClean="0"/>
-              <a:t>2/18/2022</a:t>
+              <a:t>11/3/2022</a:t>
             </a:fld>
             <a:endParaRPr lang="en-US"/>
           </a:p>
@@ -8666,7 +8666,7 @@
           <a:p>
             <a:fld id="{3E232C92-DF21-4A04-859B-AAF8BD4EC904}" type="datetimeFigureOut">
               <a:rPr lang="en-US" smtClean="0"/>
-              <a:t>2/18/2022</a:t>
+              <a:t>11/3/2022</a:t>
             </a:fld>
             <a:endParaRPr lang="en-US"/>
           </a:p>
@@ -9078,7 +9078,7 @@
           <a:p>
             <a:fld id="{3E232C92-DF21-4A04-859B-AAF8BD4EC904}" type="datetimeFigureOut">
               <a:rPr lang="en-US" smtClean="0"/>
-              <a:t>2/18/2022</a:t>
+              <a:t>11/3/2022</a:t>
             </a:fld>
             <a:endParaRPr lang="en-US"/>
           </a:p>
@@ -9219,7 +9219,7 @@
           <a:p>
             <a:fld id="{3E232C92-DF21-4A04-859B-AAF8BD4EC904}" type="datetimeFigureOut">
               <a:rPr lang="en-US" smtClean="0"/>
-              <a:t>2/18/2022</a:t>
+              <a:t>11/3/2022</a:t>
             </a:fld>
             <a:endParaRPr lang="en-US"/>
           </a:p>
@@ -9332,7 +9332,7 @@
           <a:p>
             <a:fld id="{3E232C92-DF21-4A04-859B-AAF8BD4EC904}" type="datetimeFigureOut">
               <a:rPr lang="en-US" smtClean="0"/>
-              <a:t>2/18/2022</a:t>
+              <a:t>11/3/2022</a:t>
             </a:fld>
             <a:endParaRPr lang="en-US"/>
           </a:p>
@@ -9643,7 +9643,7 @@
           <a:p>
             <a:fld id="{3E232C92-DF21-4A04-859B-AAF8BD4EC904}" type="datetimeFigureOut">
               <a:rPr lang="en-US" smtClean="0"/>
-              <a:t>2/18/2022</a:t>
+              <a:t>11/3/2022</a:t>
             </a:fld>
             <a:endParaRPr lang="en-US"/>
           </a:p>
@@ -9931,7 +9931,7 @@
           <a:p>
             <a:fld id="{3E232C92-DF21-4A04-859B-AAF8BD4EC904}" type="datetimeFigureOut">
               <a:rPr lang="en-US" smtClean="0"/>
-              <a:t>2/18/2022</a:t>
+              <a:t>11/3/2022</a:t>
             </a:fld>
             <a:endParaRPr lang="en-US"/>
           </a:p>
@@ -10172,7 +10172,7 @@
           <a:p>
             <a:fld id="{3E232C92-DF21-4A04-859B-AAF8BD4EC904}" type="datetimeFigureOut">
               <a:rPr lang="en-US" smtClean="0"/>
-              <a:t>2/18/2022</a:t>
+              <a:t>11/3/2022</a:t>
             </a:fld>
             <a:endParaRPr lang="en-US"/>
           </a:p>
@@ -10798,7 +10798,7 @@
           <a:p>
             <a:fld id="{7CE3BD8C-C39F-4FFF-9CD5-05E4806DBFF3}" type="datetime1">
               <a:rPr lang="en-US" altLang="en-US" smtClean="0"/>
-              <a:t>2/18/2022</a:t>
+              <a:t>11/3/2022</a:t>
             </a:fld>
             <a:endParaRPr lang="en-US" altLang="en-US"/>
           </a:p>
@@ -24270,7 +24270,7 @@
         <p:spPr>
           <a:xfrm>
             <a:off x="1368638" y="3121037"/>
-            <a:ext cx="2162408" cy="584775"/>
+            <a:ext cx="2162408" cy="338554"/>
           </a:xfrm>
           <a:prstGeom prst="rect">
             <a:avLst/>
@@ -24300,9 +24300,38 @@
                 <a:latin typeface="Arial"/>
                 <a:ea typeface="ヒラギノ角ゴ Pro W3" pitchFamily="-126" charset="-128"/>
               </a:rPr>
-              <a:t>Client</a:t>
-            </a:r>
-          </a:p>
+              <a:t>Provider</a:t>
+            </a:r>
+          </a:p>
+        </p:txBody>
+      </p:sp>
+      <p:sp>
+        <p:nvSpPr>
+          <p:cNvPr id="10" name="TextBox 9">
+            <a:extLst>
+              <a:ext uri="{FF2B5EF4-FFF2-40B4-BE49-F238E27FC236}">
+                <a16:creationId xmlns:a16="http://schemas.microsoft.com/office/drawing/2014/main" id="{984AE2E2-20A9-4B44-A58D-4BBB1DF61213}"/>
+              </a:ext>
+            </a:extLst>
+          </p:cNvPr>
+          <p:cNvSpPr txBox="1"/>
+          <p:nvPr/>
+        </p:nvSpPr>
+        <p:spPr>
+          <a:xfrm>
+            <a:off x="8076248" y="3100638"/>
+            <a:ext cx="2115679" cy="338554"/>
+          </a:xfrm>
+          <a:prstGeom prst="rect">
+            <a:avLst/>
+          </a:prstGeom>
+          <a:noFill/>
+        </p:spPr>
+        <p:txBody>
+          <a:bodyPr wrap="square" rtlCol="0">
+            <a:spAutoFit/>
+          </a:bodyPr>
+          <a:lstStyle/>
           <a:p>
             <a:pPr algn="ctr" defTabSz="609585" fontAlgn="base">
               <a:spcBef>
@@ -24316,87 +24345,14 @@
             <a:r>
               <a:rPr lang="en-US" sz="1600" b="1" dirty="0">
                 <a:solidFill>
-                  <a:srgbClr val="C00000"/>
+                  <a:srgbClr val="F79646">
+                    <a:lumMod val="50000"/>
+                  </a:srgbClr>
                 </a:solidFill>
                 <a:latin typeface="Arial"/>
                 <a:ea typeface="ヒラギノ角ゴ Pro W3" pitchFamily="-126" charset="-128"/>
               </a:rPr>
-              <a:t>(Provider)</a:t>
-            </a:r>
-          </a:p>
-        </p:txBody>
-      </p:sp>
-      <p:sp>
-        <p:nvSpPr>
-          <p:cNvPr id="10" name="TextBox 9">
-            <a:extLst>
-              <a:ext uri="{FF2B5EF4-FFF2-40B4-BE49-F238E27FC236}">
-                <a16:creationId xmlns:a16="http://schemas.microsoft.com/office/drawing/2014/main" id="{984AE2E2-20A9-4B44-A58D-4BBB1DF61213}"/>
-              </a:ext>
-            </a:extLst>
-          </p:cNvPr>
-          <p:cNvSpPr txBox="1"/>
-          <p:nvPr/>
-        </p:nvSpPr>
-        <p:spPr>
-          <a:xfrm>
-            <a:off x="8076248" y="3100638"/>
-            <a:ext cx="2115679" cy="584775"/>
-          </a:xfrm>
-          <a:prstGeom prst="rect">
-            <a:avLst/>
-          </a:prstGeom>
-          <a:noFill/>
-        </p:spPr>
-        <p:txBody>
-          <a:bodyPr wrap="square" rtlCol="0">
-            <a:spAutoFit/>
-          </a:bodyPr>
-          <a:lstStyle/>
-          <a:p>
-            <a:pPr algn="ctr" defTabSz="609585" fontAlgn="base">
-              <a:spcBef>
-                <a:spcPct val="0"/>
-              </a:spcBef>
-              <a:spcAft>
-                <a:spcPct val="0"/>
-              </a:spcAft>
-              <a:defRPr/>
-            </a:pPr>
-            <a:r>
-              <a:rPr lang="en-US" sz="1600" b="1" dirty="0">
-                <a:solidFill>
-                  <a:srgbClr val="F79646">
-                    <a:lumMod val="50000"/>
-                  </a:srgbClr>
-                </a:solidFill>
-                <a:latin typeface="Arial"/>
-                <a:ea typeface="ヒラギノ角ゴ Pro W3" pitchFamily="-126" charset="-128"/>
-              </a:rPr>
-              <a:t>Server</a:t>
-            </a:r>
-          </a:p>
-          <a:p>
-            <a:pPr algn="ctr" defTabSz="609585" fontAlgn="base">
-              <a:spcBef>
-                <a:spcPct val="0"/>
-              </a:spcBef>
-              <a:spcAft>
-                <a:spcPct val="0"/>
-              </a:spcAft>
-              <a:defRPr/>
-            </a:pPr>
-            <a:r>
-              <a:rPr lang="en-US" sz="1600" b="1" dirty="0">
-                <a:solidFill>
-                  <a:srgbClr val="F79646">
-                    <a:lumMod val="50000"/>
-                  </a:srgbClr>
-                </a:solidFill>
-                <a:latin typeface="Arial"/>
-                <a:ea typeface="ヒラギノ角ゴ Pro W3" pitchFamily="-126" charset="-128"/>
-              </a:rPr>
-              <a:t>(Payer)</a:t>
+              <a:t>Payer</a:t>
             </a:r>
           </a:p>
         </p:txBody>
@@ -24546,7 +24502,7 @@
                   <a:schemeClr val="tx1"/>
                 </a:solidFill>
               </a:rPr>
-              <a:t>$report</a:t>
+              <a:t>$cc-gaps</a:t>
             </a:r>
           </a:p>
         </p:txBody>
@@ -24686,6 +24642,13 @@
           <a:bodyPr/>
           <a:lstStyle/>
           <a:p>
+            <a:pPr marL="0" indent="0">
+              <a:buNone/>
+            </a:pPr>
+            <a:r>
+              <a:rPr lang="en-US"/>
+              <a:t> </a:t>
+            </a:r>
             <a:endParaRPr lang="en-US" dirty="0"/>
           </a:p>
         </p:txBody>
@@ -24841,7 +24804,7 @@
         <p:spPr>
           <a:xfrm>
             <a:off x="2420000" y="4210866"/>
-            <a:ext cx="1415320" cy="584775"/>
+            <a:ext cx="1415320" cy="338554"/>
           </a:xfrm>
           <a:prstGeom prst="rect">
             <a:avLst/>
@@ -24871,9 +24834,207 @@
                 <a:latin typeface="Arial"/>
                 <a:ea typeface="ヒラギノ角ゴ Pro W3" pitchFamily="-126" charset="-128"/>
               </a:rPr>
-              <a:t>Client</a:t>
-            </a:r>
-          </a:p>
+              <a:t>Payer</a:t>
+            </a:r>
+          </a:p>
+        </p:txBody>
+      </p:sp>
+      <p:sp>
+        <p:nvSpPr>
+          <p:cNvPr id="9" name="Arrow: U-Turn 8">
+            <a:extLst>
+              <a:ext uri="{FF2B5EF4-FFF2-40B4-BE49-F238E27FC236}">
+                <a16:creationId xmlns:a16="http://schemas.microsoft.com/office/drawing/2014/main" id="{09BF3D1E-B047-45D0-A4AE-6BACE7A28B3F}"/>
+              </a:ext>
+            </a:extLst>
+          </p:cNvPr>
+          <p:cNvSpPr/>
+          <p:nvPr/>
+        </p:nvSpPr>
+        <p:spPr>
+          <a:xfrm rot="10800000" flipH="1" flipV="1">
+            <a:off x="4088513" y="2705171"/>
+            <a:ext cx="4572963" cy="1202435"/>
+          </a:xfrm>
+          <a:prstGeom prst="uturnArrow">
+            <a:avLst>
+              <a:gd name="adj1" fmla="val 25000"/>
+              <a:gd name="adj2" fmla="val 25000"/>
+              <a:gd name="adj3" fmla="val 28042"/>
+              <a:gd name="adj4" fmla="val 43750"/>
+              <a:gd name="adj5" fmla="val 75000"/>
+            </a:avLst>
+          </a:prstGeom>
+        </p:spPr>
+        <p:style>
+          <a:lnRef idx="1">
+            <a:schemeClr val="accent1"/>
+          </a:lnRef>
+          <a:fillRef idx="3">
+            <a:schemeClr val="accent1"/>
+          </a:fillRef>
+          <a:effectRef idx="2">
+            <a:schemeClr val="accent1"/>
+          </a:effectRef>
+          <a:fontRef idx="minor">
+            <a:schemeClr val="lt1"/>
+          </a:fontRef>
+        </p:style>
+        <p:txBody>
+          <a:bodyPr rtlCol="0" anchor="ctr"/>
+          <a:lstStyle/>
+          <a:p>
+            <a:pPr algn="ctr"/>
+            <a:endParaRPr lang="en-US">
+              <a:solidFill>
+                <a:schemeClr val="tx1"/>
+              </a:solidFill>
+            </a:endParaRPr>
+          </a:p>
+        </p:txBody>
+      </p:sp>
+      <p:sp>
+        <p:nvSpPr>
+          <p:cNvPr id="11" name="Rectangle 10">
+            <a:extLst>
+              <a:ext uri="{FF2B5EF4-FFF2-40B4-BE49-F238E27FC236}">
+                <a16:creationId xmlns:a16="http://schemas.microsoft.com/office/drawing/2014/main" id="{9207507E-29D8-4D70-850B-8907BCFB4B71}"/>
+              </a:ext>
+            </a:extLst>
+          </p:cNvPr>
+          <p:cNvSpPr/>
+          <p:nvPr/>
+        </p:nvSpPr>
+        <p:spPr>
+          <a:xfrm>
+            <a:off x="5299671" y="2376094"/>
+            <a:ext cx="2021142" cy="658153"/>
+          </a:xfrm>
+          <a:prstGeom prst="rect">
+            <a:avLst/>
+          </a:prstGeom>
+          <a:solidFill>
+            <a:schemeClr val="bg1"/>
+          </a:solidFill>
+        </p:spPr>
+        <p:style>
+          <a:lnRef idx="1">
+            <a:schemeClr val="accent1"/>
+          </a:lnRef>
+          <a:fillRef idx="3">
+            <a:schemeClr val="accent1"/>
+          </a:fillRef>
+          <a:effectRef idx="2">
+            <a:schemeClr val="accent1"/>
+          </a:effectRef>
+          <a:fontRef idx="minor">
+            <a:schemeClr val="lt1"/>
+          </a:fontRef>
+        </p:style>
+        <p:txBody>
+          <a:bodyPr rtlCol="0" anchor="ctr"/>
+          <a:lstStyle/>
+          <a:p>
+            <a:pPr algn="ctr"/>
+            <a:r>
+              <a:rPr lang="en-US" sz="1400" b="1" dirty="0">
+                <a:solidFill>
+                  <a:schemeClr val="tx1"/>
+                </a:solidFill>
+                <a:latin typeface="Arial" panose="020B0604020202020204" pitchFamily="34" charset="0"/>
+                <a:cs typeface="Arial" panose="020B0604020202020204" pitchFamily="34" charset="0"/>
+              </a:rPr>
+              <a:t>POST</a:t>
+            </a:r>
+          </a:p>
+          <a:p>
+            <a:pPr algn="ctr"/>
+            <a:r>
+              <a:rPr lang="en-US" sz="1400" b="1" dirty="0">
+                <a:solidFill>
+                  <a:schemeClr val="tx1"/>
+                </a:solidFill>
+                <a:latin typeface="Arial" panose="020B0604020202020204" pitchFamily="34" charset="0"/>
+                <a:cs typeface="Arial" panose="020B0604020202020204" pitchFamily="34" charset="0"/>
+              </a:rPr>
+              <a:t>Risk Adjustment Coding Gap Reports</a:t>
+            </a:r>
+          </a:p>
+        </p:txBody>
+      </p:sp>
+      <p:cxnSp>
+        <p:nvCxnSpPr>
+          <p:cNvPr id="12" name="Connector: Elbow 11">
+            <a:extLst>
+              <a:ext uri="{FF2B5EF4-FFF2-40B4-BE49-F238E27FC236}">
+                <a16:creationId xmlns:a16="http://schemas.microsoft.com/office/drawing/2014/main" id="{C5FA8C8A-D977-43D9-B0D0-73A6E6DE717A}"/>
+              </a:ext>
+            </a:extLst>
+          </p:cNvPr>
+          <p:cNvCxnSpPr>
+            <a:cxnSpLocks/>
+            <a:stCxn id="7" idx="3"/>
+            <a:endCxn id="7" idx="2"/>
+          </p:cNvCxnSpPr>
+          <p:nvPr/>
+        </p:nvCxnSpPr>
+        <p:spPr>
+          <a:xfrm flipH="1">
+            <a:off x="4288721" y="4477058"/>
+            <a:ext cx="407062" cy="449910"/>
+          </a:xfrm>
+          <a:prstGeom prst="bentConnector4">
+            <a:avLst>
+              <a:gd name="adj1" fmla="val -464993"/>
+              <a:gd name="adj2" fmla="val 150810"/>
+            </a:avLst>
+          </a:prstGeom>
+          <a:ln>
+            <a:tailEnd type="triangle"/>
+          </a:ln>
+        </p:spPr>
+        <p:style>
+          <a:lnRef idx="2">
+            <a:schemeClr val="accent1"/>
+          </a:lnRef>
+          <a:fillRef idx="0">
+            <a:schemeClr val="accent1"/>
+          </a:fillRef>
+          <a:effectRef idx="1">
+            <a:schemeClr val="accent1"/>
+          </a:effectRef>
+          <a:fontRef idx="minor">
+            <a:schemeClr val="tx1"/>
+          </a:fontRef>
+        </p:style>
+      </p:cxnSp>
+      <p:sp>
+        <p:nvSpPr>
+          <p:cNvPr id="13" name="TextBox 12">
+            <a:extLst>
+              <a:ext uri="{FF2B5EF4-FFF2-40B4-BE49-F238E27FC236}">
+                <a16:creationId xmlns:a16="http://schemas.microsoft.com/office/drawing/2014/main" id="{E0AE934C-A70B-4BB7-A14B-50CF63C83613}"/>
+              </a:ext>
+            </a:extLst>
+          </p:cNvPr>
+          <p:cNvSpPr txBox="1"/>
+          <p:nvPr/>
+        </p:nvSpPr>
+        <p:spPr>
+          <a:xfrm>
+            <a:off x="8661476" y="4236682"/>
+            <a:ext cx="1160049" cy="338554"/>
+          </a:xfrm>
+          <a:prstGeom prst="rect">
+            <a:avLst/>
+          </a:prstGeom>
+          <a:noFill/>
+        </p:spPr>
+        <p:txBody>
+          <a:bodyPr wrap="square" rtlCol="0">
+            <a:spAutoFit/>
+          </a:bodyPr>
+          <a:lstStyle/>
           <a:p>
             <a:pPr algn="ctr" defTabSz="609585" fontAlgn="base">
               <a:spcBef>
@@ -24887,22 +25048,24 @@
             <a:r>
               <a:rPr lang="en-US" sz="1600" b="1" dirty="0">
                 <a:solidFill>
-                  <a:srgbClr val="C00000"/>
+                  <a:srgbClr val="F79646">
+                    <a:lumMod val="50000"/>
+                  </a:srgbClr>
                 </a:solidFill>
                 <a:latin typeface="Arial"/>
                 <a:ea typeface="ヒラギノ角ゴ Pro W3" pitchFamily="-126" charset="-128"/>
               </a:rPr>
-              <a:t>(Payer)</a:t>
-            </a:r>
-          </a:p>
-        </p:txBody>
-      </p:sp>
-      <p:sp>
-        <p:nvSpPr>
-          <p:cNvPr id="9" name="Arrow: U-Turn 8">
-            <a:extLst>
-              <a:ext uri="{FF2B5EF4-FFF2-40B4-BE49-F238E27FC236}">
-                <a16:creationId xmlns:a16="http://schemas.microsoft.com/office/drawing/2014/main" id="{09BF3D1E-B047-45D0-A4AE-6BACE7A28B3F}"/>
+              <a:t>Providers</a:t>
+            </a:r>
+          </a:p>
+        </p:txBody>
+      </p:sp>
+      <p:sp>
+        <p:nvSpPr>
+          <p:cNvPr id="20" name="Rectangle 19">
+            <a:extLst>
+              <a:ext uri="{FF2B5EF4-FFF2-40B4-BE49-F238E27FC236}">
+                <a16:creationId xmlns:a16="http://schemas.microsoft.com/office/drawing/2014/main" id="{4706AF83-B445-422F-9E0C-6983926A1C70}"/>
               </a:ext>
             </a:extLst>
           </p:cNvPr>
@@ -24910,63 +25073,9 @@
           <p:nvPr/>
         </p:nvSpPr>
         <p:spPr>
-          <a:xfrm rot="10800000" flipH="1" flipV="1">
-            <a:off x="4088513" y="2705171"/>
-            <a:ext cx="4572963" cy="1202435"/>
-          </a:xfrm>
-          <a:prstGeom prst="uturnArrow">
-            <a:avLst>
-              <a:gd name="adj1" fmla="val 25000"/>
-              <a:gd name="adj2" fmla="val 25000"/>
-              <a:gd name="adj3" fmla="val 28042"/>
-              <a:gd name="adj4" fmla="val 43750"/>
-              <a:gd name="adj5" fmla="val 75000"/>
-            </a:avLst>
-          </a:prstGeom>
-        </p:spPr>
-        <p:style>
-          <a:lnRef idx="1">
-            <a:schemeClr val="accent1"/>
-          </a:lnRef>
-          <a:fillRef idx="3">
-            <a:schemeClr val="accent1"/>
-          </a:fillRef>
-          <a:effectRef idx="2">
-            <a:schemeClr val="accent1"/>
-          </a:effectRef>
-          <a:fontRef idx="minor">
-            <a:schemeClr val="lt1"/>
-          </a:fontRef>
-        </p:style>
-        <p:txBody>
-          <a:bodyPr rtlCol="0" anchor="ctr"/>
-          <a:lstStyle/>
-          <a:p>
-            <a:pPr algn="ctr"/>
-            <a:endParaRPr lang="en-US">
-              <a:solidFill>
-                <a:schemeClr val="tx1"/>
-              </a:solidFill>
-            </a:endParaRPr>
-          </a:p>
-        </p:txBody>
-      </p:sp>
-      <p:sp>
-        <p:nvSpPr>
-          <p:cNvPr id="11" name="Rectangle 10">
-            <a:extLst>
-              <a:ext uri="{FF2B5EF4-FFF2-40B4-BE49-F238E27FC236}">
-                <a16:creationId xmlns:a16="http://schemas.microsoft.com/office/drawing/2014/main" id="{9207507E-29D8-4D70-850B-8907BCFB4B71}"/>
-              </a:ext>
-            </a:extLst>
-          </p:cNvPr>
-          <p:cNvSpPr/>
-          <p:nvPr/>
-        </p:nvSpPr>
-        <p:spPr>
-          <a:xfrm>
-            <a:off x="5299671" y="2376094"/>
-            <a:ext cx="2021142" cy="658153"/>
+          <a:xfrm>
+            <a:off x="5024416" y="4220102"/>
+            <a:ext cx="1216325" cy="440049"/>
           </a:xfrm>
           <a:prstGeom prst="rect">
             <a:avLst/>
@@ -24995,250 +25104,12 @@
           <a:p>
             <a:pPr algn="ctr"/>
             <a:r>
-              <a:rPr lang="en-US" sz="1400" b="1" dirty="0">
+              <a:rPr lang="en-US" sz="1600" b="1" dirty="0">
                 <a:solidFill>
                   <a:schemeClr val="tx1"/>
                 </a:solidFill>
-                <a:latin typeface="Arial" panose="020B0604020202020204" pitchFamily="34" charset="0"/>
-                <a:cs typeface="Arial" panose="020B0604020202020204" pitchFamily="34" charset="0"/>
               </a:rPr>
-              <a:t>POST</a:t>
-            </a:r>
-          </a:p>
-          <a:p>
-            <a:pPr algn="ctr"/>
-            <a:r>
-              <a:rPr lang="en-US" sz="1400" b="1" dirty="0">
-                <a:solidFill>
-                  <a:schemeClr val="tx1"/>
-                </a:solidFill>
-                <a:latin typeface="Arial" panose="020B0604020202020204" pitchFamily="34" charset="0"/>
-                <a:cs typeface="Arial" panose="020B0604020202020204" pitchFamily="34" charset="0"/>
-              </a:rPr>
-              <a:t>Risk Adjustment Coding Gap Reports</a:t>
-            </a:r>
-          </a:p>
-        </p:txBody>
-      </p:sp>
-      <p:cxnSp>
-        <p:nvCxnSpPr>
-          <p:cNvPr id="12" name="Connector: Elbow 11">
-            <a:extLst>
-              <a:ext uri="{FF2B5EF4-FFF2-40B4-BE49-F238E27FC236}">
-                <a16:creationId xmlns:a16="http://schemas.microsoft.com/office/drawing/2014/main" id="{C5FA8C8A-D977-43D9-B0D0-73A6E6DE717A}"/>
-              </a:ext>
-            </a:extLst>
-          </p:cNvPr>
-          <p:cNvCxnSpPr>
-            <a:cxnSpLocks/>
-            <a:stCxn id="7" idx="3"/>
-            <a:endCxn id="7" idx="2"/>
-          </p:cNvCxnSpPr>
-          <p:nvPr/>
-        </p:nvCxnSpPr>
-        <p:spPr>
-          <a:xfrm flipH="1">
-            <a:off x="4288721" y="4477058"/>
-            <a:ext cx="407062" cy="449910"/>
-          </a:xfrm>
-          <a:prstGeom prst="bentConnector4">
-            <a:avLst>
-              <a:gd name="adj1" fmla="val -464993"/>
-              <a:gd name="adj2" fmla="val 150810"/>
-            </a:avLst>
-          </a:prstGeom>
-          <a:ln>
-            <a:tailEnd type="triangle"/>
-          </a:ln>
-        </p:spPr>
-        <p:style>
-          <a:lnRef idx="2">
-            <a:schemeClr val="accent1"/>
-          </a:lnRef>
-          <a:fillRef idx="0">
-            <a:schemeClr val="accent1"/>
-          </a:fillRef>
-          <a:effectRef idx="1">
-            <a:schemeClr val="accent1"/>
-          </a:effectRef>
-          <a:fontRef idx="minor">
-            <a:schemeClr val="tx1"/>
-          </a:fontRef>
-        </p:style>
-      </p:cxnSp>
-      <p:sp>
-        <p:nvSpPr>
-          <p:cNvPr id="13" name="TextBox 12">
-            <a:extLst>
-              <a:ext uri="{FF2B5EF4-FFF2-40B4-BE49-F238E27FC236}">
-                <a16:creationId xmlns:a16="http://schemas.microsoft.com/office/drawing/2014/main" id="{E0AE934C-A70B-4BB7-A14B-50CF63C83613}"/>
-              </a:ext>
-            </a:extLst>
-          </p:cNvPr>
-          <p:cNvSpPr txBox="1"/>
-          <p:nvPr/>
-        </p:nvSpPr>
-        <p:spPr>
-          <a:xfrm>
-            <a:off x="8661476" y="4236682"/>
-            <a:ext cx="1160049" cy="338554"/>
-          </a:xfrm>
-          <a:prstGeom prst="rect">
-            <a:avLst/>
-          </a:prstGeom>
-          <a:noFill/>
-        </p:spPr>
-        <p:txBody>
-          <a:bodyPr wrap="square" rtlCol="0">
-            <a:spAutoFit/>
-          </a:bodyPr>
-          <a:lstStyle/>
-          <a:p>
-            <a:pPr algn="ctr" defTabSz="609585" fontAlgn="base">
-              <a:spcBef>
-                <a:spcPct val="0"/>
-              </a:spcBef>
-              <a:spcAft>
-                <a:spcPct val="0"/>
-              </a:spcAft>
-              <a:defRPr/>
-            </a:pPr>
-            <a:r>
-              <a:rPr lang="en-US" sz="1600" b="1" dirty="0">
-                <a:solidFill>
-                  <a:srgbClr val="F79646">
-                    <a:lumMod val="50000"/>
-                  </a:srgbClr>
-                </a:solidFill>
-                <a:latin typeface="Arial"/>
-                <a:ea typeface="ヒラギノ角ゴ Pro W3" pitchFamily="-126" charset="-128"/>
-              </a:rPr>
-              <a:t>Providers</a:t>
-            </a:r>
-          </a:p>
-        </p:txBody>
-      </p:sp>
-      <p:sp>
-        <p:nvSpPr>
-          <p:cNvPr id="20" name="Rectangle 19">
-            <a:extLst>
-              <a:ext uri="{FF2B5EF4-FFF2-40B4-BE49-F238E27FC236}">
-                <a16:creationId xmlns:a16="http://schemas.microsoft.com/office/drawing/2014/main" id="{4706AF83-B445-422F-9E0C-6983926A1C70}"/>
-              </a:ext>
-            </a:extLst>
-          </p:cNvPr>
-          <p:cNvSpPr/>
-          <p:nvPr/>
-        </p:nvSpPr>
-        <p:spPr>
-          <a:xfrm>
-            <a:off x="5024416" y="4220102"/>
-            <a:ext cx="1216325" cy="440049"/>
-          </a:xfrm>
-          <a:prstGeom prst="rect">
-            <a:avLst/>
-          </a:prstGeom>
-          <a:solidFill>
-            <a:schemeClr val="bg1"/>
-          </a:solidFill>
-        </p:spPr>
-        <p:style>
-          <a:lnRef idx="1">
-            <a:schemeClr val="accent1"/>
-          </a:lnRef>
-          <a:fillRef idx="3">
-            <a:schemeClr val="accent1"/>
-          </a:fillRef>
-          <a:effectRef idx="2">
-            <a:schemeClr val="accent1"/>
-          </a:effectRef>
-          <a:fontRef idx="minor">
-            <a:schemeClr val="lt1"/>
-          </a:fontRef>
-        </p:style>
-        <p:txBody>
-          <a:bodyPr rtlCol="0" anchor="ctr"/>
-          <a:lstStyle/>
-          <a:p>
-            <a:pPr algn="ctr"/>
-            <a:r>
-              <a:rPr lang="en-US" sz="1600" b="1" dirty="0">
-                <a:solidFill>
-                  <a:schemeClr val="tx1"/>
-                </a:solidFill>
-              </a:rPr>
-              <a:t>$report</a:t>
-            </a:r>
-          </a:p>
-        </p:txBody>
-      </p:sp>
-      <p:sp>
-        <p:nvSpPr>
-          <p:cNvPr id="14" name="TextBox 13">
-            <a:extLst>
-              <a:ext uri="{FF2B5EF4-FFF2-40B4-BE49-F238E27FC236}">
-                <a16:creationId xmlns:a16="http://schemas.microsoft.com/office/drawing/2014/main" id="{5A4A93A9-19A3-45F2-8D6B-A30B365CC0B5}"/>
-              </a:ext>
-            </a:extLst>
-          </p:cNvPr>
-          <p:cNvSpPr txBox="1"/>
-          <p:nvPr/>
-        </p:nvSpPr>
-        <p:spPr>
-          <a:xfrm>
-            <a:off x="4590566" y="5228323"/>
-            <a:ext cx="2162408" cy="584775"/>
-          </a:xfrm>
-          <a:prstGeom prst="rect">
-            <a:avLst/>
-          </a:prstGeom>
-          <a:noFill/>
-        </p:spPr>
-        <p:txBody>
-          <a:bodyPr wrap="square" rtlCol="0">
-            <a:spAutoFit/>
-          </a:bodyPr>
-          <a:lstStyle/>
-          <a:p>
-            <a:pPr algn="ctr" defTabSz="609585" fontAlgn="base">
-              <a:spcBef>
-                <a:spcPct val="0"/>
-              </a:spcBef>
-              <a:spcAft>
-                <a:spcPct val="0"/>
-              </a:spcAft>
-              <a:defRPr/>
-            </a:pPr>
-            <a:r>
-              <a:rPr lang="en-US" sz="1600" b="1" dirty="0">
-                <a:solidFill>
-                  <a:srgbClr val="C00000"/>
-                </a:solidFill>
-                <a:latin typeface="Arial"/>
-                <a:ea typeface="ヒラギノ角ゴ Pro W3" pitchFamily="-126" charset="-128"/>
-              </a:rPr>
-              <a:t>Server</a:t>
-            </a:r>
-          </a:p>
-          <a:p>
-            <a:pPr algn="ctr" defTabSz="609585" fontAlgn="base">
-              <a:spcBef>
-                <a:spcPct val="0"/>
-              </a:spcBef>
-              <a:spcAft>
-                <a:spcPct val="0"/>
-              </a:spcAft>
-              <a:defRPr/>
-            </a:pPr>
-            <a:r>
-              <a:rPr lang="en-US" sz="1600" b="1" dirty="0">
-                <a:solidFill>
-                  <a:srgbClr val="C00000"/>
-                </a:solidFill>
-                <a:latin typeface="Arial"/>
-                <a:ea typeface="ヒラギノ角ゴ Pro W3" pitchFamily="-126" charset="-128"/>
-              </a:rPr>
-              <a:t>(Payer)</a:t>
+              <a:t>$cc-gaps</a:t>
             </a:r>
           </a:p>
         </p:txBody>

</xml_diff>

<commit_message>
updates to $ra.evaluate-measure and dcc page
</commit_message>
<xml_diff>
--- a/input/images/Source/Risk Adjustment Images.pptx
+++ b/input/images/Source/Risk Adjustment Images.pptx
@@ -37641,7 +37641,10 @@
             <a:p>
               <a:pPr algn="ctr"/>
               <a:r>
-                <a:rPr lang="en-US" sz="2400" dirty="0"/>
+                <a:rPr lang="en-US" sz="2400" dirty="0">
+                  <a:latin typeface="Arial" panose="020B0604020202020204" pitchFamily="34" charset="0"/>
+                  <a:cs typeface="Arial" panose="020B0604020202020204" pitchFamily="34" charset="0"/>
+                </a:rPr>
                 <a:t>HCC 189 Initial Population</a:t>
               </a:r>
             </a:p>
@@ -37860,7 +37863,7 @@
         <p:spPr>
           <a:xfrm>
             <a:off x="1826449" y="2442350"/>
-            <a:ext cx="8581148" cy="318100"/>
+            <a:ext cx="8581148" cy="338554"/>
           </a:xfrm>
           <a:prstGeom prst="rect">
             <a:avLst/>
@@ -37875,7 +37878,7 @@
           <a:p>
             <a:pPr algn="ctr"/>
             <a:r>
-              <a:rPr lang="en-US" sz="1467" dirty="0">
+              <a:rPr lang="en-US" sz="1600" dirty="0">
                 <a:latin typeface="Arial" panose="020B0604020202020204" pitchFamily="34" charset="0"/>
                 <a:cs typeface="Arial" panose="020B0604020202020204" pitchFamily="34" charset="0"/>
               </a:rPr>
@@ -37993,7 +37996,7 @@
         <p:spPr>
           <a:xfrm>
             <a:off x="6543387" y="4050027"/>
-            <a:ext cx="4024749" cy="318100"/>
+            <a:ext cx="4024749" cy="338554"/>
           </a:xfrm>
           <a:prstGeom prst="rect">
             <a:avLst/>
@@ -38008,7 +38011,7 @@
           <a:p>
             <a:pPr algn="ctr"/>
             <a:r>
-              <a:rPr lang="en-US" sz="1467" dirty="0">
+              <a:rPr lang="en-US" sz="1600" dirty="0">
                 <a:latin typeface="Arial" panose="020B0604020202020204" pitchFamily="34" charset="0"/>
                 <a:cs typeface="Arial" panose="020B0604020202020204" pitchFamily="34" charset="0"/>
               </a:rPr>
@@ -38071,7 +38074,7 @@
         <p:spPr>
           <a:xfrm>
             <a:off x="1639955" y="3824630"/>
-            <a:ext cx="4024749" cy="543867"/>
+            <a:ext cx="4024749" cy="830997"/>
           </a:xfrm>
           <a:prstGeom prst="rect">
             <a:avLst/>
@@ -38086,7 +38089,7 @@
           <a:p>
             <a:pPr algn="ctr"/>
             <a:r>
-              <a:rPr lang="en-US" sz="1467" dirty="0">
+              <a:rPr lang="en-US" sz="1600" dirty="0">
                 <a:solidFill>
                   <a:schemeClr val="bg1"/>
                 </a:solidFill>
@@ -38099,7 +38102,7 @@
           <a:p>
             <a:pPr algn="ctr"/>
             <a:r>
-              <a:rPr lang="en-US" sz="1467" dirty="0">
+              <a:rPr lang="en-US" sz="1600" dirty="0">
                 <a:solidFill>
                   <a:schemeClr val="bg1"/>
                 </a:solidFill>
@@ -38179,7 +38182,7 @@
         <p:spPr>
           <a:xfrm>
             <a:off x="3312028" y="1151193"/>
-            <a:ext cx="5567944" cy="318100"/>
+            <a:ext cx="5567944" cy="338554"/>
           </a:xfrm>
           <a:prstGeom prst="rect">
             <a:avLst/>
@@ -38194,7 +38197,7 @@
           <a:p>
             <a:pPr algn="ctr"/>
             <a:r>
-              <a:rPr lang="en-US" sz="1467" dirty="0">
+              <a:rPr lang="en-US" sz="1600" dirty="0">
                 <a:latin typeface="Arial" panose="020B0604020202020204" pitchFamily="34" charset="0"/>
                 <a:cs typeface="Arial" panose="020B0604020202020204" pitchFamily="34" charset="0"/>
               </a:rPr>

</xml_diff>

<commit_message>
edits to the general-guidance and report generation and updated figures.
</commit_message>
<xml_diff>
--- a/input/images/Source/Risk Adjustment Images.pptx
+++ b/input/images/Source/Risk Adjustment Images.pptx
@@ -238,7 +238,7 @@
           <a:p>
             <a:fld id="{4337D45E-38B5-4093-B633-D3DDCA61416C}" type="datetimeFigureOut">
               <a:rPr lang="en-US" smtClean="0"/>
-              <a:t>3/15/2023</a:t>
+              <a:t>3/16/2023</a:t>
             </a:fld>
             <a:endParaRPr lang="en-US"/>
           </a:p>
@@ -912,6 +912,10 @@
               <a:tabLst/>
               <a:defRPr/>
             </a:pPr>
+            <a:r>
+              <a:rPr lang="en-US"/>
+              <a:t>Updated payer to Payer</a:t>
+            </a:r>
             <a:endParaRPr lang="en-US" dirty="0"/>
           </a:p>
         </p:txBody>
@@ -4114,7 +4118,7 @@
           <a:p>
             <a:fld id="{3E232C92-DF21-4A04-859B-AAF8BD4EC904}" type="datetimeFigureOut">
               <a:rPr lang="en-US" smtClean="0"/>
-              <a:t>3/15/2023</a:t>
+              <a:t>3/16/2023</a:t>
             </a:fld>
             <a:endParaRPr lang="en-US"/>
           </a:p>
@@ -4312,7 +4316,7 @@
           <a:p>
             <a:fld id="{3E232C92-DF21-4A04-859B-AAF8BD4EC904}" type="datetimeFigureOut">
               <a:rPr lang="en-US" smtClean="0"/>
-              <a:t>3/15/2023</a:t>
+              <a:t>3/16/2023</a:t>
             </a:fld>
             <a:endParaRPr lang="en-US"/>
           </a:p>
@@ -4520,7 +4524,7 @@
           <a:p>
             <a:fld id="{3E232C92-DF21-4A04-859B-AAF8BD4EC904}" type="datetimeFigureOut">
               <a:rPr lang="en-US" smtClean="0"/>
-              <a:t>3/15/2023</a:t>
+              <a:t>3/16/2023</a:t>
             </a:fld>
             <a:endParaRPr lang="en-US"/>
           </a:p>
@@ -6364,7 +6368,7 @@
           <a:p>
             <a:fld id="{23F303CC-BC6F-44EE-9A09-81F690F71D2E}" type="datetime1">
               <a:rPr lang="en-US" altLang="en-US" smtClean="0"/>
-              <a:t>3/15/2023</a:t>
+              <a:t>3/16/2023</a:t>
             </a:fld>
             <a:endParaRPr lang="en-US" altLang="en-US" dirty="0"/>
           </a:p>
@@ -9022,7 +9026,7 @@
           <a:p>
             <a:fld id="{3E232C92-DF21-4A04-859B-AAF8BD4EC904}" type="datetimeFigureOut">
               <a:rPr lang="en-US" smtClean="0"/>
-              <a:t>3/15/2023</a:t>
+              <a:t>3/16/2023</a:t>
             </a:fld>
             <a:endParaRPr lang="en-US"/>
           </a:p>
@@ -11202,7 +11206,7 @@
           <a:p>
             <a:fld id="{3E232C92-DF21-4A04-859B-AAF8BD4EC904}" type="datetimeFigureOut">
               <a:rPr lang="en-US" smtClean="0"/>
-              <a:t>3/15/2023</a:t>
+              <a:t>3/16/2023</a:t>
             </a:fld>
             <a:endParaRPr lang="en-US"/>
           </a:p>
@@ -11477,7 +11481,7 @@
           <a:p>
             <a:fld id="{3E232C92-DF21-4A04-859B-AAF8BD4EC904}" type="datetimeFigureOut">
               <a:rPr lang="en-US" smtClean="0"/>
-              <a:t>3/15/2023</a:t>
+              <a:t>3/16/2023</a:t>
             </a:fld>
             <a:endParaRPr lang="en-US"/>
           </a:p>
@@ -11742,7 +11746,7 @@
           <a:p>
             <a:fld id="{3E232C92-DF21-4A04-859B-AAF8BD4EC904}" type="datetimeFigureOut">
               <a:rPr lang="en-US" smtClean="0"/>
-              <a:t>3/15/2023</a:t>
+              <a:t>3/16/2023</a:t>
             </a:fld>
             <a:endParaRPr lang="en-US"/>
           </a:p>
@@ -12154,7 +12158,7 @@
           <a:p>
             <a:fld id="{3E232C92-DF21-4A04-859B-AAF8BD4EC904}" type="datetimeFigureOut">
               <a:rPr lang="en-US" smtClean="0"/>
-              <a:t>3/15/2023</a:t>
+              <a:t>3/16/2023</a:t>
             </a:fld>
             <a:endParaRPr lang="en-US"/>
           </a:p>
@@ -12295,7 +12299,7 @@
           <a:p>
             <a:fld id="{3E232C92-DF21-4A04-859B-AAF8BD4EC904}" type="datetimeFigureOut">
               <a:rPr lang="en-US" smtClean="0"/>
-              <a:t>3/15/2023</a:t>
+              <a:t>3/16/2023</a:t>
             </a:fld>
             <a:endParaRPr lang="en-US"/>
           </a:p>
@@ -12408,7 +12412,7 @@
           <a:p>
             <a:fld id="{3E232C92-DF21-4A04-859B-AAF8BD4EC904}" type="datetimeFigureOut">
               <a:rPr lang="en-US" smtClean="0"/>
-              <a:t>3/15/2023</a:t>
+              <a:t>3/16/2023</a:t>
             </a:fld>
             <a:endParaRPr lang="en-US"/>
           </a:p>
@@ -12719,7 +12723,7 @@
           <a:p>
             <a:fld id="{3E232C92-DF21-4A04-859B-AAF8BD4EC904}" type="datetimeFigureOut">
               <a:rPr lang="en-US" smtClean="0"/>
-              <a:t>3/15/2023</a:t>
+              <a:t>3/16/2023</a:t>
             </a:fld>
             <a:endParaRPr lang="en-US"/>
           </a:p>
@@ -13007,7 +13011,7 @@
           <a:p>
             <a:fld id="{3E232C92-DF21-4A04-859B-AAF8BD4EC904}" type="datetimeFigureOut">
               <a:rPr lang="en-US" smtClean="0"/>
-              <a:t>3/15/2023</a:t>
+              <a:t>3/16/2023</a:t>
             </a:fld>
             <a:endParaRPr lang="en-US"/>
           </a:p>
@@ -13248,7 +13252,7 @@
           <a:p>
             <a:fld id="{3E232C92-DF21-4A04-859B-AAF8BD4EC904}" type="datetimeFigureOut">
               <a:rPr lang="en-US" smtClean="0"/>
-              <a:t>3/15/2023</a:t>
+              <a:t>3/16/2023</a:t>
             </a:fld>
             <a:endParaRPr lang="en-US"/>
           </a:p>
@@ -13876,7 +13880,7 @@
           <a:p>
             <a:fld id="{7CE3BD8C-C39F-4FFF-9CD5-05E4806DBFF3}" type="datetime1">
               <a:rPr lang="en-US" altLang="en-US" smtClean="0"/>
-              <a:t>3/15/2023</a:t>
+              <a:t>3/16/2023</a:t>
             </a:fld>
             <a:endParaRPr lang="en-US" altLang="en-US"/>
           </a:p>
@@ -19571,7 +19575,7 @@
                   <a:schemeClr val="bg1"/>
                 </a:solidFill>
               </a:rPr>
-              <a:t>Annotated report posted to payer</a:t>
+              <a:t>Annotated report posted to Payer</a:t>
             </a:r>
           </a:p>
         </p:txBody>

</xml_diff>

<commit_message>
updated Figure 2.2-4 Resource Graph and assisted approach
</commit_message>
<xml_diff>
--- a/input/images/Source/Risk Adjustment Images.pptx
+++ b/input/images/Source/Risk Adjustment Images.pptx
@@ -6,7 +6,7 @@
     <p:sldMasterId id="2147483660" r:id="rId2"/>
   </p:sldMasterIdLst>
   <p:notesMasterIdLst>
-    <p:notesMasterId r:id="rId44"/>
+    <p:notesMasterId r:id="rId45"/>
   </p:notesMasterIdLst>
   <p:sldIdLst>
     <p:sldId id="256" r:id="rId3"/>
@@ -50,6 +50,7 @@
     <p:sldId id="3004" r:id="rId41"/>
     <p:sldId id="3005" r:id="rId42"/>
     <p:sldId id="2993" r:id="rId43"/>
+    <p:sldId id="3011" r:id="rId44"/>
   </p:sldIdLst>
   <p:sldSz cx="12192000" cy="6858000"/>
   <p:notesSz cx="6858000" cy="9144000"/>
@@ -2329,6 +2330,12 @@
               <a:t>Note: 1-16-2022 corrected HCC 18 from Diabetes with No Complication to Diabetes with Chronic Complication</a:t>
             </a:r>
           </a:p>
+          <a:p>
+            <a:r>
+              <a:rPr lang="en-US" dirty="0"/>
+              <a:t>3/16/2023: updated Risk Adjustment Coding Gap Report Bundle to “Bundle (searchSet)</a:t>
+            </a:r>
+          </a:p>
         </p:txBody>
       </p:sp>
       <p:sp>
@@ -3245,6 +3252,93 @@
     <p:extLst>
       <p:ext uri="{BB962C8B-B14F-4D97-AF65-F5344CB8AC3E}">
         <p14:creationId xmlns:p14="http://schemas.microsoft.com/office/powerpoint/2010/main" val="948978376"/>
+      </p:ext>
+    </p:extLst>
+  </p:cSld>
+  <p:clrMapOvr>
+    <a:masterClrMapping/>
+  </p:clrMapOvr>
+</p:notes>
+</file>
+
+<file path=ppt/notesSlides/notesSlide32.xml><?xml version="1.0" encoding="utf-8"?>
+<p:notes xmlns:a="http://schemas.openxmlformats.org/drawingml/2006/main" xmlns:r="http://schemas.openxmlformats.org/officeDocument/2006/relationships" xmlns:p="http://schemas.openxmlformats.org/presentationml/2006/main">
+  <p:cSld>
+    <p:spTree>
+      <p:nvGrpSpPr>
+        <p:cNvPr id="1" name=""/>
+        <p:cNvGrpSpPr/>
+        <p:nvPr/>
+      </p:nvGrpSpPr>
+      <p:grpSpPr>
+        <a:xfrm>
+          <a:off x="0" y="0"/>
+          <a:ext cx="0" cy="0"/>
+          <a:chOff x="0" y="0"/>
+          <a:chExt cx="0" cy="0"/>
+        </a:xfrm>
+      </p:grpSpPr>
+      <p:sp>
+        <p:nvSpPr>
+          <p:cNvPr id="2" name="Slide Image Placeholder 1"/>
+          <p:cNvSpPr>
+            <a:spLocks noGrp="1" noRot="1" noChangeAspect="1"/>
+          </p:cNvSpPr>
+          <p:nvPr>
+            <p:ph type="sldImg"/>
+          </p:nvPr>
+        </p:nvSpPr>
+        <p:spPr/>
+      </p:sp>
+      <p:sp>
+        <p:nvSpPr>
+          <p:cNvPr id="3" name="Notes Placeholder 2"/>
+          <p:cNvSpPr>
+            <a:spLocks noGrp="1"/>
+          </p:cNvSpPr>
+          <p:nvPr>
+            <p:ph type="body" idx="1"/>
+          </p:nvPr>
+        </p:nvSpPr>
+        <p:spPr/>
+        <p:txBody>
+          <a:bodyPr/>
+          <a:lstStyle/>
+          <a:p>
+            <a:r>
+              <a:rPr lang="en-US" dirty="0"/>
+              <a:t>Note: 1-16-2022 corrected HCC 18 from Diabetes with No Complication to Diabetes with Chronic Complication</a:t>
+            </a:r>
+          </a:p>
+        </p:txBody>
+      </p:sp>
+      <p:sp>
+        <p:nvSpPr>
+          <p:cNvPr id="4" name="Slide Number Placeholder 3"/>
+          <p:cNvSpPr>
+            <a:spLocks noGrp="1"/>
+          </p:cNvSpPr>
+          <p:nvPr>
+            <p:ph type="sldNum" sz="quarter" idx="5"/>
+          </p:nvPr>
+        </p:nvSpPr>
+        <p:spPr/>
+        <p:txBody>
+          <a:bodyPr/>
+          <a:lstStyle/>
+          <a:p>
+            <a:fld id="{1D553A4D-C549-44B5-B4F2-4FBA040D2BDB}" type="slidenum">
+              <a:rPr lang="en-US" smtClean="0"/>
+              <a:t>42</a:t>
+            </a:fld>
+            <a:endParaRPr lang="en-US"/>
+          </a:p>
+        </p:txBody>
+      </p:sp>
+    </p:spTree>
+    <p:extLst>
+      <p:ext uri="{BB962C8B-B14F-4D97-AF65-F5344CB8AC3E}">
+        <p14:creationId xmlns:p14="http://schemas.microsoft.com/office/powerpoint/2010/main" val="2203163658"/>
       </p:ext>
     </p:extLst>
   </p:cSld>
@@ -29607,8 +29701,50 @@
                 <a:ea typeface="+mn-ea"/>
                 <a:cs typeface="+mn-cs"/>
               </a:rPr>
-              <a:t>Risk Adjustment Coding Gap Report Bundle</a:t>
-            </a:r>
+              <a:t>Bundle</a:t>
+            </a:r>
+          </a:p>
+          <a:p>
+            <a:pPr marL="0" marR="0" lvl="0" indent="0" algn="ctr" defTabSz="914400" rtl="0" eaLnBrk="1" fontAlgn="auto" latinLnBrk="0" hangingPunct="1">
+              <a:lnSpc>
+                <a:spcPct val="100000"/>
+              </a:lnSpc>
+              <a:spcBef>
+                <a:spcPts val="0"/>
+              </a:spcBef>
+              <a:spcAft>
+                <a:spcPts val="0"/>
+              </a:spcAft>
+              <a:buClrTx/>
+              <a:buSzTx/>
+              <a:buFontTx/>
+              <a:buNone/>
+              <a:tabLst/>
+              <a:defRPr/>
+            </a:pPr>
+            <a:r>
+              <a:rPr lang="en-US" sz="1600" dirty="0">
+                <a:solidFill>
+                  <a:prstClr val="white"/>
+                </a:solidFill>
+                <a:latin typeface="Calibri" panose="020F0502020204030204"/>
+              </a:rPr>
+              <a:t>(searchSet)</a:t>
+            </a:r>
+            <a:endParaRPr kumimoji="0" lang="en-US" sz="1600" b="0" i="0" u="none" strike="noStrike" kern="1200" cap="none" spc="0" normalizeH="0" baseline="0" noProof="0" dirty="0">
+              <a:ln>
+                <a:noFill/>
+              </a:ln>
+              <a:solidFill>
+                <a:prstClr val="white"/>
+              </a:solidFill>
+              <a:effectLst/>
+              <a:uLnTx/>
+              <a:uFillTx/>
+              <a:latin typeface="Calibri" panose="020F0502020204030204"/>
+              <a:ea typeface="+mn-ea"/>
+              <a:cs typeface="+mn-cs"/>
+            </a:endParaRPr>
           </a:p>
         </p:txBody>
       </p:sp>
@@ -46234,6 +46370,3450 @@
 </p:sld>
 </file>
 
+<file path=ppt/slides/slide42.xml><?xml version="1.0" encoding="utf-8"?>
+<p:sld xmlns:a="http://schemas.openxmlformats.org/drawingml/2006/main" xmlns:r="http://schemas.openxmlformats.org/officeDocument/2006/relationships" xmlns:p="http://schemas.openxmlformats.org/presentationml/2006/main">
+  <p:cSld>
+    <p:spTree>
+      <p:nvGrpSpPr>
+        <p:cNvPr id="1" name=""/>
+        <p:cNvGrpSpPr/>
+        <p:nvPr/>
+      </p:nvGrpSpPr>
+      <p:grpSpPr>
+        <a:xfrm>
+          <a:off x="0" y="0"/>
+          <a:ext cx="0" cy="0"/>
+          <a:chOff x="0" y="0"/>
+          <a:chExt cx="0" cy="0"/>
+        </a:xfrm>
+      </p:grpSpPr>
+      <p:sp>
+        <p:nvSpPr>
+          <p:cNvPr id="2" name="Footer Placeholder 1">
+            <a:extLst>
+              <a:ext uri="{FF2B5EF4-FFF2-40B4-BE49-F238E27FC236}">
+                <a16:creationId xmlns:a16="http://schemas.microsoft.com/office/drawing/2014/main" id="{67613D0C-21FF-445C-8A61-522FC6EF2821}"/>
+              </a:ext>
+            </a:extLst>
+          </p:cNvPr>
+          <p:cNvSpPr>
+            <a:spLocks noGrp="1"/>
+          </p:cNvSpPr>
+          <p:nvPr>
+            <p:ph type="ftr" sz="quarter" idx="10"/>
+          </p:nvPr>
+        </p:nvSpPr>
+        <p:spPr/>
+        <p:txBody>
+          <a:bodyPr/>
+          <a:lstStyle/>
+          <a:p>
+            <a:r>
+              <a:rPr lang="en-US" b="1"/>
+              <a:t>© 2019 Health Level Seven ® International. Licensed under Creative Commons Attribution 4.0 International</a:t>
+            </a:r>
+          </a:p>
+          <a:p>
+            <a:r>
+              <a:rPr lang="en-US" b="1"/>
+              <a:t>HL7, Health Level Seven, FHIR and the FHIR flame logo are registered trademarks of Health Level Seven International. Reg. U.S. TM Office.</a:t>
+            </a:r>
+            <a:endParaRPr lang="en-US" b="1" dirty="0"/>
+          </a:p>
+        </p:txBody>
+      </p:sp>
+      <p:sp>
+        <p:nvSpPr>
+          <p:cNvPr id="3" name="Slide Number Placeholder 2">
+            <a:extLst>
+              <a:ext uri="{FF2B5EF4-FFF2-40B4-BE49-F238E27FC236}">
+                <a16:creationId xmlns:a16="http://schemas.microsoft.com/office/drawing/2014/main" id="{885B4913-2A0A-4D07-9844-3EA1D67CFB4E}"/>
+              </a:ext>
+            </a:extLst>
+          </p:cNvPr>
+          <p:cNvSpPr>
+            <a:spLocks noGrp="1"/>
+          </p:cNvSpPr>
+          <p:nvPr>
+            <p:ph type="sldNum" sz="quarter" idx="11"/>
+          </p:nvPr>
+        </p:nvSpPr>
+        <p:spPr/>
+        <p:txBody>
+          <a:bodyPr/>
+          <a:lstStyle/>
+          <a:p>
+            <a:fld id="{6CACE926-AEF5-4BFE-8BD7-24414108CB7B}" type="slidenum">
+              <a:rPr lang="en-US" altLang="en-US" smtClean="0"/>
+              <a:pPr/>
+              <a:t>42</a:t>
+            </a:fld>
+            <a:endParaRPr lang="en-US" altLang="en-US" dirty="0"/>
+          </a:p>
+        </p:txBody>
+      </p:sp>
+      <p:sp>
+        <p:nvSpPr>
+          <p:cNvPr id="4" name="Flowchart: Process 3">
+            <a:extLst>
+              <a:ext uri="{FF2B5EF4-FFF2-40B4-BE49-F238E27FC236}">
+                <a16:creationId xmlns:a16="http://schemas.microsoft.com/office/drawing/2014/main" id="{5C516E0B-A1CD-4A5B-9084-C21C57F69DB1}"/>
+              </a:ext>
+            </a:extLst>
+          </p:cNvPr>
+          <p:cNvSpPr/>
+          <p:nvPr/>
+        </p:nvSpPr>
+        <p:spPr>
+          <a:xfrm>
+            <a:off x="3887508" y="459890"/>
+            <a:ext cx="1934738" cy="755570"/>
+          </a:xfrm>
+          <a:prstGeom prst="flowChartProcess">
+            <a:avLst/>
+          </a:prstGeom>
+          <a:ln>
+            <a:solidFill>
+              <a:schemeClr val="accent1"/>
+            </a:solidFill>
+          </a:ln>
+        </p:spPr>
+        <p:style>
+          <a:lnRef idx="2">
+            <a:schemeClr val="accent1">
+              <a:shade val="50000"/>
+            </a:schemeClr>
+          </a:lnRef>
+          <a:fillRef idx="1">
+            <a:schemeClr val="accent1"/>
+          </a:fillRef>
+          <a:effectRef idx="0">
+            <a:schemeClr val="accent1"/>
+          </a:effectRef>
+          <a:fontRef idx="minor">
+            <a:schemeClr val="lt1"/>
+          </a:fontRef>
+        </p:style>
+        <p:txBody>
+          <a:bodyPr rtlCol="0" anchor="ctr"/>
+          <a:lstStyle/>
+          <a:p>
+            <a:pPr marL="0" marR="0" lvl="0" indent="0" algn="ctr" defTabSz="914400" rtl="0" eaLnBrk="1" fontAlgn="auto" latinLnBrk="0" hangingPunct="1">
+              <a:lnSpc>
+                <a:spcPct val="100000"/>
+              </a:lnSpc>
+              <a:spcBef>
+                <a:spcPts val="0"/>
+              </a:spcBef>
+              <a:spcAft>
+                <a:spcPts val="0"/>
+              </a:spcAft>
+              <a:buClrTx/>
+              <a:buSzTx/>
+              <a:buFontTx/>
+              <a:buNone/>
+              <a:tabLst/>
+              <a:defRPr/>
+            </a:pPr>
+            <a:r>
+              <a:rPr kumimoji="0" lang="en-US" sz="1600" b="0" i="0" u="none" strike="noStrike" kern="1200" cap="none" spc="0" normalizeH="0" baseline="0" noProof="0" dirty="0">
+                <a:ln>
+                  <a:noFill/>
+                </a:ln>
+                <a:solidFill>
+                  <a:prstClr val="white"/>
+                </a:solidFill>
+                <a:effectLst/>
+                <a:uLnTx/>
+                <a:uFillTx/>
+                <a:latin typeface="Calibri" panose="020F0502020204030204"/>
+                <a:ea typeface="+mn-ea"/>
+                <a:cs typeface="+mn-cs"/>
+              </a:rPr>
+              <a:t>Risk Adjustment Model Measure</a:t>
+            </a:r>
+          </a:p>
+          <a:p>
+            <a:pPr marL="0" marR="0" lvl="0" indent="0" algn="ctr" defTabSz="914400" rtl="0" eaLnBrk="1" fontAlgn="auto" latinLnBrk="0" hangingPunct="1">
+              <a:lnSpc>
+                <a:spcPct val="100000"/>
+              </a:lnSpc>
+              <a:spcBef>
+                <a:spcPts val="0"/>
+              </a:spcBef>
+              <a:spcAft>
+                <a:spcPts val="0"/>
+              </a:spcAft>
+              <a:buClrTx/>
+              <a:buSzTx/>
+              <a:buFontTx/>
+              <a:buNone/>
+              <a:tabLst/>
+              <a:defRPr/>
+            </a:pPr>
+            <a:r>
+              <a:rPr kumimoji="0" lang="en-US" sz="1600" b="0" i="0" u="none" strike="noStrike" kern="1200" cap="none" spc="0" normalizeH="0" baseline="0" noProof="0" dirty="0">
+                <a:ln>
+                  <a:noFill/>
+                </a:ln>
+                <a:solidFill>
+                  <a:prstClr val="white"/>
+                </a:solidFill>
+                <a:effectLst/>
+                <a:uLnTx/>
+                <a:uFillTx/>
+                <a:latin typeface="Calibri" panose="020F0502020204030204"/>
+                <a:ea typeface="+mn-ea"/>
+                <a:cs typeface="+mn-cs"/>
+              </a:rPr>
+              <a:t>CMS-HCC </a:t>
+            </a:r>
+            <a:r>
+              <a:rPr lang="en-US" sz="1600" dirty="0">
+                <a:solidFill>
+                  <a:prstClr val="white"/>
+                </a:solidFill>
+                <a:latin typeface="Calibri" panose="020F0502020204030204"/>
+              </a:rPr>
+              <a:t>V</a:t>
+            </a:r>
+            <a:r>
+              <a:rPr kumimoji="0" lang="en-US" sz="1600" b="0" i="0" u="none" strike="noStrike" kern="1200" cap="none" spc="0" normalizeH="0" baseline="0" noProof="0" dirty="0">
+                <a:ln>
+                  <a:noFill/>
+                </a:ln>
+                <a:solidFill>
+                  <a:prstClr val="white"/>
+                </a:solidFill>
+                <a:effectLst/>
+                <a:uLnTx/>
+                <a:uFillTx/>
+                <a:latin typeface="Calibri" panose="020F0502020204030204"/>
+                <a:ea typeface="+mn-ea"/>
+                <a:cs typeface="+mn-cs"/>
+              </a:rPr>
+              <a:t>24</a:t>
+            </a:r>
+          </a:p>
+        </p:txBody>
+      </p:sp>
+      <p:sp>
+        <p:nvSpPr>
+          <p:cNvPr id="5" name="Flowchart: Process 4">
+            <a:extLst>
+              <a:ext uri="{FF2B5EF4-FFF2-40B4-BE49-F238E27FC236}">
+                <a16:creationId xmlns:a16="http://schemas.microsoft.com/office/drawing/2014/main" id="{2888FE2A-B8B8-4B30-85ED-07CE10E8BEAC}"/>
+              </a:ext>
+            </a:extLst>
+          </p:cNvPr>
+          <p:cNvSpPr/>
+          <p:nvPr/>
+        </p:nvSpPr>
+        <p:spPr>
+          <a:xfrm>
+            <a:off x="792540" y="459890"/>
+            <a:ext cx="1934738" cy="755570"/>
+          </a:xfrm>
+          <a:prstGeom prst="flowChartProcess">
+            <a:avLst/>
+          </a:prstGeom>
+          <a:ln>
+            <a:solidFill>
+              <a:srgbClr val="0070C0"/>
+            </a:solidFill>
+          </a:ln>
+        </p:spPr>
+        <p:style>
+          <a:lnRef idx="2">
+            <a:schemeClr val="accent1">
+              <a:shade val="50000"/>
+            </a:schemeClr>
+          </a:lnRef>
+          <a:fillRef idx="1">
+            <a:schemeClr val="accent1"/>
+          </a:fillRef>
+          <a:effectRef idx="0">
+            <a:schemeClr val="accent1"/>
+          </a:effectRef>
+          <a:fontRef idx="minor">
+            <a:schemeClr val="lt1"/>
+          </a:fontRef>
+        </p:style>
+        <p:txBody>
+          <a:bodyPr rtlCol="0" anchor="ctr"/>
+          <a:lstStyle/>
+          <a:p>
+            <a:pPr marL="0" marR="0" lvl="0" indent="0" algn="ctr" defTabSz="914400" rtl="0" eaLnBrk="1" fontAlgn="auto" latinLnBrk="0" hangingPunct="1">
+              <a:lnSpc>
+                <a:spcPct val="100000"/>
+              </a:lnSpc>
+              <a:spcBef>
+                <a:spcPts val="0"/>
+              </a:spcBef>
+              <a:spcAft>
+                <a:spcPts val="0"/>
+              </a:spcAft>
+              <a:buClrTx/>
+              <a:buSzTx/>
+              <a:buFontTx/>
+              <a:buNone/>
+              <a:tabLst/>
+              <a:defRPr/>
+            </a:pPr>
+            <a:r>
+              <a:rPr kumimoji="0" lang="en-US" sz="1600" b="0" i="0" u="none" strike="noStrike" kern="1200" cap="none" spc="0" normalizeH="0" baseline="0" noProof="0" dirty="0">
+                <a:ln>
+                  <a:noFill/>
+                </a:ln>
+                <a:solidFill>
+                  <a:prstClr val="white"/>
+                </a:solidFill>
+                <a:effectLst/>
+                <a:uLnTx/>
+                <a:uFillTx/>
+                <a:latin typeface="Calibri" panose="020F0502020204030204"/>
+                <a:ea typeface="+mn-ea"/>
+                <a:cs typeface="+mn-cs"/>
+              </a:rPr>
+              <a:t>Risk Adjustment Coding Gap Report Bundle</a:t>
+            </a:r>
+          </a:p>
+        </p:txBody>
+      </p:sp>
+      <p:sp>
+        <p:nvSpPr>
+          <p:cNvPr id="6" name="Flowchart: Process 5">
+            <a:extLst>
+              <a:ext uri="{FF2B5EF4-FFF2-40B4-BE49-F238E27FC236}">
+                <a16:creationId xmlns:a16="http://schemas.microsoft.com/office/drawing/2014/main" id="{6538187D-1CBA-4D3E-B9CF-FB1141184837}"/>
+              </a:ext>
+            </a:extLst>
+          </p:cNvPr>
+          <p:cNvSpPr/>
+          <p:nvPr/>
+        </p:nvSpPr>
+        <p:spPr>
+          <a:xfrm>
+            <a:off x="3887508" y="1722136"/>
+            <a:ext cx="1934738" cy="3459464"/>
+          </a:xfrm>
+          <a:prstGeom prst="flowChartProcess">
+            <a:avLst/>
+          </a:prstGeom>
+          <a:ln>
+            <a:solidFill>
+              <a:srgbClr val="0070C0"/>
+            </a:solidFill>
+          </a:ln>
+        </p:spPr>
+        <p:style>
+          <a:lnRef idx="2">
+            <a:schemeClr val="accent1">
+              <a:shade val="50000"/>
+            </a:schemeClr>
+          </a:lnRef>
+          <a:fillRef idx="1">
+            <a:schemeClr val="accent1"/>
+          </a:fillRef>
+          <a:effectRef idx="0">
+            <a:schemeClr val="accent1"/>
+          </a:effectRef>
+          <a:fontRef idx="minor">
+            <a:schemeClr val="lt1"/>
+          </a:fontRef>
+        </p:style>
+        <p:txBody>
+          <a:bodyPr rtlCol="0" anchor="ctr"/>
+          <a:lstStyle/>
+          <a:p>
+            <a:pPr marL="0" marR="0" lvl="0" indent="0" algn="ctr" defTabSz="914400" rtl="0" eaLnBrk="1" fontAlgn="auto" latinLnBrk="0" hangingPunct="1">
+              <a:lnSpc>
+                <a:spcPct val="100000"/>
+              </a:lnSpc>
+              <a:spcBef>
+                <a:spcPts val="0"/>
+              </a:spcBef>
+              <a:spcAft>
+                <a:spcPts val="0"/>
+              </a:spcAft>
+              <a:buClrTx/>
+              <a:buSzTx/>
+              <a:buFontTx/>
+              <a:buNone/>
+              <a:tabLst/>
+              <a:defRPr/>
+            </a:pPr>
+            <a:endParaRPr kumimoji="0" lang="en-US" sz="1600" b="0" i="0" u="none" strike="noStrike" kern="1200" cap="none" spc="0" normalizeH="0" baseline="0" noProof="0" dirty="0">
+              <a:ln>
+                <a:noFill/>
+              </a:ln>
+              <a:solidFill>
+                <a:prstClr val="white"/>
+              </a:solidFill>
+              <a:effectLst/>
+              <a:uLnTx/>
+              <a:uFillTx/>
+              <a:latin typeface="Calibri" panose="020F0502020204030204"/>
+              <a:ea typeface="+mn-ea"/>
+              <a:cs typeface="+mn-cs"/>
+            </a:endParaRPr>
+          </a:p>
+          <a:p>
+            <a:pPr marL="0" marR="0" lvl="0" indent="0" algn="ctr" defTabSz="914400" rtl="0" eaLnBrk="1" fontAlgn="auto" latinLnBrk="0" hangingPunct="1">
+              <a:lnSpc>
+                <a:spcPct val="100000"/>
+              </a:lnSpc>
+              <a:spcBef>
+                <a:spcPts val="0"/>
+              </a:spcBef>
+              <a:spcAft>
+                <a:spcPts val="0"/>
+              </a:spcAft>
+              <a:buClrTx/>
+              <a:buSzTx/>
+              <a:buFontTx/>
+              <a:buNone/>
+              <a:tabLst/>
+              <a:defRPr/>
+            </a:pPr>
+            <a:r>
+              <a:rPr kumimoji="0" lang="en-US" sz="1600" b="0" i="0" u="none" strike="noStrike" kern="1200" cap="none" spc="0" normalizeH="0" baseline="0" noProof="0" dirty="0">
+                <a:ln>
+                  <a:noFill/>
+                </a:ln>
+                <a:solidFill>
+                  <a:prstClr val="white"/>
+                </a:solidFill>
+                <a:effectLst/>
+                <a:uLnTx/>
+                <a:uFillTx/>
+                <a:latin typeface="Calibri" panose="020F0502020204030204"/>
+                <a:ea typeface="+mn-ea"/>
+                <a:cs typeface="+mn-cs"/>
+              </a:rPr>
+              <a:t>Risk Adjustment </a:t>
+            </a:r>
+            <a:endParaRPr lang="en-US" sz="1600" dirty="0">
+              <a:solidFill>
+                <a:prstClr val="white"/>
+              </a:solidFill>
+              <a:latin typeface="Calibri" panose="020F0502020204030204"/>
+            </a:endParaRPr>
+          </a:p>
+          <a:p>
+            <a:pPr marL="0" marR="0" lvl="0" indent="0" algn="ctr" defTabSz="914400" rtl="0" eaLnBrk="1" fontAlgn="auto" latinLnBrk="0" hangingPunct="1">
+              <a:lnSpc>
+                <a:spcPct val="100000"/>
+              </a:lnSpc>
+              <a:spcBef>
+                <a:spcPts val="0"/>
+              </a:spcBef>
+              <a:spcAft>
+                <a:spcPts val="0"/>
+              </a:spcAft>
+              <a:buClrTx/>
+              <a:buSzTx/>
+              <a:buFontTx/>
+              <a:buNone/>
+              <a:tabLst/>
+              <a:defRPr/>
+            </a:pPr>
+            <a:r>
+              <a:rPr kumimoji="0" lang="en-US" sz="1600" b="0" i="0" u="none" strike="noStrike" kern="1200" cap="none" spc="0" normalizeH="0" baseline="0" noProof="0" dirty="0">
+                <a:ln>
+                  <a:noFill/>
+                </a:ln>
+                <a:solidFill>
+                  <a:prstClr val="white"/>
+                </a:solidFill>
+                <a:effectLst/>
+                <a:uLnTx/>
+                <a:uFillTx/>
+                <a:latin typeface="Calibri" panose="020F0502020204030204"/>
+                <a:ea typeface="+mn-ea"/>
+                <a:cs typeface="+mn-cs"/>
+              </a:rPr>
+              <a:t>Coding Gap Report</a:t>
+            </a:r>
+          </a:p>
+          <a:p>
+            <a:pPr marL="0" marR="0" lvl="0" indent="0" algn="ctr" defTabSz="914400" rtl="0" eaLnBrk="1" fontAlgn="auto" latinLnBrk="0" hangingPunct="1">
+              <a:lnSpc>
+                <a:spcPct val="100000"/>
+              </a:lnSpc>
+              <a:spcBef>
+                <a:spcPts val="0"/>
+              </a:spcBef>
+              <a:spcAft>
+                <a:spcPts val="0"/>
+              </a:spcAft>
+              <a:buClrTx/>
+              <a:buSzTx/>
+              <a:buFontTx/>
+              <a:buNone/>
+              <a:tabLst/>
+              <a:defRPr/>
+            </a:pPr>
+            <a:endParaRPr lang="en-US" sz="1600" dirty="0">
+              <a:solidFill>
+                <a:prstClr val="white"/>
+              </a:solidFill>
+              <a:latin typeface="Calibri" panose="020F0502020204030204"/>
+            </a:endParaRPr>
+          </a:p>
+          <a:p>
+            <a:pPr marL="0" marR="0" lvl="0" indent="0" algn="ctr" defTabSz="914400" rtl="0" eaLnBrk="1" fontAlgn="auto" latinLnBrk="0" hangingPunct="1">
+              <a:lnSpc>
+                <a:spcPct val="100000"/>
+              </a:lnSpc>
+              <a:spcBef>
+                <a:spcPts val="0"/>
+              </a:spcBef>
+              <a:spcAft>
+                <a:spcPts val="0"/>
+              </a:spcAft>
+              <a:buClrTx/>
+              <a:buSzTx/>
+              <a:buFontTx/>
+              <a:buNone/>
+              <a:tabLst/>
+              <a:defRPr/>
+            </a:pPr>
+            <a:endParaRPr kumimoji="0" lang="en-US" sz="1600" b="0" i="0" u="none" strike="noStrike" kern="1200" cap="none" spc="0" normalizeH="0" baseline="0" noProof="0" dirty="0">
+              <a:ln>
+                <a:noFill/>
+              </a:ln>
+              <a:solidFill>
+                <a:prstClr val="white"/>
+              </a:solidFill>
+              <a:effectLst/>
+              <a:uLnTx/>
+              <a:uFillTx/>
+              <a:latin typeface="Calibri" panose="020F0502020204030204"/>
+              <a:ea typeface="+mn-ea"/>
+              <a:cs typeface="+mn-cs"/>
+            </a:endParaRPr>
+          </a:p>
+          <a:p>
+            <a:pPr marL="0" marR="0" lvl="0" indent="0" algn="ctr" defTabSz="914400" rtl="0" eaLnBrk="1" fontAlgn="auto" latinLnBrk="0" hangingPunct="1">
+              <a:lnSpc>
+                <a:spcPct val="100000"/>
+              </a:lnSpc>
+              <a:spcBef>
+                <a:spcPts val="0"/>
+              </a:spcBef>
+              <a:spcAft>
+                <a:spcPts val="0"/>
+              </a:spcAft>
+              <a:buClrTx/>
+              <a:buSzTx/>
+              <a:buFontTx/>
+              <a:buNone/>
+              <a:tabLst/>
+              <a:defRPr/>
+            </a:pPr>
+            <a:endParaRPr lang="en-US" sz="1600" dirty="0">
+              <a:solidFill>
+                <a:prstClr val="white"/>
+              </a:solidFill>
+              <a:latin typeface="Calibri" panose="020F0502020204030204"/>
+            </a:endParaRPr>
+          </a:p>
+          <a:p>
+            <a:pPr marL="0" marR="0" lvl="0" indent="0" algn="ctr" defTabSz="914400" rtl="0" eaLnBrk="1" fontAlgn="auto" latinLnBrk="0" hangingPunct="1">
+              <a:lnSpc>
+                <a:spcPct val="100000"/>
+              </a:lnSpc>
+              <a:spcBef>
+                <a:spcPts val="0"/>
+              </a:spcBef>
+              <a:spcAft>
+                <a:spcPts val="0"/>
+              </a:spcAft>
+              <a:buClrTx/>
+              <a:buSzTx/>
+              <a:buFontTx/>
+              <a:buNone/>
+              <a:tabLst/>
+              <a:defRPr/>
+            </a:pPr>
+            <a:endParaRPr kumimoji="0" lang="en-US" sz="1600" b="0" i="0" u="none" strike="noStrike" kern="1200" cap="none" spc="0" normalizeH="0" baseline="0" noProof="0" dirty="0">
+              <a:ln>
+                <a:noFill/>
+              </a:ln>
+              <a:solidFill>
+                <a:prstClr val="white"/>
+              </a:solidFill>
+              <a:effectLst/>
+              <a:uLnTx/>
+              <a:uFillTx/>
+              <a:latin typeface="Calibri" panose="020F0502020204030204"/>
+              <a:ea typeface="+mn-ea"/>
+              <a:cs typeface="+mn-cs"/>
+            </a:endParaRPr>
+          </a:p>
+          <a:p>
+            <a:pPr marL="0" marR="0" lvl="0" indent="0" algn="ctr" defTabSz="914400" rtl="0" eaLnBrk="1" fontAlgn="auto" latinLnBrk="0" hangingPunct="1">
+              <a:lnSpc>
+                <a:spcPct val="100000"/>
+              </a:lnSpc>
+              <a:spcBef>
+                <a:spcPts val="0"/>
+              </a:spcBef>
+              <a:spcAft>
+                <a:spcPts val="0"/>
+              </a:spcAft>
+              <a:buClrTx/>
+              <a:buSzTx/>
+              <a:buFontTx/>
+              <a:buNone/>
+              <a:tabLst/>
+              <a:defRPr/>
+            </a:pPr>
+            <a:endParaRPr lang="en-US" sz="1600" dirty="0">
+              <a:solidFill>
+                <a:prstClr val="white"/>
+              </a:solidFill>
+              <a:latin typeface="Calibri" panose="020F0502020204030204"/>
+            </a:endParaRPr>
+          </a:p>
+          <a:p>
+            <a:pPr marL="0" marR="0" lvl="0" indent="0" algn="ctr" defTabSz="914400" rtl="0" eaLnBrk="1" fontAlgn="auto" latinLnBrk="0" hangingPunct="1">
+              <a:lnSpc>
+                <a:spcPct val="100000"/>
+              </a:lnSpc>
+              <a:spcBef>
+                <a:spcPts val="0"/>
+              </a:spcBef>
+              <a:spcAft>
+                <a:spcPts val="0"/>
+              </a:spcAft>
+              <a:buClrTx/>
+              <a:buSzTx/>
+              <a:buFontTx/>
+              <a:buNone/>
+              <a:tabLst/>
+              <a:defRPr/>
+            </a:pPr>
+            <a:endParaRPr kumimoji="0" lang="en-US" sz="1600" b="0" i="0" u="none" strike="noStrike" kern="1200" cap="none" spc="0" normalizeH="0" baseline="0" noProof="0" dirty="0">
+              <a:ln>
+                <a:noFill/>
+              </a:ln>
+              <a:solidFill>
+                <a:prstClr val="white"/>
+              </a:solidFill>
+              <a:effectLst/>
+              <a:uLnTx/>
+              <a:uFillTx/>
+              <a:latin typeface="Calibri" panose="020F0502020204030204"/>
+              <a:ea typeface="+mn-ea"/>
+              <a:cs typeface="+mn-cs"/>
+            </a:endParaRPr>
+          </a:p>
+          <a:p>
+            <a:pPr marL="0" marR="0" lvl="0" indent="0" algn="ctr" defTabSz="914400" rtl="0" eaLnBrk="1" fontAlgn="auto" latinLnBrk="0" hangingPunct="1">
+              <a:lnSpc>
+                <a:spcPct val="100000"/>
+              </a:lnSpc>
+              <a:spcBef>
+                <a:spcPts val="0"/>
+              </a:spcBef>
+              <a:spcAft>
+                <a:spcPts val="0"/>
+              </a:spcAft>
+              <a:buClrTx/>
+              <a:buSzTx/>
+              <a:buFontTx/>
+              <a:buNone/>
+              <a:tabLst/>
+              <a:defRPr/>
+            </a:pPr>
+            <a:endParaRPr lang="en-US" sz="1600" dirty="0">
+              <a:solidFill>
+                <a:prstClr val="white"/>
+              </a:solidFill>
+              <a:latin typeface="Calibri" panose="020F0502020204030204"/>
+            </a:endParaRPr>
+          </a:p>
+          <a:p>
+            <a:pPr marL="0" marR="0" lvl="0" indent="0" algn="ctr" defTabSz="914400" rtl="0" eaLnBrk="1" fontAlgn="auto" latinLnBrk="0" hangingPunct="1">
+              <a:lnSpc>
+                <a:spcPct val="100000"/>
+              </a:lnSpc>
+              <a:spcBef>
+                <a:spcPts val="0"/>
+              </a:spcBef>
+              <a:spcAft>
+                <a:spcPts val="0"/>
+              </a:spcAft>
+              <a:buClrTx/>
+              <a:buSzTx/>
+              <a:buFontTx/>
+              <a:buNone/>
+              <a:tabLst/>
+              <a:defRPr/>
+            </a:pPr>
+            <a:endParaRPr kumimoji="0" lang="en-US" sz="1600" b="0" i="0" u="none" strike="noStrike" kern="1200" cap="none" spc="0" normalizeH="0" baseline="0" noProof="0" dirty="0">
+              <a:ln>
+                <a:noFill/>
+              </a:ln>
+              <a:solidFill>
+                <a:prstClr val="white"/>
+              </a:solidFill>
+              <a:effectLst/>
+              <a:uLnTx/>
+              <a:uFillTx/>
+              <a:latin typeface="Calibri" panose="020F0502020204030204"/>
+              <a:ea typeface="+mn-ea"/>
+              <a:cs typeface="+mn-cs"/>
+            </a:endParaRPr>
+          </a:p>
+          <a:p>
+            <a:pPr marL="0" marR="0" lvl="0" indent="0" algn="ctr" defTabSz="914400" rtl="0" eaLnBrk="1" fontAlgn="auto" latinLnBrk="0" hangingPunct="1">
+              <a:lnSpc>
+                <a:spcPct val="100000"/>
+              </a:lnSpc>
+              <a:spcBef>
+                <a:spcPts val="0"/>
+              </a:spcBef>
+              <a:spcAft>
+                <a:spcPts val="0"/>
+              </a:spcAft>
+              <a:buClrTx/>
+              <a:buSzTx/>
+              <a:buFontTx/>
+              <a:buNone/>
+              <a:tabLst/>
+              <a:defRPr/>
+            </a:pPr>
+            <a:endParaRPr lang="en-US" sz="1600" dirty="0">
+              <a:solidFill>
+                <a:prstClr val="white"/>
+              </a:solidFill>
+              <a:latin typeface="Calibri" panose="020F0502020204030204"/>
+            </a:endParaRPr>
+          </a:p>
+          <a:p>
+            <a:pPr marL="0" marR="0" lvl="0" indent="0" algn="ctr" defTabSz="914400" rtl="0" eaLnBrk="1" fontAlgn="auto" latinLnBrk="0" hangingPunct="1">
+              <a:lnSpc>
+                <a:spcPct val="100000"/>
+              </a:lnSpc>
+              <a:spcBef>
+                <a:spcPts val="0"/>
+              </a:spcBef>
+              <a:spcAft>
+                <a:spcPts val="0"/>
+              </a:spcAft>
+              <a:buClrTx/>
+              <a:buSzTx/>
+              <a:buFontTx/>
+              <a:buNone/>
+              <a:tabLst/>
+              <a:defRPr/>
+            </a:pPr>
+            <a:endParaRPr kumimoji="0" lang="en-US" sz="1600" b="0" i="0" u="none" strike="noStrike" kern="1200" cap="none" spc="0" normalizeH="0" baseline="0" noProof="0" dirty="0">
+              <a:ln>
+                <a:noFill/>
+              </a:ln>
+              <a:solidFill>
+                <a:prstClr val="white"/>
+              </a:solidFill>
+              <a:effectLst/>
+              <a:uLnTx/>
+              <a:uFillTx/>
+              <a:latin typeface="Calibri" panose="020F0502020204030204"/>
+              <a:ea typeface="+mn-ea"/>
+              <a:cs typeface="+mn-cs"/>
+            </a:endParaRPr>
+          </a:p>
+          <a:p>
+            <a:pPr marL="0" marR="0" lvl="0" indent="0" algn="ctr" defTabSz="914400" rtl="0" eaLnBrk="1" fontAlgn="auto" latinLnBrk="0" hangingPunct="1">
+              <a:lnSpc>
+                <a:spcPct val="100000"/>
+              </a:lnSpc>
+              <a:spcBef>
+                <a:spcPts val="0"/>
+              </a:spcBef>
+              <a:spcAft>
+                <a:spcPts val="0"/>
+              </a:spcAft>
+              <a:buClrTx/>
+              <a:buSzTx/>
+              <a:buFontTx/>
+              <a:buNone/>
+              <a:tabLst/>
+              <a:defRPr/>
+            </a:pPr>
+            <a:endParaRPr lang="en-US" sz="1600" dirty="0">
+              <a:solidFill>
+                <a:prstClr val="white"/>
+              </a:solidFill>
+              <a:latin typeface="Calibri" panose="020F0502020204030204"/>
+            </a:endParaRPr>
+          </a:p>
+          <a:p>
+            <a:pPr marL="0" marR="0" lvl="0" indent="0" algn="ctr" defTabSz="914400" rtl="0" eaLnBrk="1" fontAlgn="auto" latinLnBrk="0" hangingPunct="1">
+              <a:lnSpc>
+                <a:spcPct val="100000"/>
+              </a:lnSpc>
+              <a:spcBef>
+                <a:spcPts val="0"/>
+              </a:spcBef>
+              <a:spcAft>
+                <a:spcPts val="0"/>
+              </a:spcAft>
+              <a:buClrTx/>
+              <a:buSzTx/>
+              <a:buFontTx/>
+              <a:buNone/>
+              <a:tabLst/>
+              <a:defRPr/>
+            </a:pPr>
+            <a:endParaRPr kumimoji="0" lang="en-US" sz="1600" b="0" i="0" u="none" strike="noStrike" kern="1200" cap="none" spc="0" normalizeH="0" baseline="0" noProof="0" dirty="0">
+              <a:ln>
+                <a:noFill/>
+              </a:ln>
+              <a:solidFill>
+                <a:prstClr val="white"/>
+              </a:solidFill>
+              <a:effectLst/>
+              <a:uLnTx/>
+              <a:uFillTx/>
+              <a:latin typeface="Calibri" panose="020F0502020204030204"/>
+              <a:ea typeface="+mn-ea"/>
+              <a:cs typeface="+mn-cs"/>
+            </a:endParaRPr>
+          </a:p>
+          <a:p>
+            <a:pPr marL="0" marR="0" lvl="0" indent="0" algn="ctr" defTabSz="914400" rtl="0" eaLnBrk="1" fontAlgn="auto" latinLnBrk="0" hangingPunct="1">
+              <a:lnSpc>
+                <a:spcPct val="100000"/>
+              </a:lnSpc>
+              <a:spcBef>
+                <a:spcPts val="0"/>
+              </a:spcBef>
+              <a:spcAft>
+                <a:spcPts val="0"/>
+              </a:spcAft>
+              <a:buClrTx/>
+              <a:buSzTx/>
+              <a:buFontTx/>
+              <a:buNone/>
+              <a:tabLst/>
+              <a:defRPr/>
+            </a:pPr>
+            <a:endParaRPr kumimoji="0" lang="en-US" sz="1600" b="0" i="0" u="none" strike="noStrike" kern="1200" cap="none" spc="0" normalizeH="0" baseline="0" noProof="0" dirty="0">
+              <a:ln>
+                <a:noFill/>
+              </a:ln>
+              <a:solidFill>
+                <a:prstClr val="white"/>
+              </a:solidFill>
+              <a:effectLst/>
+              <a:uLnTx/>
+              <a:uFillTx/>
+              <a:latin typeface="Calibri" panose="020F0502020204030204"/>
+              <a:ea typeface="+mn-ea"/>
+              <a:cs typeface="+mn-cs"/>
+            </a:endParaRPr>
+          </a:p>
+        </p:txBody>
+      </p:sp>
+      <p:cxnSp>
+        <p:nvCxnSpPr>
+          <p:cNvPr id="7" name="Straight Arrow Connector 6">
+            <a:extLst>
+              <a:ext uri="{FF2B5EF4-FFF2-40B4-BE49-F238E27FC236}">
+                <a16:creationId xmlns:a16="http://schemas.microsoft.com/office/drawing/2014/main" id="{049F4E04-B597-4594-8DDB-B9B1793B9466}"/>
+              </a:ext>
+            </a:extLst>
+          </p:cNvPr>
+          <p:cNvCxnSpPr>
+            <a:cxnSpLocks/>
+            <a:stCxn id="5" idx="3"/>
+            <a:endCxn id="6" idx="0"/>
+          </p:cNvCxnSpPr>
+          <p:nvPr/>
+        </p:nvCxnSpPr>
+        <p:spPr>
+          <a:xfrm>
+            <a:off x="2727278" y="837675"/>
+            <a:ext cx="2127599" cy="884461"/>
+          </a:xfrm>
+          <a:prstGeom prst="straightConnector1">
+            <a:avLst/>
+          </a:prstGeom>
+          <a:ln w="12700">
+            <a:tailEnd type="triangle"/>
+          </a:ln>
+        </p:spPr>
+        <p:style>
+          <a:lnRef idx="1">
+            <a:schemeClr val="accent1"/>
+          </a:lnRef>
+          <a:fillRef idx="0">
+            <a:schemeClr val="accent1"/>
+          </a:fillRef>
+          <a:effectRef idx="0">
+            <a:schemeClr val="accent1"/>
+          </a:effectRef>
+          <a:fontRef idx="minor">
+            <a:schemeClr val="tx1"/>
+          </a:fontRef>
+        </p:style>
+      </p:cxnSp>
+      <p:cxnSp>
+        <p:nvCxnSpPr>
+          <p:cNvPr id="10" name="Straight Arrow Connector 9">
+            <a:extLst>
+              <a:ext uri="{FF2B5EF4-FFF2-40B4-BE49-F238E27FC236}">
+                <a16:creationId xmlns:a16="http://schemas.microsoft.com/office/drawing/2014/main" id="{43B4802E-C369-4600-9790-CE55B28A9C51}"/>
+              </a:ext>
+            </a:extLst>
+          </p:cNvPr>
+          <p:cNvCxnSpPr>
+            <a:cxnSpLocks/>
+            <a:stCxn id="6" idx="0"/>
+            <a:endCxn id="4" idx="2"/>
+          </p:cNvCxnSpPr>
+          <p:nvPr/>
+        </p:nvCxnSpPr>
+        <p:spPr>
+          <a:xfrm flipV="1">
+            <a:off x="4854877" y="1215460"/>
+            <a:ext cx="0" cy="506676"/>
+          </a:xfrm>
+          <a:prstGeom prst="straightConnector1">
+            <a:avLst/>
+          </a:prstGeom>
+          <a:ln w="12700">
+            <a:tailEnd type="triangle"/>
+          </a:ln>
+        </p:spPr>
+        <p:style>
+          <a:lnRef idx="1">
+            <a:schemeClr val="accent1"/>
+          </a:lnRef>
+          <a:fillRef idx="0">
+            <a:schemeClr val="accent1"/>
+          </a:fillRef>
+          <a:effectRef idx="0">
+            <a:schemeClr val="accent1"/>
+          </a:effectRef>
+          <a:fontRef idx="minor">
+            <a:schemeClr val="tx1"/>
+          </a:fontRef>
+        </p:style>
+      </p:cxnSp>
+      <p:sp>
+        <p:nvSpPr>
+          <p:cNvPr id="14" name="TextBox 13">
+            <a:extLst>
+              <a:ext uri="{FF2B5EF4-FFF2-40B4-BE49-F238E27FC236}">
+                <a16:creationId xmlns:a16="http://schemas.microsoft.com/office/drawing/2014/main" id="{959336AF-67D3-43CA-B96A-647BEFDE54B0}"/>
+              </a:ext>
+            </a:extLst>
+          </p:cNvPr>
+          <p:cNvSpPr txBox="1"/>
+          <p:nvPr/>
+        </p:nvSpPr>
+        <p:spPr>
+          <a:xfrm>
+            <a:off x="4574102" y="1347024"/>
+            <a:ext cx="696646" cy="246221"/>
+          </a:xfrm>
+          <a:prstGeom prst="rect">
+            <a:avLst/>
+          </a:prstGeom>
+          <a:solidFill>
+            <a:schemeClr val="bg1"/>
+          </a:solidFill>
+        </p:spPr>
+        <p:txBody>
+          <a:bodyPr wrap="square" rtlCol="0">
+            <a:spAutoFit/>
+          </a:bodyPr>
+          <a:lstStyle/>
+          <a:p>
+            <a:pPr marL="0" marR="0" lvl="0" indent="0" algn="l" defTabSz="914400" rtl="0" eaLnBrk="1" fontAlgn="auto" latinLnBrk="0" hangingPunct="1">
+              <a:lnSpc>
+                <a:spcPct val="100000"/>
+              </a:lnSpc>
+              <a:spcBef>
+                <a:spcPts val="0"/>
+              </a:spcBef>
+              <a:spcAft>
+                <a:spcPts val="0"/>
+              </a:spcAft>
+              <a:buClrTx/>
+              <a:buSzTx/>
+              <a:buFontTx/>
+              <a:buNone/>
+              <a:tabLst/>
+              <a:defRPr/>
+            </a:pPr>
+            <a:r>
+              <a:rPr kumimoji="0" lang="en-US" sz="1000" b="1" i="0" u="none" strike="noStrike" kern="1200" cap="none" spc="0" normalizeH="0" baseline="0" noProof="0" dirty="0">
+                <a:ln>
+                  <a:noFill/>
+                </a:ln>
+                <a:solidFill>
+                  <a:prstClr val="black"/>
+                </a:solidFill>
+                <a:effectLst/>
+                <a:uLnTx/>
+                <a:uFillTx/>
+                <a:latin typeface="Calibri" panose="020F0502020204030204"/>
+                <a:ea typeface="+mn-ea"/>
+                <a:cs typeface="+mn-cs"/>
+              </a:rPr>
+              <a:t>measure</a:t>
+            </a:r>
+            <a:endParaRPr kumimoji="0" lang="en-US" sz="900" b="1" i="0" u="none" strike="noStrike" kern="1200" cap="none" spc="0" normalizeH="0" baseline="0" noProof="0" dirty="0">
+              <a:ln>
+                <a:noFill/>
+              </a:ln>
+              <a:solidFill>
+                <a:prstClr val="black"/>
+              </a:solidFill>
+              <a:effectLst/>
+              <a:uLnTx/>
+              <a:uFillTx/>
+              <a:latin typeface="Calibri" panose="020F0502020204030204"/>
+              <a:ea typeface="+mn-ea"/>
+              <a:cs typeface="+mn-cs"/>
+            </a:endParaRPr>
+          </a:p>
+        </p:txBody>
+      </p:sp>
+      <p:sp>
+        <p:nvSpPr>
+          <p:cNvPr id="11" name="Flowchart: Process 10">
+            <a:extLst>
+              <a:ext uri="{FF2B5EF4-FFF2-40B4-BE49-F238E27FC236}">
+                <a16:creationId xmlns:a16="http://schemas.microsoft.com/office/drawing/2014/main" id="{B33ED533-7AF9-403A-9F59-25CBA5A9CE93}"/>
+              </a:ext>
+            </a:extLst>
+          </p:cNvPr>
+          <p:cNvSpPr/>
+          <p:nvPr/>
+        </p:nvSpPr>
+        <p:spPr>
+          <a:xfrm>
+            <a:off x="792540" y="3074083"/>
+            <a:ext cx="1934738" cy="755570"/>
+          </a:xfrm>
+          <a:prstGeom prst="flowChartProcess">
+            <a:avLst/>
+          </a:prstGeom>
+          <a:ln>
+            <a:solidFill>
+              <a:srgbClr val="0070C0"/>
+            </a:solidFill>
+          </a:ln>
+        </p:spPr>
+        <p:style>
+          <a:lnRef idx="2">
+            <a:schemeClr val="accent1">
+              <a:shade val="50000"/>
+            </a:schemeClr>
+          </a:lnRef>
+          <a:fillRef idx="1">
+            <a:schemeClr val="accent1"/>
+          </a:fillRef>
+          <a:effectRef idx="0">
+            <a:schemeClr val="accent1"/>
+          </a:effectRef>
+          <a:fontRef idx="minor">
+            <a:schemeClr val="lt1"/>
+          </a:fontRef>
+        </p:style>
+        <p:txBody>
+          <a:bodyPr rtlCol="0" anchor="ctr"/>
+          <a:lstStyle/>
+          <a:p>
+            <a:pPr marL="0" marR="0" lvl="0" indent="0" algn="ctr" defTabSz="914400" rtl="0" eaLnBrk="1" fontAlgn="auto" latinLnBrk="0" hangingPunct="1">
+              <a:lnSpc>
+                <a:spcPct val="100000"/>
+              </a:lnSpc>
+              <a:spcBef>
+                <a:spcPts val="0"/>
+              </a:spcBef>
+              <a:spcAft>
+                <a:spcPts val="0"/>
+              </a:spcAft>
+              <a:buClrTx/>
+              <a:buSzTx/>
+              <a:buFontTx/>
+              <a:buNone/>
+              <a:tabLst/>
+              <a:defRPr/>
+            </a:pPr>
+            <a:r>
+              <a:rPr kumimoji="0" lang="en-US" sz="1600" b="0" i="0" u="none" strike="noStrike" kern="1200" cap="none" spc="0" normalizeH="0" baseline="0" noProof="0" dirty="0">
+                <a:ln>
+                  <a:noFill/>
+                </a:ln>
+                <a:solidFill>
+                  <a:prstClr val="white"/>
+                </a:solidFill>
+                <a:effectLst/>
+                <a:uLnTx/>
+                <a:uFillTx/>
+                <a:latin typeface="Calibri" panose="020F0502020204030204"/>
+                <a:ea typeface="+mn-ea"/>
+                <a:cs typeface="+mn-cs"/>
+              </a:rPr>
+              <a:t>US Core Patient</a:t>
+            </a:r>
+          </a:p>
+          <a:p>
+            <a:pPr marL="0" marR="0" lvl="0" indent="0" algn="ctr" defTabSz="914400" rtl="0" eaLnBrk="1" fontAlgn="auto" latinLnBrk="0" hangingPunct="1">
+              <a:lnSpc>
+                <a:spcPct val="100000"/>
+              </a:lnSpc>
+              <a:spcBef>
+                <a:spcPts val="0"/>
+              </a:spcBef>
+              <a:spcAft>
+                <a:spcPts val="0"/>
+              </a:spcAft>
+              <a:buClrTx/>
+              <a:buSzTx/>
+              <a:buFontTx/>
+              <a:buNone/>
+              <a:tabLst/>
+              <a:defRPr/>
+            </a:pPr>
+            <a:r>
+              <a:rPr lang="en-US" sz="1200" dirty="0">
+                <a:solidFill>
+                  <a:prstClr val="white"/>
+                </a:solidFill>
+                <a:latin typeface="Calibri" panose="020F0502020204030204"/>
+              </a:rPr>
+              <a:t>Eve Everywoman</a:t>
+            </a:r>
+          </a:p>
+          <a:p>
+            <a:pPr marL="0" marR="0" lvl="0" indent="0" algn="ctr" defTabSz="914400" rtl="0" eaLnBrk="1" fontAlgn="auto" latinLnBrk="0" hangingPunct="1">
+              <a:lnSpc>
+                <a:spcPct val="100000"/>
+              </a:lnSpc>
+              <a:spcBef>
+                <a:spcPts val="0"/>
+              </a:spcBef>
+              <a:spcAft>
+                <a:spcPts val="0"/>
+              </a:spcAft>
+              <a:buClrTx/>
+              <a:buSzTx/>
+              <a:buFontTx/>
+              <a:buNone/>
+              <a:tabLst/>
+              <a:defRPr/>
+            </a:pPr>
+            <a:r>
+              <a:rPr kumimoji="0" lang="en-US" sz="1100" b="0" i="0" u="none" strike="noStrike" kern="1200" cap="none" spc="0" normalizeH="0" baseline="0" noProof="0" dirty="0">
+                <a:ln>
+                  <a:noFill/>
+                </a:ln>
+                <a:solidFill>
+                  <a:prstClr val="white"/>
+                </a:solidFill>
+                <a:effectLst/>
+                <a:uLnTx/>
+                <a:uFillTx/>
+                <a:latin typeface="Calibri" panose="020F0502020204030204"/>
+                <a:ea typeface="+mn-ea"/>
+                <a:cs typeface="+mn-cs"/>
+              </a:rPr>
+              <a:t>DOB: 01/16/1975</a:t>
+            </a:r>
+          </a:p>
+        </p:txBody>
+      </p:sp>
+      <p:cxnSp>
+        <p:nvCxnSpPr>
+          <p:cNvPr id="12" name="Straight Arrow Connector 11">
+            <a:extLst>
+              <a:ext uri="{FF2B5EF4-FFF2-40B4-BE49-F238E27FC236}">
+                <a16:creationId xmlns:a16="http://schemas.microsoft.com/office/drawing/2014/main" id="{73B34E6C-DFD9-49DE-86F3-25C6C9784F38}"/>
+              </a:ext>
+            </a:extLst>
+          </p:cNvPr>
+          <p:cNvCxnSpPr>
+            <a:cxnSpLocks/>
+            <a:stCxn id="6" idx="1"/>
+            <a:endCxn id="11" idx="3"/>
+          </p:cNvCxnSpPr>
+          <p:nvPr/>
+        </p:nvCxnSpPr>
+        <p:spPr>
+          <a:xfrm flipH="1">
+            <a:off x="2727278" y="3451868"/>
+            <a:ext cx="1160230" cy="0"/>
+          </a:xfrm>
+          <a:prstGeom prst="straightConnector1">
+            <a:avLst/>
+          </a:prstGeom>
+          <a:ln w="12700">
+            <a:headEnd type="none" w="med" len="med"/>
+            <a:tailEnd type="triangle" w="med" len="med"/>
+          </a:ln>
+        </p:spPr>
+        <p:style>
+          <a:lnRef idx="1">
+            <a:schemeClr val="accent1"/>
+          </a:lnRef>
+          <a:fillRef idx="0">
+            <a:schemeClr val="accent1"/>
+          </a:fillRef>
+          <a:effectRef idx="0">
+            <a:schemeClr val="accent1"/>
+          </a:effectRef>
+          <a:fontRef idx="minor">
+            <a:schemeClr val="tx1"/>
+          </a:fontRef>
+        </p:style>
+      </p:cxnSp>
+      <p:sp>
+        <p:nvSpPr>
+          <p:cNvPr id="15" name="TextBox 14">
+            <a:extLst>
+              <a:ext uri="{FF2B5EF4-FFF2-40B4-BE49-F238E27FC236}">
+                <a16:creationId xmlns:a16="http://schemas.microsoft.com/office/drawing/2014/main" id="{E58AF1D7-3B7B-47E7-BCED-3017253BDA1C}"/>
+              </a:ext>
+            </a:extLst>
+          </p:cNvPr>
+          <p:cNvSpPr txBox="1"/>
+          <p:nvPr/>
+        </p:nvSpPr>
+        <p:spPr>
+          <a:xfrm>
+            <a:off x="2976661" y="3292189"/>
+            <a:ext cx="580599" cy="246221"/>
+          </a:xfrm>
+          <a:prstGeom prst="rect">
+            <a:avLst/>
+          </a:prstGeom>
+          <a:solidFill>
+            <a:schemeClr val="bg1"/>
+          </a:solidFill>
+        </p:spPr>
+        <p:txBody>
+          <a:bodyPr wrap="square" rtlCol="0">
+            <a:spAutoFit/>
+          </a:bodyPr>
+          <a:lstStyle/>
+          <a:p>
+            <a:pPr marL="0" marR="0" lvl="0" indent="0" algn="l" defTabSz="914400" rtl="0" eaLnBrk="1" fontAlgn="auto" latinLnBrk="0" hangingPunct="1">
+              <a:lnSpc>
+                <a:spcPct val="100000"/>
+              </a:lnSpc>
+              <a:spcBef>
+                <a:spcPts val="0"/>
+              </a:spcBef>
+              <a:spcAft>
+                <a:spcPts val="0"/>
+              </a:spcAft>
+              <a:buClrTx/>
+              <a:buSzTx/>
+              <a:buFontTx/>
+              <a:buNone/>
+              <a:tabLst/>
+              <a:defRPr/>
+            </a:pPr>
+            <a:r>
+              <a:rPr kumimoji="0" lang="en-US" sz="1000" b="1" i="0" u="none" strike="noStrike" kern="1200" cap="none" spc="0" normalizeH="0" baseline="0" noProof="0" dirty="0">
+                <a:ln>
+                  <a:noFill/>
+                </a:ln>
+                <a:solidFill>
+                  <a:prstClr val="black"/>
+                </a:solidFill>
+                <a:effectLst/>
+                <a:uLnTx/>
+                <a:uFillTx/>
+                <a:latin typeface="Calibri" panose="020F0502020204030204"/>
+                <a:ea typeface="+mn-ea"/>
+                <a:cs typeface="+mn-cs"/>
+              </a:rPr>
+              <a:t>subject</a:t>
+            </a:r>
+            <a:endParaRPr kumimoji="0" lang="en-US" sz="900" b="1" i="0" u="none" strike="noStrike" kern="1200" cap="none" spc="0" normalizeH="0" baseline="0" noProof="0" dirty="0">
+              <a:ln>
+                <a:noFill/>
+              </a:ln>
+              <a:solidFill>
+                <a:prstClr val="black"/>
+              </a:solidFill>
+              <a:effectLst/>
+              <a:uLnTx/>
+              <a:uFillTx/>
+              <a:latin typeface="Calibri" panose="020F0502020204030204"/>
+              <a:ea typeface="+mn-ea"/>
+              <a:cs typeface="+mn-cs"/>
+            </a:endParaRPr>
+          </a:p>
+        </p:txBody>
+      </p:sp>
+      <p:sp>
+        <p:nvSpPr>
+          <p:cNvPr id="16" name="Flowchart: Process 15">
+            <a:extLst>
+              <a:ext uri="{FF2B5EF4-FFF2-40B4-BE49-F238E27FC236}">
+                <a16:creationId xmlns:a16="http://schemas.microsoft.com/office/drawing/2014/main" id="{5DE82B70-5B74-4336-B855-7942DFA7CFBB}"/>
+              </a:ext>
+            </a:extLst>
+          </p:cNvPr>
+          <p:cNvSpPr/>
+          <p:nvPr/>
+        </p:nvSpPr>
+        <p:spPr>
+          <a:xfrm>
+            <a:off x="792540" y="4340444"/>
+            <a:ext cx="1872861" cy="776860"/>
+          </a:xfrm>
+          <a:prstGeom prst="flowChartProcess">
+            <a:avLst/>
+          </a:prstGeom>
+          <a:solidFill>
+            <a:schemeClr val="bg1">
+              <a:lumMod val="65000"/>
+            </a:schemeClr>
+          </a:solidFill>
+          <a:ln>
+            <a:noFill/>
+          </a:ln>
+        </p:spPr>
+        <p:style>
+          <a:lnRef idx="2">
+            <a:schemeClr val="accent1">
+              <a:shade val="50000"/>
+            </a:schemeClr>
+          </a:lnRef>
+          <a:fillRef idx="1">
+            <a:schemeClr val="accent1"/>
+          </a:fillRef>
+          <a:effectRef idx="0">
+            <a:schemeClr val="accent1"/>
+          </a:effectRef>
+          <a:fontRef idx="minor">
+            <a:schemeClr val="lt1"/>
+          </a:fontRef>
+        </p:style>
+        <p:txBody>
+          <a:bodyPr rtlCol="0" anchor="ctr"/>
+          <a:lstStyle/>
+          <a:p>
+            <a:pPr marL="0" marR="0" lvl="0" indent="0" algn="ctr" defTabSz="914400" rtl="0" eaLnBrk="1" fontAlgn="auto" latinLnBrk="0" hangingPunct="1">
+              <a:lnSpc>
+                <a:spcPct val="100000"/>
+              </a:lnSpc>
+              <a:spcBef>
+                <a:spcPts val="0"/>
+              </a:spcBef>
+              <a:spcAft>
+                <a:spcPts val="0"/>
+              </a:spcAft>
+              <a:buClrTx/>
+              <a:buSzTx/>
+              <a:buFontTx/>
+              <a:buNone/>
+              <a:tabLst/>
+              <a:defRPr/>
+            </a:pPr>
+            <a:r>
+              <a:rPr kumimoji="0" lang="en-US" sz="1600" b="0" i="0" u="none" strike="noStrike" kern="1200" cap="none" spc="0" normalizeH="0" baseline="0" noProof="0" dirty="0">
+                <a:ln>
+                  <a:noFill/>
+                </a:ln>
+                <a:solidFill>
+                  <a:prstClr val="white"/>
+                </a:solidFill>
+                <a:effectLst/>
+                <a:uLnTx/>
+                <a:uFillTx/>
+                <a:latin typeface="Calibri" panose="020F0502020204030204"/>
+                <a:ea typeface="+mn-ea"/>
+                <a:cs typeface="+mn-cs"/>
+              </a:rPr>
+              <a:t>US Core Organization</a:t>
+            </a:r>
+          </a:p>
+          <a:p>
+            <a:pPr marL="0" marR="0" lvl="0" indent="0" algn="ctr" defTabSz="914400" rtl="0" eaLnBrk="1" fontAlgn="auto" latinLnBrk="0" hangingPunct="1">
+              <a:lnSpc>
+                <a:spcPct val="100000"/>
+              </a:lnSpc>
+              <a:spcBef>
+                <a:spcPts val="0"/>
+              </a:spcBef>
+              <a:spcAft>
+                <a:spcPts val="0"/>
+              </a:spcAft>
+              <a:buClrTx/>
+              <a:buSzTx/>
+              <a:buFontTx/>
+              <a:buNone/>
+              <a:tabLst/>
+              <a:defRPr/>
+            </a:pPr>
+            <a:r>
+              <a:rPr kumimoji="0" lang="en-US" sz="1200" b="0" i="0" u="none" strike="noStrike" kern="1200" cap="none" spc="0" normalizeH="0" baseline="0" noProof="0" dirty="0">
+                <a:ln>
+                  <a:noFill/>
+                </a:ln>
+                <a:solidFill>
+                  <a:prstClr val="white"/>
+                </a:solidFill>
+                <a:effectLst/>
+                <a:uLnTx/>
+                <a:uFillTx/>
+                <a:latin typeface="Calibri" panose="020F0502020204030204"/>
+                <a:ea typeface="+mn-ea"/>
+                <a:cs typeface="+mn-cs"/>
+              </a:rPr>
+              <a:t>ABC Payer</a:t>
+            </a:r>
+          </a:p>
+        </p:txBody>
+      </p:sp>
+      <p:sp>
+        <p:nvSpPr>
+          <p:cNvPr id="28" name="Rectangle 27">
+            <a:extLst>
+              <a:ext uri="{FF2B5EF4-FFF2-40B4-BE49-F238E27FC236}">
+                <a16:creationId xmlns:a16="http://schemas.microsoft.com/office/drawing/2014/main" id="{C76BA75C-9C8C-4C6D-A479-80DF40E9BB48}"/>
+              </a:ext>
+            </a:extLst>
+          </p:cNvPr>
+          <p:cNvSpPr/>
+          <p:nvPr/>
+        </p:nvSpPr>
+        <p:spPr>
+          <a:xfrm>
+            <a:off x="3909997" y="2255444"/>
+            <a:ext cx="1889760" cy="931670"/>
+          </a:xfrm>
+          <a:prstGeom prst="rect">
+            <a:avLst/>
+          </a:prstGeom>
+          <a:solidFill>
+            <a:schemeClr val="accent1">
+              <a:lumMod val="75000"/>
+            </a:schemeClr>
+          </a:solidFill>
+          <a:ln>
+            <a:solidFill>
+              <a:srgbClr val="00B050"/>
+            </a:solidFill>
+          </a:ln>
+        </p:spPr>
+        <p:style>
+          <a:lnRef idx="2">
+            <a:schemeClr val="accent4">
+              <a:shade val="50000"/>
+            </a:schemeClr>
+          </a:lnRef>
+          <a:fillRef idx="1">
+            <a:schemeClr val="accent4"/>
+          </a:fillRef>
+          <a:effectRef idx="0">
+            <a:schemeClr val="accent4"/>
+          </a:effectRef>
+          <a:fontRef idx="minor">
+            <a:schemeClr val="lt1"/>
+          </a:fontRef>
+        </p:style>
+        <p:txBody>
+          <a:bodyPr rtlCol="0" anchor="t" anchorCtr="0"/>
+          <a:lstStyle/>
+          <a:p>
+            <a:pPr lvl="0">
+              <a:defRPr/>
+            </a:pPr>
+            <a:r>
+              <a:rPr lang="en-US" sz="900" dirty="0">
+                <a:solidFill>
+                  <a:prstClr val="white"/>
+                </a:solidFill>
+              </a:rPr>
+              <a:t>.</a:t>
+            </a:r>
+            <a:r>
+              <a:rPr lang="en-US" sz="900" b="1" dirty="0">
+                <a:solidFill>
+                  <a:prstClr val="white"/>
+                </a:solidFill>
+              </a:rPr>
+              <a:t>group[1]</a:t>
+            </a:r>
+          </a:p>
+          <a:p>
+            <a:pPr lvl="0">
+              <a:defRPr/>
+            </a:pPr>
+            <a:r>
+              <a:rPr lang="en-US" sz="900" b="1" dirty="0">
+                <a:solidFill>
+                  <a:prstClr val="white"/>
+                </a:solidFill>
+              </a:rPr>
+              <a:t>    .code: 18 Diabetes with Chronic Complications</a:t>
+            </a:r>
+          </a:p>
+          <a:p>
+            <a:pPr lvl="0">
+              <a:defRPr/>
+            </a:pPr>
+            <a:r>
+              <a:rPr lang="en-US" sz="900" b="1" dirty="0">
+                <a:solidFill>
+                  <a:prstClr val="white"/>
+                </a:solidFill>
+              </a:rPr>
+              <a:t>    historic</a:t>
+            </a:r>
+          </a:p>
+          <a:p>
+            <a:pPr lvl="0">
+              <a:defRPr/>
+            </a:pPr>
+            <a:r>
+              <a:rPr lang="en-US" sz="900" b="1" dirty="0">
+                <a:solidFill>
+                  <a:prstClr val="white"/>
+                </a:solidFill>
+              </a:rPr>
+              <a:t>    closed-gap</a:t>
+            </a:r>
+          </a:p>
+          <a:p>
+            <a:pPr lvl="0">
+              <a:defRPr/>
+            </a:pPr>
+            <a:r>
+              <a:rPr lang="en-US" sz="900" b="1" dirty="0">
+                <a:solidFill>
+                  <a:prstClr val="white"/>
+                </a:solidFill>
+              </a:rPr>
+              <a:t>    applied-not-superseded</a:t>
+            </a:r>
+          </a:p>
+          <a:p>
+            <a:pPr lvl="0">
+              <a:defRPr/>
+            </a:pPr>
+            <a:r>
+              <a:rPr lang="en-US" sz="900" b="1" dirty="0">
+                <a:solidFill>
+                  <a:prstClr val="white"/>
+                </a:solidFill>
+              </a:rPr>
+              <a:t>    </a:t>
+            </a:r>
+            <a:r>
+              <a:rPr lang="en-US" dirty="0">
+                <a:solidFill>
+                  <a:prstClr val="white"/>
+                </a:solidFill>
+              </a:rPr>
+              <a:t> </a:t>
+            </a:r>
+          </a:p>
+        </p:txBody>
+      </p:sp>
+      <p:sp>
+        <p:nvSpPr>
+          <p:cNvPr id="32" name="Rectangle 31">
+            <a:extLst>
+              <a:ext uri="{FF2B5EF4-FFF2-40B4-BE49-F238E27FC236}">
+                <a16:creationId xmlns:a16="http://schemas.microsoft.com/office/drawing/2014/main" id="{EEA15C61-E722-47F4-8036-17245CCEB335}"/>
+              </a:ext>
+            </a:extLst>
+          </p:cNvPr>
+          <p:cNvSpPr/>
+          <p:nvPr/>
+        </p:nvSpPr>
+        <p:spPr>
+          <a:xfrm>
+            <a:off x="3914517" y="4078654"/>
+            <a:ext cx="1889760" cy="1056439"/>
+          </a:xfrm>
+          <a:prstGeom prst="rect">
+            <a:avLst/>
+          </a:prstGeom>
+          <a:solidFill>
+            <a:schemeClr val="accent1">
+              <a:lumMod val="75000"/>
+            </a:schemeClr>
+          </a:solidFill>
+          <a:ln>
+            <a:solidFill>
+              <a:srgbClr val="00B050"/>
+            </a:solidFill>
+          </a:ln>
+        </p:spPr>
+        <p:style>
+          <a:lnRef idx="2">
+            <a:schemeClr val="accent4">
+              <a:shade val="50000"/>
+            </a:schemeClr>
+          </a:lnRef>
+          <a:fillRef idx="1">
+            <a:schemeClr val="accent4"/>
+          </a:fillRef>
+          <a:effectRef idx="0">
+            <a:schemeClr val="accent4"/>
+          </a:effectRef>
+          <a:fontRef idx="minor">
+            <a:schemeClr val="lt1"/>
+          </a:fontRef>
+        </p:style>
+        <p:txBody>
+          <a:bodyPr rtlCol="0" anchor="t" anchorCtr="0"/>
+          <a:lstStyle/>
+          <a:p>
+            <a:pPr lvl="0">
+              <a:defRPr/>
+            </a:pPr>
+            <a:r>
+              <a:rPr lang="en-US" sz="900" dirty="0">
+                <a:solidFill>
+                  <a:prstClr val="white"/>
+                </a:solidFill>
+              </a:rPr>
+              <a:t>.</a:t>
+            </a:r>
+            <a:r>
+              <a:rPr lang="en-US" sz="900" b="1" dirty="0">
+                <a:solidFill>
+                  <a:prstClr val="white"/>
+                </a:solidFill>
+              </a:rPr>
+              <a:t>group[2]</a:t>
+            </a:r>
+          </a:p>
+          <a:p>
+            <a:pPr lvl="0">
+              <a:defRPr/>
+            </a:pPr>
+            <a:r>
+              <a:rPr lang="en-US" sz="900" b="1" dirty="0">
+                <a:solidFill>
+                  <a:prstClr val="white"/>
+                </a:solidFill>
+              </a:rPr>
+              <a:t>    .code: 111 Chronic Obstructive Pulmonary Disease</a:t>
+            </a:r>
+          </a:p>
+          <a:p>
+            <a:pPr lvl="0">
+              <a:defRPr/>
+            </a:pPr>
+            <a:r>
+              <a:rPr lang="en-US" sz="900" b="1" dirty="0">
+                <a:solidFill>
+                  <a:prstClr val="white"/>
+                </a:solidFill>
+              </a:rPr>
+              <a:t>    historic</a:t>
+            </a:r>
+          </a:p>
+          <a:p>
+            <a:pPr lvl="0">
+              <a:defRPr/>
+            </a:pPr>
+            <a:r>
+              <a:rPr lang="en-US" sz="900" b="1" dirty="0">
+                <a:solidFill>
+                  <a:prstClr val="white"/>
+                </a:solidFill>
+              </a:rPr>
+              <a:t>    closed-gap</a:t>
+            </a:r>
+          </a:p>
+          <a:p>
+            <a:pPr lvl="0">
+              <a:defRPr/>
+            </a:pPr>
+            <a:r>
+              <a:rPr lang="en-US" sz="900" b="1" dirty="0">
+                <a:solidFill>
+                  <a:prstClr val="white"/>
+                </a:solidFill>
+              </a:rPr>
+              <a:t>    applied-not-superseded</a:t>
+            </a:r>
+          </a:p>
+          <a:p>
+            <a:pPr lvl="0" algn="ctr">
+              <a:defRPr/>
+            </a:pPr>
+            <a:r>
+              <a:rPr lang="en-US" dirty="0">
+                <a:solidFill>
+                  <a:prstClr val="white"/>
+                </a:solidFill>
+              </a:rPr>
+              <a:t> </a:t>
+            </a:r>
+          </a:p>
+        </p:txBody>
+      </p:sp>
+      <p:sp>
+        <p:nvSpPr>
+          <p:cNvPr id="35" name="Rectangle 34">
+            <a:extLst>
+              <a:ext uri="{FF2B5EF4-FFF2-40B4-BE49-F238E27FC236}">
+                <a16:creationId xmlns:a16="http://schemas.microsoft.com/office/drawing/2014/main" id="{4808AB26-B7CC-405A-A29B-9510E10A1866}"/>
+              </a:ext>
+            </a:extLst>
+          </p:cNvPr>
+          <p:cNvSpPr/>
+          <p:nvPr/>
+        </p:nvSpPr>
+        <p:spPr>
+          <a:xfrm>
+            <a:off x="3906929" y="3247031"/>
+            <a:ext cx="1889760" cy="755381"/>
+          </a:xfrm>
+          <a:prstGeom prst="rect">
+            <a:avLst/>
+          </a:prstGeom>
+          <a:solidFill>
+            <a:schemeClr val="accent1">
+              <a:lumMod val="75000"/>
+            </a:schemeClr>
+          </a:solidFill>
+          <a:ln>
+            <a:solidFill>
+              <a:srgbClr val="00B050"/>
+            </a:solidFill>
+          </a:ln>
+        </p:spPr>
+        <p:style>
+          <a:lnRef idx="2">
+            <a:schemeClr val="accent4">
+              <a:shade val="50000"/>
+            </a:schemeClr>
+          </a:lnRef>
+          <a:fillRef idx="1">
+            <a:schemeClr val="accent4"/>
+          </a:fillRef>
+          <a:effectRef idx="0">
+            <a:schemeClr val="accent4"/>
+          </a:effectRef>
+          <a:fontRef idx="minor">
+            <a:schemeClr val="lt1"/>
+          </a:fontRef>
+        </p:style>
+        <p:txBody>
+          <a:bodyPr rtlCol="0" anchor="t" anchorCtr="0"/>
+          <a:lstStyle/>
+          <a:p>
+            <a:pPr lvl="0">
+              <a:defRPr/>
+            </a:pPr>
+            <a:r>
+              <a:rPr lang="en-US" sz="900" dirty="0">
+                <a:solidFill>
+                  <a:prstClr val="white"/>
+                </a:solidFill>
+              </a:rPr>
+              <a:t>.</a:t>
+            </a:r>
+            <a:r>
+              <a:rPr lang="en-US" sz="900" b="1" dirty="0">
+                <a:solidFill>
+                  <a:prstClr val="white"/>
+                </a:solidFill>
+              </a:rPr>
+              <a:t>group[4]</a:t>
+            </a:r>
+          </a:p>
+          <a:p>
+            <a:pPr lvl="0">
+              <a:defRPr/>
+            </a:pPr>
+            <a:r>
+              <a:rPr lang="en-US" sz="900" b="1" dirty="0">
+                <a:solidFill>
+                  <a:prstClr val="white"/>
+                </a:solidFill>
+              </a:rPr>
+              <a:t>    .code: 22 Morbid Obesity</a:t>
+            </a:r>
+          </a:p>
+          <a:p>
+            <a:pPr lvl="0">
+              <a:defRPr/>
+            </a:pPr>
+            <a:r>
+              <a:rPr lang="en-US" sz="900" b="1" dirty="0">
+                <a:solidFill>
+                  <a:prstClr val="white"/>
+                </a:solidFill>
+              </a:rPr>
+              <a:t>    suspected</a:t>
+            </a:r>
+          </a:p>
+          <a:p>
+            <a:pPr lvl="0">
+              <a:defRPr/>
+            </a:pPr>
+            <a:r>
+              <a:rPr lang="en-US" sz="900" b="1" dirty="0">
+                <a:solidFill>
+                  <a:prstClr val="white"/>
+                </a:solidFill>
+              </a:rPr>
+              <a:t>    closed-gap</a:t>
+            </a:r>
+          </a:p>
+          <a:p>
+            <a:pPr lvl="0">
+              <a:defRPr/>
+            </a:pPr>
+            <a:r>
+              <a:rPr lang="en-US" sz="900" b="1" dirty="0">
+                <a:solidFill>
+                  <a:prstClr val="white"/>
+                </a:solidFill>
+              </a:rPr>
+              <a:t>    applied-not-superseded</a:t>
+            </a:r>
+          </a:p>
+          <a:p>
+            <a:pPr lvl="0" algn="ctr">
+              <a:defRPr/>
+            </a:pPr>
+            <a:endParaRPr lang="en-US" dirty="0">
+              <a:solidFill>
+                <a:prstClr val="white"/>
+              </a:solidFill>
+            </a:endParaRPr>
+          </a:p>
+        </p:txBody>
+      </p:sp>
+      <p:sp>
+        <p:nvSpPr>
+          <p:cNvPr id="50" name="Flowchart: Process 49">
+            <a:extLst>
+              <a:ext uri="{FF2B5EF4-FFF2-40B4-BE49-F238E27FC236}">
+                <a16:creationId xmlns:a16="http://schemas.microsoft.com/office/drawing/2014/main" id="{43898F04-C4F3-44B2-9DA3-DD349768ADB5}"/>
+              </a:ext>
+            </a:extLst>
+          </p:cNvPr>
+          <p:cNvSpPr/>
+          <p:nvPr/>
+        </p:nvSpPr>
+        <p:spPr>
+          <a:xfrm>
+            <a:off x="7489786" y="2367440"/>
+            <a:ext cx="1872860" cy="755570"/>
+          </a:xfrm>
+          <a:prstGeom prst="flowChartProcess">
+            <a:avLst/>
+          </a:prstGeom>
+          <a:ln>
+            <a:solidFill>
+              <a:srgbClr val="0070C0"/>
+            </a:solidFill>
+          </a:ln>
+        </p:spPr>
+        <p:style>
+          <a:lnRef idx="2">
+            <a:schemeClr val="accent1">
+              <a:shade val="50000"/>
+            </a:schemeClr>
+          </a:lnRef>
+          <a:fillRef idx="1">
+            <a:schemeClr val="accent1"/>
+          </a:fillRef>
+          <a:effectRef idx="0">
+            <a:schemeClr val="accent1"/>
+          </a:effectRef>
+          <a:fontRef idx="minor">
+            <a:schemeClr val="lt1"/>
+          </a:fontRef>
+        </p:style>
+        <p:txBody>
+          <a:bodyPr rtlCol="0" anchor="ctr"/>
+          <a:lstStyle/>
+          <a:p>
+            <a:pPr marL="0" marR="0" lvl="0" indent="0" algn="ctr" defTabSz="914400" rtl="0" eaLnBrk="1" fontAlgn="auto" latinLnBrk="0" hangingPunct="1">
+              <a:lnSpc>
+                <a:spcPct val="100000"/>
+              </a:lnSpc>
+              <a:spcBef>
+                <a:spcPts val="0"/>
+              </a:spcBef>
+              <a:spcAft>
+                <a:spcPts val="0"/>
+              </a:spcAft>
+              <a:buClrTx/>
+              <a:buSzTx/>
+              <a:buFontTx/>
+              <a:buNone/>
+              <a:tabLst/>
+              <a:defRPr/>
+            </a:pPr>
+            <a:r>
+              <a:rPr kumimoji="0" lang="en-US" sz="1600" b="0" i="0" u="none" strike="noStrike" kern="1200" cap="none" spc="0" normalizeH="0" baseline="0" noProof="0" dirty="0">
+                <a:ln>
+                  <a:noFill/>
+                </a:ln>
+                <a:solidFill>
+                  <a:prstClr val="white"/>
+                </a:solidFill>
+                <a:effectLst/>
+                <a:uLnTx/>
+                <a:uFillTx/>
+                <a:latin typeface="Calibri" panose="020F0502020204030204"/>
+                <a:ea typeface="+mn-ea"/>
+                <a:cs typeface="+mn-cs"/>
+              </a:rPr>
+              <a:t>US Core Condition</a:t>
+            </a:r>
+          </a:p>
+          <a:p>
+            <a:pPr marL="0" marR="0" lvl="0" indent="0" algn="ctr" defTabSz="914400" rtl="0" eaLnBrk="1" fontAlgn="auto" latinLnBrk="0" hangingPunct="1">
+              <a:lnSpc>
+                <a:spcPct val="100000"/>
+              </a:lnSpc>
+              <a:spcBef>
+                <a:spcPts val="0"/>
+              </a:spcBef>
+              <a:spcAft>
+                <a:spcPts val="0"/>
+              </a:spcAft>
+              <a:buClrTx/>
+              <a:buSzTx/>
+              <a:buFontTx/>
+              <a:buNone/>
+              <a:tabLst/>
+              <a:defRPr/>
+            </a:pPr>
+            <a:r>
+              <a:rPr lang="en-US" sz="1000" dirty="0">
+                <a:solidFill>
+                  <a:prstClr val="white"/>
+                </a:solidFill>
+                <a:latin typeface="Calibri" panose="020F0502020204030204"/>
+              </a:rPr>
+              <a:t>E08.29 Diabetes mellitus due to underlying condition with other diabetic kidney complication</a:t>
+            </a:r>
+            <a:endParaRPr kumimoji="0" lang="en-US" sz="900" b="0" i="0" u="none" strike="noStrike" kern="1200" cap="none" spc="0" normalizeH="0" baseline="0" noProof="0" dirty="0">
+              <a:ln>
+                <a:noFill/>
+              </a:ln>
+              <a:solidFill>
+                <a:prstClr val="white"/>
+              </a:solidFill>
+              <a:effectLst/>
+              <a:uLnTx/>
+              <a:uFillTx/>
+              <a:latin typeface="Calibri" panose="020F0502020204030204"/>
+              <a:ea typeface="+mn-ea"/>
+              <a:cs typeface="+mn-cs"/>
+            </a:endParaRPr>
+          </a:p>
+        </p:txBody>
+      </p:sp>
+      <p:sp>
+        <p:nvSpPr>
+          <p:cNvPr id="51" name="Flowchart: Process 50">
+            <a:extLst>
+              <a:ext uri="{FF2B5EF4-FFF2-40B4-BE49-F238E27FC236}">
+                <a16:creationId xmlns:a16="http://schemas.microsoft.com/office/drawing/2014/main" id="{2397CBB5-489F-4C61-B0CC-8BB8BD1B2D3C}"/>
+              </a:ext>
+            </a:extLst>
+          </p:cNvPr>
+          <p:cNvSpPr/>
+          <p:nvPr/>
+        </p:nvSpPr>
+        <p:spPr>
+          <a:xfrm>
+            <a:off x="7514436" y="4224960"/>
+            <a:ext cx="1872860" cy="755570"/>
+          </a:xfrm>
+          <a:prstGeom prst="flowChartProcess">
+            <a:avLst/>
+          </a:prstGeom>
+          <a:ln>
+            <a:solidFill>
+              <a:srgbClr val="0070C0"/>
+            </a:solidFill>
+          </a:ln>
+        </p:spPr>
+        <p:style>
+          <a:lnRef idx="2">
+            <a:schemeClr val="accent1">
+              <a:shade val="50000"/>
+            </a:schemeClr>
+          </a:lnRef>
+          <a:fillRef idx="1">
+            <a:schemeClr val="accent1"/>
+          </a:fillRef>
+          <a:effectRef idx="0">
+            <a:schemeClr val="accent1"/>
+          </a:effectRef>
+          <a:fontRef idx="minor">
+            <a:schemeClr val="lt1"/>
+          </a:fontRef>
+        </p:style>
+        <p:txBody>
+          <a:bodyPr rtlCol="0" anchor="ctr"/>
+          <a:lstStyle/>
+          <a:p>
+            <a:pPr marL="0" marR="0" lvl="0" indent="0" algn="ctr" defTabSz="914400" rtl="0" eaLnBrk="1" fontAlgn="auto" latinLnBrk="0" hangingPunct="1">
+              <a:lnSpc>
+                <a:spcPct val="100000"/>
+              </a:lnSpc>
+              <a:spcBef>
+                <a:spcPts val="0"/>
+              </a:spcBef>
+              <a:spcAft>
+                <a:spcPts val="0"/>
+              </a:spcAft>
+              <a:buClrTx/>
+              <a:buSzTx/>
+              <a:buFontTx/>
+              <a:buNone/>
+              <a:tabLst/>
+              <a:defRPr/>
+            </a:pPr>
+            <a:r>
+              <a:rPr kumimoji="0" lang="en-US" sz="1600" b="0" i="0" u="none" strike="noStrike" kern="1200" cap="none" spc="0" normalizeH="0" baseline="0" noProof="0" dirty="0">
+                <a:ln>
+                  <a:noFill/>
+                </a:ln>
+                <a:solidFill>
+                  <a:prstClr val="white"/>
+                </a:solidFill>
+                <a:effectLst/>
+                <a:uLnTx/>
+                <a:uFillTx/>
+                <a:latin typeface="Calibri" panose="020F0502020204030204"/>
+                <a:ea typeface="+mn-ea"/>
+                <a:cs typeface="+mn-cs"/>
+              </a:rPr>
+              <a:t>US Core Condition</a:t>
+            </a:r>
+          </a:p>
+          <a:p>
+            <a:pPr marL="0" marR="0" lvl="0" indent="0" algn="ctr" defTabSz="914400" rtl="0" eaLnBrk="1" fontAlgn="auto" latinLnBrk="0" hangingPunct="1">
+              <a:lnSpc>
+                <a:spcPct val="100000"/>
+              </a:lnSpc>
+              <a:spcBef>
+                <a:spcPts val="0"/>
+              </a:spcBef>
+              <a:spcAft>
+                <a:spcPts val="0"/>
+              </a:spcAft>
+              <a:buClrTx/>
+              <a:buSzTx/>
+              <a:buFontTx/>
+              <a:buNone/>
+              <a:tabLst/>
+              <a:defRPr/>
+            </a:pPr>
+            <a:r>
+              <a:rPr lang="en-US" sz="1000" dirty="0">
+                <a:solidFill>
+                  <a:prstClr val="white"/>
+                </a:solidFill>
+                <a:latin typeface="Calibri" panose="020F0502020204030204"/>
+              </a:rPr>
+              <a:t>J45.31 Mild persistent asthma with (acute) exacerbation</a:t>
+            </a:r>
+            <a:endParaRPr kumimoji="0" lang="en-US" sz="900" b="0" i="0" u="none" strike="noStrike" kern="1200" cap="none" spc="0" normalizeH="0" baseline="0" noProof="0" dirty="0">
+              <a:ln>
+                <a:noFill/>
+              </a:ln>
+              <a:solidFill>
+                <a:prstClr val="white"/>
+              </a:solidFill>
+              <a:effectLst/>
+              <a:uLnTx/>
+              <a:uFillTx/>
+              <a:latin typeface="Calibri" panose="020F0502020204030204"/>
+              <a:ea typeface="+mn-ea"/>
+              <a:cs typeface="+mn-cs"/>
+            </a:endParaRPr>
+          </a:p>
+        </p:txBody>
+      </p:sp>
+      <p:sp>
+        <p:nvSpPr>
+          <p:cNvPr id="55" name="Flowchart: Process 54">
+            <a:extLst>
+              <a:ext uri="{FF2B5EF4-FFF2-40B4-BE49-F238E27FC236}">
+                <a16:creationId xmlns:a16="http://schemas.microsoft.com/office/drawing/2014/main" id="{29AC9E13-A3B2-44B1-855E-6477F1B82D73}"/>
+              </a:ext>
+            </a:extLst>
+          </p:cNvPr>
+          <p:cNvSpPr/>
+          <p:nvPr/>
+        </p:nvSpPr>
+        <p:spPr>
+          <a:xfrm>
+            <a:off x="7504288" y="3266178"/>
+            <a:ext cx="1872860" cy="755570"/>
+          </a:xfrm>
+          <a:prstGeom prst="flowChartProcess">
+            <a:avLst/>
+          </a:prstGeom>
+          <a:ln>
+            <a:solidFill>
+              <a:srgbClr val="0070C0"/>
+            </a:solidFill>
+          </a:ln>
+        </p:spPr>
+        <p:style>
+          <a:lnRef idx="2">
+            <a:schemeClr val="accent1">
+              <a:shade val="50000"/>
+            </a:schemeClr>
+          </a:lnRef>
+          <a:fillRef idx="1">
+            <a:schemeClr val="accent1"/>
+          </a:fillRef>
+          <a:effectRef idx="0">
+            <a:schemeClr val="accent1"/>
+          </a:effectRef>
+          <a:fontRef idx="minor">
+            <a:schemeClr val="lt1"/>
+          </a:fontRef>
+        </p:style>
+        <p:txBody>
+          <a:bodyPr rtlCol="0" anchor="ctr"/>
+          <a:lstStyle/>
+          <a:p>
+            <a:pPr marL="0" marR="0" lvl="0" indent="0" algn="ctr" defTabSz="914400" rtl="0" eaLnBrk="1" fontAlgn="auto" latinLnBrk="0" hangingPunct="1">
+              <a:lnSpc>
+                <a:spcPct val="100000"/>
+              </a:lnSpc>
+              <a:spcBef>
+                <a:spcPts val="0"/>
+              </a:spcBef>
+              <a:spcAft>
+                <a:spcPts val="0"/>
+              </a:spcAft>
+              <a:buClrTx/>
+              <a:buSzTx/>
+              <a:buFontTx/>
+              <a:buNone/>
+              <a:tabLst/>
+              <a:defRPr/>
+            </a:pPr>
+            <a:r>
+              <a:rPr kumimoji="0" lang="en-US" sz="1600" b="0" i="0" u="none" strike="noStrike" kern="1200" cap="none" spc="0" normalizeH="0" baseline="0" noProof="0" dirty="0">
+                <a:ln>
+                  <a:noFill/>
+                </a:ln>
+                <a:solidFill>
+                  <a:prstClr val="white"/>
+                </a:solidFill>
+                <a:effectLst/>
+                <a:uLnTx/>
+                <a:uFillTx/>
+                <a:latin typeface="Calibri" panose="020F0502020204030204"/>
+                <a:ea typeface="+mn-ea"/>
+                <a:cs typeface="+mn-cs"/>
+              </a:rPr>
+              <a:t>US Core Condition</a:t>
+            </a:r>
+          </a:p>
+          <a:p>
+            <a:pPr lvl="0" algn="ctr">
+              <a:defRPr/>
+            </a:pPr>
+            <a:r>
+              <a:rPr lang="en-US" sz="1000" dirty="0">
+                <a:solidFill>
+                  <a:prstClr val="white"/>
+                </a:solidFill>
+                <a:latin typeface="Calibri" panose="020F0502020204030204"/>
+              </a:rPr>
+              <a:t>Z68.42 Body mass index (BMI) 45.0-49.9, adult</a:t>
+            </a:r>
+            <a:endParaRPr kumimoji="0" lang="en-US" sz="900" b="0" i="0" u="none" strike="noStrike" kern="1200" cap="none" spc="0" normalizeH="0" baseline="0" noProof="0" dirty="0">
+              <a:ln>
+                <a:noFill/>
+              </a:ln>
+              <a:solidFill>
+                <a:prstClr val="white"/>
+              </a:solidFill>
+              <a:effectLst/>
+              <a:uLnTx/>
+              <a:uFillTx/>
+              <a:latin typeface="Calibri" panose="020F0502020204030204"/>
+              <a:ea typeface="+mn-ea"/>
+              <a:cs typeface="+mn-cs"/>
+            </a:endParaRPr>
+          </a:p>
+        </p:txBody>
+      </p:sp>
+      <p:sp>
+        <p:nvSpPr>
+          <p:cNvPr id="56" name="Flowchart: Process 55">
+            <a:extLst>
+              <a:ext uri="{FF2B5EF4-FFF2-40B4-BE49-F238E27FC236}">
+                <a16:creationId xmlns:a16="http://schemas.microsoft.com/office/drawing/2014/main" id="{511CF435-6659-4E5A-8316-25057B7C12B6}"/>
+              </a:ext>
+            </a:extLst>
+          </p:cNvPr>
+          <p:cNvSpPr/>
+          <p:nvPr/>
+        </p:nvSpPr>
+        <p:spPr>
+          <a:xfrm>
+            <a:off x="7482167" y="1420886"/>
+            <a:ext cx="1872860" cy="755570"/>
+          </a:xfrm>
+          <a:prstGeom prst="flowChartProcess">
+            <a:avLst/>
+          </a:prstGeom>
+          <a:ln>
+            <a:solidFill>
+              <a:srgbClr val="0070C0"/>
+            </a:solidFill>
+          </a:ln>
+        </p:spPr>
+        <p:style>
+          <a:lnRef idx="2">
+            <a:schemeClr val="accent1">
+              <a:shade val="50000"/>
+            </a:schemeClr>
+          </a:lnRef>
+          <a:fillRef idx="1">
+            <a:schemeClr val="accent1"/>
+          </a:fillRef>
+          <a:effectRef idx="0">
+            <a:schemeClr val="accent1"/>
+          </a:effectRef>
+          <a:fontRef idx="minor">
+            <a:schemeClr val="lt1"/>
+          </a:fontRef>
+        </p:style>
+        <p:txBody>
+          <a:bodyPr rtlCol="0" anchor="ctr"/>
+          <a:lstStyle/>
+          <a:p>
+            <a:pPr marL="0" marR="0" lvl="0" indent="0" algn="ctr" defTabSz="914400" rtl="0" eaLnBrk="1" fontAlgn="auto" latinLnBrk="0" hangingPunct="1">
+              <a:lnSpc>
+                <a:spcPct val="100000"/>
+              </a:lnSpc>
+              <a:spcBef>
+                <a:spcPts val="0"/>
+              </a:spcBef>
+              <a:spcAft>
+                <a:spcPts val="0"/>
+              </a:spcAft>
+              <a:buClrTx/>
+              <a:buSzTx/>
+              <a:buFontTx/>
+              <a:buNone/>
+              <a:tabLst/>
+              <a:defRPr/>
+            </a:pPr>
+            <a:r>
+              <a:rPr kumimoji="0" lang="en-US" sz="1600" b="0" i="0" u="none" strike="noStrike" kern="1200" cap="none" spc="0" normalizeH="0" baseline="0" noProof="0" dirty="0">
+                <a:ln>
+                  <a:noFill/>
+                </a:ln>
+                <a:solidFill>
+                  <a:prstClr val="white"/>
+                </a:solidFill>
+                <a:effectLst/>
+                <a:uLnTx/>
+                <a:uFillTx/>
+                <a:latin typeface="Calibri" panose="020F0502020204030204"/>
+                <a:ea typeface="+mn-ea"/>
+                <a:cs typeface="+mn-cs"/>
+              </a:rPr>
+              <a:t>US Core Encounter</a:t>
+            </a:r>
+          </a:p>
+          <a:p>
+            <a:pPr marL="0" marR="0" lvl="0" indent="0" algn="ctr" defTabSz="914400" rtl="0" eaLnBrk="1" fontAlgn="auto" latinLnBrk="0" hangingPunct="1">
+              <a:lnSpc>
+                <a:spcPct val="100000"/>
+              </a:lnSpc>
+              <a:spcBef>
+                <a:spcPts val="0"/>
+              </a:spcBef>
+              <a:spcAft>
+                <a:spcPts val="0"/>
+              </a:spcAft>
+              <a:buClrTx/>
+              <a:buSzTx/>
+              <a:buFontTx/>
+              <a:buNone/>
+              <a:tabLst/>
+              <a:defRPr/>
+            </a:pPr>
+            <a:r>
+              <a:rPr lang="en-US" sz="1000" dirty="0">
+                <a:solidFill>
+                  <a:prstClr val="white"/>
+                </a:solidFill>
+                <a:latin typeface="Calibri" panose="020F0502020204030204"/>
+              </a:rPr>
+              <a:t>DOS: 01/31/2021</a:t>
+            </a:r>
+            <a:endParaRPr kumimoji="0" lang="en-US" sz="900" b="0" i="0" u="none" strike="noStrike" kern="1200" cap="none" spc="0" normalizeH="0" baseline="0" noProof="0" dirty="0">
+              <a:ln>
+                <a:noFill/>
+              </a:ln>
+              <a:solidFill>
+                <a:prstClr val="white"/>
+              </a:solidFill>
+              <a:effectLst/>
+              <a:uLnTx/>
+              <a:uFillTx/>
+              <a:latin typeface="Calibri" panose="020F0502020204030204"/>
+              <a:ea typeface="+mn-ea"/>
+              <a:cs typeface="+mn-cs"/>
+            </a:endParaRPr>
+          </a:p>
+        </p:txBody>
+      </p:sp>
+      <p:sp>
+        <p:nvSpPr>
+          <p:cNvPr id="58" name="Flowchart: Process 57">
+            <a:extLst>
+              <a:ext uri="{FF2B5EF4-FFF2-40B4-BE49-F238E27FC236}">
+                <a16:creationId xmlns:a16="http://schemas.microsoft.com/office/drawing/2014/main" id="{2D712595-0112-40A5-8927-588F1C4E89BC}"/>
+              </a:ext>
+            </a:extLst>
+          </p:cNvPr>
+          <p:cNvSpPr/>
+          <p:nvPr/>
+        </p:nvSpPr>
+        <p:spPr>
+          <a:xfrm>
+            <a:off x="7514436" y="5181600"/>
+            <a:ext cx="1872860" cy="755570"/>
+          </a:xfrm>
+          <a:prstGeom prst="flowChartProcess">
+            <a:avLst/>
+          </a:prstGeom>
+          <a:ln>
+            <a:solidFill>
+              <a:srgbClr val="0070C0"/>
+            </a:solidFill>
+          </a:ln>
+        </p:spPr>
+        <p:style>
+          <a:lnRef idx="2">
+            <a:schemeClr val="accent1">
+              <a:shade val="50000"/>
+            </a:schemeClr>
+          </a:lnRef>
+          <a:fillRef idx="1">
+            <a:schemeClr val="accent1"/>
+          </a:fillRef>
+          <a:effectRef idx="0">
+            <a:schemeClr val="accent1"/>
+          </a:effectRef>
+          <a:fontRef idx="minor">
+            <a:schemeClr val="lt1"/>
+          </a:fontRef>
+        </p:style>
+        <p:txBody>
+          <a:bodyPr rtlCol="0" anchor="ctr"/>
+          <a:lstStyle/>
+          <a:p>
+            <a:pPr marL="0" marR="0" lvl="0" indent="0" algn="ctr" defTabSz="914400" rtl="0" eaLnBrk="1" fontAlgn="auto" latinLnBrk="0" hangingPunct="1">
+              <a:lnSpc>
+                <a:spcPct val="100000"/>
+              </a:lnSpc>
+              <a:spcBef>
+                <a:spcPts val="0"/>
+              </a:spcBef>
+              <a:spcAft>
+                <a:spcPts val="0"/>
+              </a:spcAft>
+              <a:buClrTx/>
+              <a:buSzTx/>
+              <a:buFontTx/>
+              <a:buNone/>
+              <a:tabLst/>
+              <a:defRPr/>
+            </a:pPr>
+            <a:r>
+              <a:rPr kumimoji="0" lang="en-US" sz="1600" b="0" i="0" u="none" strike="noStrike" kern="1200" cap="none" spc="0" normalizeH="0" baseline="0" noProof="0" dirty="0">
+                <a:ln>
+                  <a:noFill/>
+                </a:ln>
+                <a:solidFill>
+                  <a:prstClr val="white"/>
+                </a:solidFill>
+                <a:effectLst/>
+                <a:uLnTx/>
+                <a:uFillTx/>
+                <a:latin typeface="Calibri" panose="020F0502020204030204"/>
+                <a:ea typeface="+mn-ea"/>
+                <a:cs typeface="+mn-cs"/>
+              </a:rPr>
+              <a:t>US Core Encounter</a:t>
+            </a:r>
+          </a:p>
+          <a:p>
+            <a:pPr marL="0" marR="0" lvl="0" indent="0" algn="ctr" defTabSz="914400" rtl="0" eaLnBrk="1" fontAlgn="auto" latinLnBrk="0" hangingPunct="1">
+              <a:lnSpc>
+                <a:spcPct val="100000"/>
+              </a:lnSpc>
+              <a:spcBef>
+                <a:spcPts val="0"/>
+              </a:spcBef>
+              <a:spcAft>
+                <a:spcPts val="0"/>
+              </a:spcAft>
+              <a:buClrTx/>
+              <a:buSzTx/>
+              <a:buFontTx/>
+              <a:buNone/>
+              <a:tabLst/>
+              <a:defRPr/>
+            </a:pPr>
+            <a:r>
+              <a:rPr lang="en-US" sz="1000" dirty="0">
+                <a:solidFill>
+                  <a:prstClr val="white"/>
+                </a:solidFill>
+                <a:latin typeface="Calibri" panose="020F0502020204030204"/>
+              </a:rPr>
+              <a:t>DOS: 09/26/2021</a:t>
+            </a:r>
+            <a:endParaRPr kumimoji="0" lang="en-US" sz="900" b="0" i="0" u="none" strike="noStrike" kern="1200" cap="none" spc="0" normalizeH="0" baseline="0" noProof="0" dirty="0">
+              <a:ln>
+                <a:noFill/>
+              </a:ln>
+              <a:solidFill>
+                <a:prstClr val="white"/>
+              </a:solidFill>
+              <a:effectLst/>
+              <a:uLnTx/>
+              <a:uFillTx/>
+              <a:latin typeface="Calibri" panose="020F0502020204030204"/>
+              <a:ea typeface="+mn-ea"/>
+              <a:cs typeface="+mn-cs"/>
+            </a:endParaRPr>
+          </a:p>
+        </p:txBody>
+      </p:sp>
+      <p:cxnSp>
+        <p:nvCxnSpPr>
+          <p:cNvPr id="59" name="Straight Arrow Connector 58">
+            <a:extLst>
+              <a:ext uri="{FF2B5EF4-FFF2-40B4-BE49-F238E27FC236}">
+                <a16:creationId xmlns:a16="http://schemas.microsoft.com/office/drawing/2014/main" id="{19C70E6E-2F47-4D51-8678-B99216131D78}"/>
+              </a:ext>
+            </a:extLst>
+          </p:cNvPr>
+          <p:cNvCxnSpPr>
+            <a:cxnSpLocks/>
+            <a:stCxn id="28" idx="3"/>
+            <a:endCxn id="50" idx="1"/>
+          </p:cNvCxnSpPr>
+          <p:nvPr/>
+        </p:nvCxnSpPr>
+        <p:spPr>
+          <a:xfrm>
+            <a:off x="5799757" y="2721279"/>
+            <a:ext cx="1690029" cy="23946"/>
+          </a:xfrm>
+          <a:prstGeom prst="straightConnector1">
+            <a:avLst/>
+          </a:prstGeom>
+          <a:ln w="12700">
+            <a:tailEnd type="triangle"/>
+          </a:ln>
+        </p:spPr>
+        <p:style>
+          <a:lnRef idx="1">
+            <a:schemeClr val="accent1"/>
+          </a:lnRef>
+          <a:fillRef idx="0">
+            <a:schemeClr val="accent1"/>
+          </a:fillRef>
+          <a:effectRef idx="0">
+            <a:schemeClr val="accent1"/>
+          </a:effectRef>
+          <a:fontRef idx="minor">
+            <a:schemeClr val="tx1"/>
+          </a:fontRef>
+        </p:style>
+      </p:cxnSp>
+      <p:cxnSp>
+        <p:nvCxnSpPr>
+          <p:cNvPr id="63" name="Straight Arrow Connector 62">
+            <a:extLst>
+              <a:ext uri="{FF2B5EF4-FFF2-40B4-BE49-F238E27FC236}">
+                <a16:creationId xmlns:a16="http://schemas.microsoft.com/office/drawing/2014/main" id="{4876D8A6-4F0A-447B-AC4E-61933C93FEE4}"/>
+              </a:ext>
+            </a:extLst>
+          </p:cNvPr>
+          <p:cNvCxnSpPr>
+            <a:cxnSpLocks/>
+            <a:stCxn id="32" idx="3"/>
+            <a:endCxn id="51" idx="1"/>
+          </p:cNvCxnSpPr>
+          <p:nvPr/>
+        </p:nvCxnSpPr>
+        <p:spPr>
+          <a:xfrm flipV="1">
+            <a:off x="5804277" y="4602745"/>
+            <a:ext cx="1710159" cy="4129"/>
+          </a:xfrm>
+          <a:prstGeom prst="straightConnector1">
+            <a:avLst/>
+          </a:prstGeom>
+          <a:ln w="12700">
+            <a:tailEnd type="triangle"/>
+          </a:ln>
+        </p:spPr>
+        <p:style>
+          <a:lnRef idx="1">
+            <a:schemeClr val="accent1"/>
+          </a:lnRef>
+          <a:fillRef idx="0">
+            <a:schemeClr val="accent1"/>
+          </a:fillRef>
+          <a:effectRef idx="0">
+            <a:schemeClr val="accent1"/>
+          </a:effectRef>
+          <a:fontRef idx="minor">
+            <a:schemeClr val="tx1"/>
+          </a:fontRef>
+        </p:style>
+      </p:cxnSp>
+      <p:cxnSp>
+        <p:nvCxnSpPr>
+          <p:cNvPr id="64" name="Straight Arrow Connector 63">
+            <a:extLst>
+              <a:ext uri="{FF2B5EF4-FFF2-40B4-BE49-F238E27FC236}">
+                <a16:creationId xmlns:a16="http://schemas.microsoft.com/office/drawing/2014/main" id="{A7D2EBC4-9411-4817-A86A-3F78AB2B534E}"/>
+              </a:ext>
+            </a:extLst>
+          </p:cNvPr>
+          <p:cNvCxnSpPr>
+            <a:cxnSpLocks/>
+            <a:stCxn id="35" idx="3"/>
+            <a:endCxn id="55" idx="1"/>
+          </p:cNvCxnSpPr>
+          <p:nvPr/>
+        </p:nvCxnSpPr>
+        <p:spPr>
+          <a:xfrm>
+            <a:off x="5796689" y="3624722"/>
+            <a:ext cx="1707599" cy="19241"/>
+          </a:xfrm>
+          <a:prstGeom prst="straightConnector1">
+            <a:avLst/>
+          </a:prstGeom>
+          <a:ln w="12700">
+            <a:tailEnd type="triangle"/>
+          </a:ln>
+        </p:spPr>
+        <p:style>
+          <a:lnRef idx="1">
+            <a:schemeClr val="accent1"/>
+          </a:lnRef>
+          <a:fillRef idx="0">
+            <a:schemeClr val="accent1"/>
+          </a:fillRef>
+          <a:effectRef idx="0">
+            <a:schemeClr val="accent1"/>
+          </a:effectRef>
+          <a:fontRef idx="minor">
+            <a:schemeClr val="tx1"/>
+          </a:fontRef>
+        </p:style>
+      </p:cxnSp>
+      <p:sp>
+        <p:nvSpPr>
+          <p:cNvPr id="76" name="TextBox 75">
+            <a:extLst>
+              <a:ext uri="{FF2B5EF4-FFF2-40B4-BE49-F238E27FC236}">
+                <a16:creationId xmlns:a16="http://schemas.microsoft.com/office/drawing/2014/main" id="{0712497F-FF6A-458E-92DD-01F72C350E7B}"/>
+              </a:ext>
+            </a:extLst>
+          </p:cNvPr>
+          <p:cNvSpPr txBox="1"/>
+          <p:nvPr/>
+        </p:nvSpPr>
+        <p:spPr>
+          <a:xfrm>
+            <a:off x="6054497" y="3510691"/>
+            <a:ext cx="1217539" cy="246221"/>
+          </a:xfrm>
+          <a:prstGeom prst="rect">
+            <a:avLst/>
+          </a:prstGeom>
+          <a:solidFill>
+            <a:schemeClr val="bg1"/>
+          </a:solidFill>
+        </p:spPr>
+        <p:txBody>
+          <a:bodyPr wrap="square" rtlCol="0">
+            <a:spAutoFit/>
+          </a:bodyPr>
+          <a:lstStyle/>
+          <a:p>
+            <a:pPr marL="0" marR="0" lvl="0" indent="0" algn="l" defTabSz="914400" rtl="0" eaLnBrk="1" fontAlgn="auto" latinLnBrk="0" hangingPunct="1">
+              <a:lnSpc>
+                <a:spcPct val="100000"/>
+              </a:lnSpc>
+              <a:spcBef>
+                <a:spcPts val="0"/>
+              </a:spcBef>
+              <a:spcAft>
+                <a:spcPts val="0"/>
+              </a:spcAft>
+              <a:buClrTx/>
+              <a:buSzTx/>
+              <a:buFontTx/>
+              <a:buNone/>
+              <a:tabLst/>
+              <a:defRPr/>
+            </a:pPr>
+            <a:r>
+              <a:rPr kumimoji="0" lang="en-US" sz="1000" b="1" i="0" u="none" strike="noStrike" kern="1200" cap="none" spc="0" normalizeH="0" baseline="0" noProof="0" dirty="0">
+                <a:ln>
+                  <a:noFill/>
+                </a:ln>
+                <a:solidFill>
+                  <a:prstClr val="black"/>
+                </a:solidFill>
+                <a:effectLst/>
+                <a:uLnTx/>
+                <a:uFillTx/>
+                <a:latin typeface="Calibri" panose="020F0502020204030204"/>
+                <a:ea typeface="+mn-ea"/>
+                <a:cs typeface="+mn-cs"/>
+              </a:rPr>
+              <a:t>evaluatedResource</a:t>
+            </a:r>
+            <a:endParaRPr kumimoji="0" lang="en-US" sz="900" b="1" i="0" u="none" strike="noStrike" kern="1200" cap="none" spc="0" normalizeH="0" baseline="0" noProof="0" dirty="0">
+              <a:ln>
+                <a:noFill/>
+              </a:ln>
+              <a:solidFill>
+                <a:prstClr val="black"/>
+              </a:solidFill>
+              <a:effectLst/>
+              <a:uLnTx/>
+              <a:uFillTx/>
+              <a:latin typeface="Calibri" panose="020F0502020204030204"/>
+              <a:ea typeface="+mn-ea"/>
+              <a:cs typeface="+mn-cs"/>
+            </a:endParaRPr>
+          </a:p>
+        </p:txBody>
+      </p:sp>
+      <p:sp>
+        <p:nvSpPr>
+          <p:cNvPr id="77" name="TextBox 76">
+            <a:extLst>
+              <a:ext uri="{FF2B5EF4-FFF2-40B4-BE49-F238E27FC236}">
+                <a16:creationId xmlns:a16="http://schemas.microsoft.com/office/drawing/2014/main" id="{1DC807B2-EF1A-43C9-8B03-FDA2A3A65E64}"/>
+              </a:ext>
+            </a:extLst>
+          </p:cNvPr>
+          <p:cNvSpPr txBox="1"/>
+          <p:nvPr/>
+        </p:nvSpPr>
+        <p:spPr>
+          <a:xfrm>
+            <a:off x="6084397" y="4479634"/>
+            <a:ext cx="1217539" cy="246221"/>
+          </a:xfrm>
+          <a:prstGeom prst="rect">
+            <a:avLst/>
+          </a:prstGeom>
+          <a:solidFill>
+            <a:schemeClr val="bg1"/>
+          </a:solidFill>
+        </p:spPr>
+        <p:txBody>
+          <a:bodyPr wrap="square" rtlCol="0">
+            <a:spAutoFit/>
+          </a:bodyPr>
+          <a:lstStyle/>
+          <a:p>
+            <a:pPr marL="0" marR="0" lvl="0" indent="0" algn="l" defTabSz="914400" rtl="0" eaLnBrk="1" fontAlgn="auto" latinLnBrk="0" hangingPunct="1">
+              <a:lnSpc>
+                <a:spcPct val="100000"/>
+              </a:lnSpc>
+              <a:spcBef>
+                <a:spcPts val="0"/>
+              </a:spcBef>
+              <a:spcAft>
+                <a:spcPts val="0"/>
+              </a:spcAft>
+              <a:buClrTx/>
+              <a:buSzTx/>
+              <a:buFontTx/>
+              <a:buNone/>
+              <a:tabLst/>
+              <a:defRPr/>
+            </a:pPr>
+            <a:r>
+              <a:rPr kumimoji="0" lang="en-US" sz="1000" b="1" i="0" u="none" strike="noStrike" kern="1200" cap="none" spc="0" normalizeH="0" baseline="0" noProof="0" dirty="0">
+                <a:ln>
+                  <a:noFill/>
+                </a:ln>
+                <a:solidFill>
+                  <a:prstClr val="black"/>
+                </a:solidFill>
+                <a:effectLst/>
+                <a:uLnTx/>
+                <a:uFillTx/>
+                <a:latin typeface="Calibri" panose="020F0502020204030204"/>
+                <a:ea typeface="+mn-ea"/>
+                <a:cs typeface="+mn-cs"/>
+              </a:rPr>
+              <a:t>evaluatedResource</a:t>
+            </a:r>
+            <a:endParaRPr kumimoji="0" lang="en-US" sz="900" b="1" i="0" u="none" strike="noStrike" kern="1200" cap="none" spc="0" normalizeH="0" baseline="0" noProof="0" dirty="0">
+              <a:ln>
+                <a:noFill/>
+              </a:ln>
+              <a:solidFill>
+                <a:prstClr val="black"/>
+              </a:solidFill>
+              <a:effectLst/>
+              <a:uLnTx/>
+              <a:uFillTx/>
+              <a:latin typeface="Calibri" panose="020F0502020204030204"/>
+              <a:ea typeface="+mn-ea"/>
+              <a:cs typeface="+mn-cs"/>
+            </a:endParaRPr>
+          </a:p>
+        </p:txBody>
+      </p:sp>
+      <p:cxnSp>
+        <p:nvCxnSpPr>
+          <p:cNvPr id="91" name="Straight Arrow Connector 90">
+            <a:extLst>
+              <a:ext uri="{FF2B5EF4-FFF2-40B4-BE49-F238E27FC236}">
+                <a16:creationId xmlns:a16="http://schemas.microsoft.com/office/drawing/2014/main" id="{254DEF4E-9D1A-48E0-B245-D8C08901FA27}"/>
+              </a:ext>
+            </a:extLst>
+          </p:cNvPr>
+          <p:cNvCxnSpPr>
+            <a:cxnSpLocks/>
+            <a:endCxn id="56" idx="1"/>
+          </p:cNvCxnSpPr>
+          <p:nvPr/>
+        </p:nvCxnSpPr>
+        <p:spPr>
+          <a:xfrm flipV="1">
+            <a:off x="5827187" y="1798671"/>
+            <a:ext cx="1654980" cy="922608"/>
+          </a:xfrm>
+          <a:prstGeom prst="straightConnector1">
+            <a:avLst/>
+          </a:prstGeom>
+          <a:ln w="12700">
+            <a:tailEnd type="triangle"/>
+          </a:ln>
+        </p:spPr>
+        <p:style>
+          <a:lnRef idx="1">
+            <a:schemeClr val="accent1"/>
+          </a:lnRef>
+          <a:fillRef idx="0">
+            <a:schemeClr val="accent1"/>
+          </a:fillRef>
+          <a:effectRef idx="0">
+            <a:schemeClr val="accent1"/>
+          </a:effectRef>
+          <a:fontRef idx="minor">
+            <a:schemeClr val="tx1"/>
+          </a:fontRef>
+        </p:style>
+      </p:cxnSp>
+      <p:sp>
+        <p:nvSpPr>
+          <p:cNvPr id="93" name="TextBox 92">
+            <a:extLst>
+              <a:ext uri="{FF2B5EF4-FFF2-40B4-BE49-F238E27FC236}">
+                <a16:creationId xmlns:a16="http://schemas.microsoft.com/office/drawing/2014/main" id="{9420730E-079C-4158-8650-264C4A2C42DC}"/>
+              </a:ext>
+            </a:extLst>
+          </p:cNvPr>
+          <p:cNvSpPr txBox="1"/>
+          <p:nvPr/>
+        </p:nvSpPr>
+        <p:spPr>
+          <a:xfrm rot="19834726">
+            <a:off x="6072534" y="2069610"/>
+            <a:ext cx="1217539" cy="246221"/>
+          </a:xfrm>
+          <a:prstGeom prst="rect">
+            <a:avLst/>
+          </a:prstGeom>
+          <a:solidFill>
+            <a:schemeClr val="bg1"/>
+          </a:solidFill>
+        </p:spPr>
+        <p:txBody>
+          <a:bodyPr wrap="square" rtlCol="0">
+            <a:spAutoFit/>
+          </a:bodyPr>
+          <a:lstStyle/>
+          <a:p>
+            <a:pPr marL="0" marR="0" lvl="0" indent="0" algn="l" defTabSz="914400" rtl="0" eaLnBrk="1" fontAlgn="auto" latinLnBrk="0" hangingPunct="1">
+              <a:lnSpc>
+                <a:spcPct val="100000"/>
+              </a:lnSpc>
+              <a:spcBef>
+                <a:spcPts val="0"/>
+              </a:spcBef>
+              <a:spcAft>
+                <a:spcPts val="0"/>
+              </a:spcAft>
+              <a:buClrTx/>
+              <a:buSzTx/>
+              <a:buFontTx/>
+              <a:buNone/>
+              <a:tabLst/>
+              <a:defRPr/>
+            </a:pPr>
+            <a:r>
+              <a:rPr kumimoji="0" lang="en-US" sz="1000" b="1" i="0" u="none" strike="noStrike" kern="1200" cap="none" spc="0" normalizeH="0" baseline="0" noProof="0" dirty="0">
+                <a:ln>
+                  <a:noFill/>
+                </a:ln>
+                <a:solidFill>
+                  <a:prstClr val="black"/>
+                </a:solidFill>
+                <a:effectLst/>
+                <a:uLnTx/>
+                <a:uFillTx/>
+                <a:latin typeface="Calibri" panose="020F0502020204030204"/>
+                <a:ea typeface="+mn-ea"/>
+                <a:cs typeface="+mn-cs"/>
+              </a:rPr>
+              <a:t>evaluatedResource</a:t>
+            </a:r>
+            <a:endParaRPr kumimoji="0" lang="en-US" sz="900" b="1" i="0" u="none" strike="noStrike" kern="1200" cap="none" spc="0" normalizeH="0" baseline="0" noProof="0" dirty="0">
+              <a:ln>
+                <a:noFill/>
+              </a:ln>
+              <a:solidFill>
+                <a:prstClr val="black"/>
+              </a:solidFill>
+              <a:effectLst/>
+              <a:uLnTx/>
+              <a:uFillTx/>
+              <a:latin typeface="Calibri" panose="020F0502020204030204"/>
+              <a:ea typeface="+mn-ea"/>
+              <a:cs typeface="+mn-cs"/>
+            </a:endParaRPr>
+          </a:p>
+        </p:txBody>
+      </p:sp>
+      <p:cxnSp>
+        <p:nvCxnSpPr>
+          <p:cNvPr id="95" name="Straight Arrow Connector 94">
+            <a:extLst>
+              <a:ext uri="{FF2B5EF4-FFF2-40B4-BE49-F238E27FC236}">
+                <a16:creationId xmlns:a16="http://schemas.microsoft.com/office/drawing/2014/main" id="{106EB4D3-C864-4696-9DE9-5D27123A6680}"/>
+              </a:ext>
+            </a:extLst>
+          </p:cNvPr>
+          <p:cNvCxnSpPr>
+            <a:cxnSpLocks/>
+            <a:stCxn id="35" idx="3"/>
+            <a:endCxn id="56" idx="1"/>
+          </p:cNvCxnSpPr>
+          <p:nvPr/>
+        </p:nvCxnSpPr>
+        <p:spPr>
+          <a:xfrm flipV="1">
+            <a:off x="5796689" y="1798671"/>
+            <a:ext cx="1685478" cy="1826051"/>
+          </a:xfrm>
+          <a:prstGeom prst="straightConnector1">
+            <a:avLst/>
+          </a:prstGeom>
+          <a:ln w="12700">
+            <a:tailEnd type="triangle"/>
+          </a:ln>
+        </p:spPr>
+        <p:style>
+          <a:lnRef idx="1">
+            <a:schemeClr val="accent1"/>
+          </a:lnRef>
+          <a:fillRef idx="0">
+            <a:schemeClr val="accent1"/>
+          </a:fillRef>
+          <a:effectRef idx="0">
+            <a:schemeClr val="accent1"/>
+          </a:effectRef>
+          <a:fontRef idx="minor">
+            <a:schemeClr val="tx1"/>
+          </a:fontRef>
+        </p:style>
+      </p:cxnSp>
+      <p:sp>
+        <p:nvSpPr>
+          <p:cNvPr id="98" name="TextBox 97">
+            <a:extLst>
+              <a:ext uri="{FF2B5EF4-FFF2-40B4-BE49-F238E27FC236}">
+                <a16:creationId xmlns:a16="http://schemas.microsoft.com/office/drawing/2014/main" id="{B7081640-A001-43D9-BD01-BBCA9A8AADF1}"/>
+              </a:ext>
+            </a:extLst>
+          </p:cNvPr>
+          <p:cNvSpPr txBox="1"/>
+          <p:nvPr/>
+        </p:nvSpPr>
+        <p:spPr>
+          <a:xfrm>
+            <a:off x="6054497" y="2622114"/>
+            <a:ext cx="1217539" cy="246221"/>
+          </a:xfrm>
+          <a:prstGeom prst="rect">
+            <a:avLst/>
+          </a:prstGeom>
+          <a:solidFill>
+            <a:schemeClr val="bg1"/>
+          </a:solidFill>
+        </p:spPr>
+        <p:txBody>
+          <a:bodyPr wrap="square" rtlCol="0">
+            <a:spAutoFit/>
+          </a:bodyPr>
+          <a:lstStyle/>
+          <a:p>
+            <a:pPr marL="0" marR="0" lvl="0" indent="0" algn="l" defTabSz="914400" rtl="0" eaLnBrk="1" fontAlgn="auto" latinLnBrk="0" hangingPunct="1">
+              <a:lnSpc>
+                <a:spcPct val="100000"/>
+              </a:lnSpc>
+              <a:spcBef>
+                <a:spcPts val="0"/>
+              </a:spcBef>
+              <a:spcAft>
+                <a:spcPts val="0"/>
+              </a:spcAft>
+              <a:buClrTx/>
+              <a:buSzTx/>
+              <a:buFontTx/>
+              <a:buNone/>
+              <a:tabLst/>
+              <a:defRPr/>
+            </a:pPr>
+            <a:r>
+              <a:rPr kumimoji="0" lang="en-US" sz="1000" b="1" i="0" u="none" strike="noStrike" kern="1200" cap="none" spc="0" normalizeH="0" baseline="0" noProof="0" dirty="0">
+                <a:ln>
+                  <a:noFill/>
+                </a:ln>
+                <a:solidFill>
+                  <a:prstClr val="black"/>
+                </a:solidFill>
+                <a:effectLst/>
+                <a:uLnTx/>
+                <a:uFillTx/>
+                <a:latin typeface="Calibri" panose="020F0502020204030204"/>
+                <a:ea typeface="+mn-ea"/>
+                <a:cs typeface="+mn-cs"/>
+              </a:rPr>
+              <a:t>evaluatedResource</a:t>
+            </a:r>
+            <a:endParaRPr kumimoji="0" lang="en-US" sz="900" b="1" i="0" u="none" strike="noStrike" kern="1200" cap="none" spc="0" normalizeH="0" baseline="0" noProof="0" dirty="0">
+              <a:ln>
+                <a:noFill/>
+              </a:ln>
+              <a:solidFill>
+                <a:prstClr val="black"/>
+              </a:solidFill>
+              <a:effectLst/>
+              <a:uLnTx/>
+              <a:uFillTx/>
+              <a:latin typeface="Calibri" panose="020F0502020204030204"/>
+              <a:ea typeface="+mn-ea"/>
+              <a:cs typeface="+mn-cs"/>
+            </a:endParaRPr>
+          </a:p>
+        </p:txBody>
+      </p:sp>
+      <p:cxnSp>
+        <p:nvCxnSpPr>
+          <p:cNvPr id="99" name="Straight Arrow Connector 98">
+            <a:extLst>
+              <a:ext uri="{FF2B5EF4-FFF2-40B4-BE49-F238E27FC236}">
+                <a16:creationId xmlns:a16="http://schemas.microsoft.com/office/drawing/2014/main" id="{6521FE98-80AD-48C7-A1CE-B36238BE7C76}"/>
+              </a:ext>
+            </a:extLst>
+          </p:cNvPr>
+          <p:cNvCxnSpPr>
+            <a:cxnSpLocks/>
+            <a:stCxn id="32" idx="3"/>
+            <a:endCxn id="58" idx="1"/>
+          </p:cNvCxnSpPr>
+          <p:nvPr/>
+        </p:nvCxnSpPr>
+        <p:spPr>
+          <a:xfrm>
+            <a:off x="5804277" y="4606874"/>
+            <a:ext cx="1710159" cy="952511"/>
+          </a:xfrm>
+          <a:prstGeom prst="straightConnector1">
+            <a:avLst/>
+          </a:prstGeom>
+          <a:ln w="12700">
+            <a:tailEnd type="triangle"/>
+          </a:ln>
+        </p:spPr>
+        <p:style>
+          <a:lnRef idx="1">
+            <a:schemeClr val="accent1"/>
+          </a:lnRef>
+          <a:fillRef idx="0">
+            <a:schemeClr val="accent1"/>
+          </a:fillRef>
+          <a:effectRef idx="0">
+            <a:schemeClr val="accent1"/>
+          </a:effectRef>
+          <a:fontRef idx="minor">
+            <a:schemeClr val="tx1"/>
+          </a:fontRef>
+        </p:style>
+      </p:cxnSp>
+      <p:sp>
+        <p:nvSpPr>
+          <p:cNvPr id="102" name="TextBox 101">
+            <a:extLst>
+              <a:ext uri="{FF2B5EF4-FFF2-40B4-BE49-F238E27FC236}">
+                <a16:creationId xmlns:a16="http://schemas.microsoft.com/office/drawing/2014/main" id="{ABE0BA0A-6327-43E5-AF27-F008F2D92186}"/>
+              </a:ext>
+            </a:extLst>
+          </p:cNvPr>
+          <p:cNvSpPr txBox="1"/>
+          <p:nvPr/>
+        </p:nvSpPr>
+        <p:spPr>
+          <a:xfrm rot="1725328">
+            <a:off x="6089278" y="4994194"/>
+            <a:ext cx="1217539" cy="246221"/>
+          </a:xfrm>
+          <a:prstGeom prst="rect">
+            <a:avLst/>
+          </a:prstGeom>
+          <a:solidFill>
+            <a:schemeClr val="bg1"/>
+          </a:solidFill>
+        </p:spPr>
+        <p:txBody>
+          <a:bodyPr wrap="square" rtlCol="0">
+            <a:spAutoFit/>
+          </a:bodyPr>
+          <a:lstStyle/>
+          <a:p>
+            <a:pPr marL="0" marR="0" lvl="0" indent="0" algn="l" defTabSz="914400" rtl="0" eaLnBrk="1" fontAlgn="auto" latinLnBrk="0" hangingPunct="1">
+              <a:lnSpc>
+                <a:spcPct val="100000"/>
+              </a:lnSpc>
+              <a:spcBef>
+                <a:spcPts val="0"/>
+              </a:spcBef>
+              <a:spcAft>
+                <a:spcPts val="0"/>
+              </a:spcAft>
+              <a:buClrTx/>
+              <a:buSzTx/>
+              <a:buFontTx/>
+              <a:buNone/>
+              <a:tabLst/>
+              <a:defRPr/>
+            </a:pPr>
+            <a:r>
+              <a:rPr kumimoji="0" lang="en-US" sz="1000" b="1" i="0" u="none" strike="noStrike" kern="1200" cap="none" spc="0" normalizeH="0" baseline="0" noProof="0" dirty="0">
+                <a:ln>
+                  <a:noFill/>
+                </a:ln>
+                <a:solidFill>
+                  <a:prstClr val="black"/>
+                </a:solidFill>
+                <a:effectLst/>
+                <a:uLnTx/>
+                <a:uFillTx/>
+                <a:latin typeface="Calibri" panose="020F0502020204030204"/>
+                <a:ea typeface="+mn-ea"/>
+                <a:cs typeface="+mn-cs"/>
+              </a:rPr>
+              <a:t>evaluatedResource</a:t>
+            </a:r>
+            <a:endParaRPr kumimoji="0" lang="en-US" sz="900" b="1" i="0" u="none" strike="noStrike" kern="1200" cap="none" spc="0" normalizeH="0" baseline="0" noProof="0" dirty="0">
+              <a:ln>
+                <a:noFill/>
+              </a:ln>
+              <a:solidFill>
+                <a:prstClr val="black"/>
+              </a:solidFill>
+              <a:effectLst/>
+              <a:uLnTx/>
+              <a:uFillTx/>
+              <a:latin typeface="Calibri" panose="020F0502020204030204"/>
+              <a:ea typeface="+mn-ea"/>
+              <a:cs typeface="+mn-cs"/>
+            </a:endParaRPr>
+          </a:p>
+        </p:txBody>
+      </p:sp>
+      <p:cxnSp>
+        <p:nvCxnSpPr>
+          <p:cNvPr id="103" name="Straight Arrow Connector 102">
+            <a:extLst>
+              <a:ext uri="{FF2B5EF4-FFF2-40B4-BE49-F238E27FC236}">
+                <a16:creationId xmlns:a16="http://schemas.microsoft.com/office/drawing/2014/main" id="{B13031F9-623E-4B92-AB8D-504A75028369}"/>
+              </a:ext>
+            </a:extLst>
+          </p:cNvPr>
+          <p:cNvCxnSpPr>
+            <a:cxnSpLocks/>
+            <a:stCxn id="6" idx="1"/>
+            <a:endCxn id="16" idx="3"/>
+          </p:cNvCxnSpPr>
+          <p:nvPr/>
+        </p:nvCxnSpPr>
+        <p:spPr>
+          <a:xfrm flipH="1">
+            <a:off x="2665401" y="3451868"/>
+            <a:ext cx="1222107" cy="1277006"/>
+          </a:xfrm>
+          <a:prstGeom prst="straightConnector1">
+            <a:avLst/>
+          </a:prstGeom>
+          <a:ln w="12700">
+            <a:tailEnd type="triangle"/>
+          </a:ln>
+        </p:spPr>
+        <p:style>
+          <a:lnRef idx="1">
+            <a:schemeClr val="accent1"/>
+          </a:lnRef>
+          <a:fillRef idx="0">
+            <a:schemeClr val="accent1"/>
+          </a:fillRef>
+          <a:effectRef idx="0">
+            <a:schemeClr val="accent1"/>
+          </a:effectRef>
+          <a:fontRef idx="minor">
+            <a:schemeClr val="tx1"/>
+          </a:fontRef>
+        </p:style>
+      </p:cxnSp>
+      <p:sp>
+        <p:nvSpPr>
+          <p:cNvPr id="111" name="TextBox 110">
+            <a:extLst>
+              <a:ext uri="{FF2B5EF4-FFF2-40B4-BE49-F238E27FC236}">
+                <a16:creationId xmlns:a16="http://schemas.microsoft.com/office/drawing/2014/main" id="{5D6EBA97-FE36-4527-A824-39C4F2447318}"/>
+              </a:ext>
+            </a:extLst>
+          </p:cNvPr>
+          <p:cNvSpPr txBox="1"/>
+          <p:nvPr/>
+        </p:nvSpPr>
+        <p:spPr>
+          <a:xfrm>
+            <a:off x="3058140" y="952576"/>
+            <a:ext cx="580599" cy="246221"/>
+          </a:xfrm>
+          <a:prstGeom prst="rect">
+            <a:avLst/>
+          </a:prstGeom>
+          <a:solidFill>
+            <a:schemeClr val="bg1"/>
+          </a:solidFill>
+        </p:spPr>
+        <p:txBody>
+          <a:bodyPr wrap="square" rtlCol="0">
+            <a:spAutoFit/>
+          </a:bodyPr>
+          <a:lstStyle/>
+          <a:p>
+            <a:pPr marL="0" marR="0" lvl="0" indent="0" algn="l" defTabSz="914400" rtl="0" eaLnBrk="1" fontAlgn="auto" latinLnBrk="0" hangingPunct="1">
+              <a:lnSpc>
+                <a:spcPct val="100000"/>
+              </a:lnSpc>
+              <a:spcBef>
+                <a:spcPts val="0"/>
+              </a:spcBef>
+              <a:spcAft>
+                <a:spcPts val="0"/>
+              </a:spcAft>
+              <a:buClrTx/>
+              <a:buSzTx/>
+              <a:buFontTx/>
+              <a:buNone/>
+              <a:tabLst/>
+              <a:defRPr/>
+            </a:pPr>
+            <a:r>
+              <a:rPr kumimoji="0" lang="en-US" sz="1000" b="1" i="0" u="none" strike="noStrike" kern="1200" cap="none" spc="0" normalizeH="0" baseline="0" noProof="0" dirty="0">
+                <a:ln>
+                  <a:noFill/>
+                </a:ln>
+                <a:solidFill>
+                  <a:prstClr val="black"/>
+                </a:solidFill>
+                <a:effectLst/>
+                <a:uLnTx/>
+                <a:uFillTx/>
+                <a:latin typeface="Calibri" panose="020F0502020204030204"/>
+                <a:ea typeface="+mn-ea"/>
+                <a:cs typeface="+mn-cs"/>
+              </a:rPr>
+              <a:t>entry</a:t>
+            </a:r>
+            <a:endParaRPr kumimoji="0" lang="en-US" sz="900" b="1" i="0" u="none" strike="noStrike" kern="1200" cap="none" spc="0" normalizeH="0" baseline="0" noProof="0" dirty="0">
+              <a:ln>
+                <a:noFill/>
+              </a:ln>
+              <a:solidFill>
+                <a:prstClr val="black"/>
+              </a:solidFill>
+              <a:effectLst/>
+              <a:uLnTx/>
+              <a:uFillTx/>
+              <a:latin typeface="Calibri" panose="020F0502020204030204"/>
+              <a:ea typeface="+mn-ea"/>
+              <a:cs typeface="+mn-cs"/>
+            </a:endParaRPr>
+          </a:p>
+        </p:txBody>
+      </p:sp>
+      <p:sp>
+        <p:nvSpPr>
+          <p:cNvPr id="113" name="TextBox 112">
+            <a:extLst>
+              <a:ext uri="{FF2B5EF4-FFF2-40B4-BE49-F238E27FC236}">
+                <a16:creationId xmlns:a16="http://schemas.microsoft.com/office/drawing/2014/main" id="{05AAD563-13F4-4BA3-B6D6-B95685BE5C19}"/>
+              </a:ext>
+            </a:extLst>
+          </p:cNvPr>
+          <p:cNvSpPr txBox="1"/>
+          <p:nvPr/>
+        </p:nvSpPr>
+        <p:spPr>
+          <a:xfrm>
+            <a:off x="2986155" y="3999070"/>
+            <a:ext cx="652584" cy="246221"/>
+          </a:xfrm>
+          <a:prstGeom prst="rect">
+            <a:avLst/>
+          </a:prstGeom>
+          <a:solidFill>
+            <a:schemeClr val="bg1"/>
+          </a:solidFill>
+        </p:spPr>
+        <p:txBody>
+          <a:bodyPr wrap="square" rtlCol="0">
+            <a:spAutoFit/>
+          </a:bodyPr>
+          <a:lstStyle/>
+          <a:p>
+            <a:pPr marL="0" marR="0" lvl="0" indent="0" algn="l" defTabSz="914400" rtl="0" eaLnBrk="1" fontAlgn="auto" latinLnBrk="0" hangingPunct="1">
+              <a:lnSpc>
+                <a:spcPct val="100000"/>
+              </a:lnSpc>
+              <a:spcBef>
+                <a:spcPts val="0"/>
+              </a:spcBef>
+              <a:spcAft>
+                <a:spcPts val="0"/>
+              </a:spcAft>
+              <a:buClrTx/>
+              <a:buSzTx/>
+              <a:buFontTx/>
+              <a:buNone/>
+              <a:tabLst/>
+              <a:defRPr/>
+            </a:pPr>
+            <a:r>
+              <a:rPr kumimoji="0" lang="en-US" sz="1000" b="1" i="0" u="none" strike="noStrike" kern="1200" cap="none" spc="0" normalizeH="0" baseline="0" noProof="0" dirty="0">
+                <a:ln>
+                  <a:noFill/>
+                </a:ln>
+                <a:solidFill>
+                  <a:prstClr val="black"/>
+                </a:solidFill>
+                <a:effectLst/>
+                <a:uLnTx/>
+                <a:uFillTx/>
+                <a:latin typeface="Calibri" panose="020F0502020204030204"/>
+                <a:ea typeface="+mn-ea"/>
+                <a:cs typeface="+mn-cs"/>
+              </a:rPr>
+              <a:t>reporter</a:t>
+            </a:r>
+            <a:endParaRPr kumimoji="0" lang="en-US" sz="900" b="1" i="0" u="none" strike="noStrike" kern="1200" cap="none" spc="0" normalizeH="0" baseline="0" noProof="0" dirty="0">
+              <a:ln>
+                <a:noFill/>
+              </a:ln>
+              <a:solidFill>
+                <a:prstClr val="black"/>
+              </a:solidFill>
+              <a:effectLst/>
+              <a:uLnTx/>
+              <a:uFillTx/>
+              <a:latin typeface="Calibri" panose="020F0502020204030204"/>
+              <a:ea typeface="+mn-ea"/>
+              <a:cs typeface="+mn-cs"/>
+            </a:endParaRPr>
+          </a:p>
+        </p:txBody>
+      </p:sp>
+      <p:cxnSp>
+        <p:nvCxnSpPr>
+          <p:cNvPr id="114" name="Straight Arrow Connector 113">
+            <a:extLst>
+              <a:ext uri="{FF2B5EF4-FFF2-40B4-BE49-F238E27FC236}">
+                <a16:creationId xmlns:a16="http://schemas.microsoft.com/office/drawing/2014/main" id="{27DB4D4F-0EAE-406D-8D42-7F23F83D1907}"/>
+              </a:ext>
+            </a:extLst>
+          </p:cNvPr>
+          <p:cNvCxnSpPr>
+            <a:cxnSpLocks/>
+            <a:stCxn id="5" idx="2"/>
+            <a:endCxn id="11" idx="0"/>
+          </p:cNvCxnSpPr>
+          <p:nvPr/>
+        </p:nvCxnSpPr>
+        <p:spPr>
+          <a:xfrm>
+            <a:off x="1759909" y="1215460"/>
+            <a:ext cx="0" cy="1858623"/>
+          </a:xfrm>
+          <a:prstGeom prst="straightConnector1">
+            <a:avLst/>
+          </a:prstGeom>
+          <a:ln w="12700">
+            <a:tailEnd type="triangle"/>
+          </a:ln>
+        </p:spPr>
+        <p:style>
+          <a:lnRef idx="1">
+            <a:schemeClr val="accent1"/>
+          </a:lnRef>
+          <a:fillRef idx="0">
+            <a:schemeClr val="accent1"/>
+          </a:fillRef>
+          <a:effectRef idx="0">
+            <a:schemeClr val="accent1"/>
+          </a:effectRef>
+          <a:fontRef idx="minor">
+            <a:schemeClr val="tx1"/>
+          </a:fontRef>
+        </p:style>
+      </p:cxnSp>
+      <p:sp>
+        <p:nvSpPr>
+          <p:cNvPr id="117" name="TextBox 116">
+            <a:extLst>
+              <a:ext uri="{FF2B5EF4-FFF2-40B4-BE49-F238E27FC236}">
+                <a16:creationId xmlns:a16="http://schemas.microsoft.com/office/drawing/2014/main" id="{DD388C81-A24F-42E4-86C7-975B661F035A}"/>
+              </a:ext>
+            </a:extLst>
+          </p:cNvPr>
+          <p:cNvSpPr txBox="1"/>
+          <p:nvPr/>
+        </p:nvSpPr>
+        <p:spPr>
+          <a:xfrm>
+            <a:off x="1537076" y="1898550"/>
+            <a:ext cx="580599" cy="246221"/>
+          </a:xfrm>
+          <a:prstGeom prst="rect">
+            <a:avLst/>
+          </a:prstGeom>
+          <a:solidFill>
+            <a:schemeClr val="bg1"/>
+          </a:solidFill>
+        </p:spPr>
+        <p:txBody>
+          <a:bodyPr wrap="square" rtlCol="0">
+            <a:spAutoFit/>
+          </a:bodyPr>
+          <a:lstStyle/>
+          <a:p>
+            <a:pPr marL="0" marR="0" lvl="0" indent="0" algn="l" defTabSz="914400" rtl="0" eaLnBrk="1" fontAlgn="auto" latinLnBrk="0" hangingPunct="1">
+              <a:lnSpc>
+                <a:spcPct val="100000"/>
+              </a:lnSpc>
+              <a:spcBef>
+                <a:spcPts val="0"/>
+              </a:spcBef>
+              <a:spcAft>
+                <a:spcPts val="0"/>
+              </a:spcAft>
+              <a:buClrTx/>
+              <a:buSzTx/>
+              <a:buFontTx/>
+              <a:buNone/>
+              <a:tabLst/>
+              <a:defRPr/>
+            </a:pPr>
+            <a:r>
+              <a:rPr kumimoji="0" lang="en-US" sz="1000" b="1" i="0" u="none" strike="noStrike" kern="1200" cap="none" spc="0" normalizeH="0" baseline="0" noProof="0" dirty="0">
+                <a:ln>
+                  <a:noFill/>
+                </a:ln>
+                <a:solidFill>
+                  <a:prstClr val="black"/>
+                </a:solidFill>
+                <a:effectLst/>
+                <a:uLnTx/>
+                <a:uFillTx/>
+                <a:latin typeface="Calibri" panose="020F0502020204030204"/>
+                <a:ea typeface="+mn-ea"/>
+                <a:cs typeface="+mn-cs"/>
+              </a:rPr>
+              <a:t>entry</a:t>
+            </a:r>
+            <a:endParaRPr kumimoji="0" lang="en-US" sz="900" b="1" i="0" u="none" strike="noStrike" kern="1200" cap="none" spc="0" normalizeH="0" baseline="0" noProof="0" dirty="0">
+              <a:ln>
+                <a:noFill/>
+              </a:ln>
+              <a:solidFill>
+                <a:prstClr val="black"/>
+              </a:solidFill>
+              <a:effectLst/>
+              <a:uLnTx/>
+              <a:uFillTx/>
+              <a:latin typeface="Calibri" panose="020F0502020204030204"/>
+              <a:ea typeface="+mn-ea"/>
+              <a:cs typeface="+mn-cs"/>
+            </a:endParaRPr>
+          </a:p>
+        </p:txBody>
+      </p:sp>
+    </p:spTree>
+    <p:extLst>
+      <p:ext uri="{BB962C8B-B14F-4D97-AF65-F5344CB8AC3E}">
+        <p14:creationId xmlns:p14="http://schemas.microsoft.com/office/powerpoint/2010/main" val="3283057723"/>
+      </p:ext>
+    </p:extLst>
+  </p:cSld>
+  <p:clrMapOvr>
+    <a:masterClrMapping/>
+  </p:clrMapOvr>
+</p:sld>
+</file>
+
 <file path=ppt/slides/slide5.xml><?xml version="1.0" encoding="utf-8"?>
 <p:sld xmlns:a="http://schemas.openxmlformats.org/drawingml/2006/main" xmlns:r="http://schemas.openxmlformats.org/officeDocument/2006/relationships" xmlns:p="http://schemas.openxmlformats.org/presentationml/2006/main">
   <p:cSld>
@@ -46613,7 +50193,27 @@
                 <a:latin typeface="Arial" panose="020B0604020202020204" pitchFamily="34" charset="0"/>
                 <a:cs typeface="Arial" panose="020B0604020202020204" pitchFamily="34" charset="0"/>
               </a:rPr>
-              <a:t>Bundle(searchset) from MeasureReport Query</a:t>
+              <a:t>Bundle(</a:t>
+            </a:r>
+            <a:r>
+              <a:rPr lang="en-US" sz="1400" b="1" dirty="0" err="1">
+                <a:solidFill>
+                  <a:schemeClr val="tx1"/>
+                </a:solidFill>
+                <a:latin typeface="Arial" panose="020B0604020202020204" pitchFamily="34" charset="0"/>
+                <a:cs typeface="Arial" panose="020B0604020202020204" pitchFamily="34" charset="0"/>
+              </a:rPr>
+              <a:t>searchset</a:t>
+            </a:r>
+            <a:r>
+              <a:rPr lang="en-US" sz="1400" b="1" dirty="0">
+                <a:solidFill>
+                  <a:schemeClr val="tx1"/>
+                </a:solidFill>
+                <a:latin typeface="Arial" panose="020B0604020202020204" pitchFamily="34" charset="0"/>
+                <a:cs typeface="Arial" panose="020B0604020202020204" pitchFamily="34" charset="0"/>
+              </a:rPr>
+              <a:t>) from MeasureReport Query</a:t>
             </a:r>
           </a:p>
         </p:txBody>
@@ -47591,7 +51191,27 @@
                 <a:latin typeface="Arial" panose="020B0604020202020204" pitchFamily="34" charset="0"/>
                 <a:cs typeface="Arial" panose="020B0604020202020204" pitchFamily="34" charset="0"/>
               </a:rPr>
-              <a:t>Bundle (searchset) from MeasureReport Query</a:t>
+              <a:t>Bundle (</a:t>
+            </a:r>
+            <a:r>
+              <a:rPr lang="en-US" sz="1400" b="1" dirty="0" err="1">
+                <a:solidFill>
+                  <a:schemeClr val="tx1"/>
+                </a:solidFill>
+                <a:latin typeface="Arial" panose="020B0604020202020204" pitchFamily="34" charset="0"/>
+                <a:cs typeface="Arial" panose="020B0604020202020204" pitchFamily="34" charset="0"/>
+              </a:rPr>
+              <a:t>searchset</a:t>
+            </a:r>
+            <a:r>
+              <a:rPr lang="en-US" sz="1400" b="1" dirty="0">
+                <a:solidFill>
+                  <a:schemeClr val="tx1"/>
+                </a:solidFill>
+                <a:latin typeface="Arial" panose="020B0604020202020204" pitchFamily="34" charset="0"/>
+                <a:cs typeface="Arial" panose="020B0604020202020204" pitchFamily="34" charset="0"/>
+              </a:rPr>
+              <a:t>) from MeasureReport Query</a:t>
             </a:r>
           </a:p>
         </p:txBody>

</xml_diff>

<commit_message>
Proposed changes for FHIR-40988 were added, Updates to General Guidance and Condition Category Remark pages.  (Changing Annotation to Condition Category Remark)
</commit_message>
<xml_diff>
--- a/input/images/Source/Risk Adjustment Images.pptx
+++ b/input/images/Source/Risk Adjustment Images.pptx
@@ -241,7 +241,7 @@
           <a:p>
             <a:fld id="{4337D45E-38B5-4093-B633-D3DDCA61416C}" type="datetimeFigureOut">
               <a:rPr lang="en-US" smtClean="0"/>
-              <a:t>11/16/2023</a:t>
+              <a:t>12/27/2023</a:t>
             </a:fld>
             <a:endParaRPr lang="en-US"/>
           </a:p>
@@ -4422,7 +4422,7 @@
           <a:p>
             <a:fld id="{3E232C92-DF21-4A04-859B-AAF8BD4EC904}" type="datetimeFigureOut">
               <a:rPr lang="en-US" smtClean="0"/>
-              <a:t>11/16/2023</a:t>
+              <a:t>12/27/2023</a:t>
             </a:fld>
             <a:endParaRPr lang="en-US"/>
           </a:p>
@@ -4620,7 +4620,7 @@
           <a:p>
             <a:fld id="{3E232C92-DF21-4A04-859B-AAF8BD4EC904}" type="datetimeFigureOut">
               <a:rPr lang="en-US" smtClean="0"/>
-              <a:t>11/16/2023</a:t>
+              <a:t>12/27/2023</a:t>
             </a:fld>
             <a:endParaRPr lang="en-US"/>
           </a:p>
@@ -4828,7 +4828,7 @@
           <a:p>
             <a:fld id="{3E232C92-DF21-4A04-859B-AAF8BD4EC904}" type="datetimeFigureOut">
               <a:rPr lang="en-US" smtClean="0"/>
-              <a:t>11/16/2023</a:t>
+              <a:t>12/27/2023</a:t>
             </a:fld>
             <a:endParaRPr lang="en-US"/>
           </a:p>
@@ -6672,7 +6672,7 @@
           <a:p>
             <a:fld id="{23F303CC-BC6F-44EE-9A09-81F690F71D2E}" type="datetime1">
               <a:rPr lang="en-US" altLang="en-US" smtClean="0"/>
-              <a:t>11/16/2023</a:t>
+              <a:t>12/27/2023</a:t>
             </a:fld>
             <a:endParaRPr lang="en-US" altLang="en-US" dirty="0"/>
           </a:p>
@@ -9330,7 +9330,7 @@
           <a:p>
             <a:fld id="{3E232C92-DF21-4A04-859B-AAF8BD4EC904}" type="datetimeFigureOut">
               <a:rPr lang="en-US" smtClean="0"/>
-              <a:t>11/16/2023</a:t>
+              <a:t>12/27/2023</a:t>
             </a:fld>
             <a:endParaRPr lang="en-US"/>
           </a:p>
@@ -11510,7 +11510,7 @@
           <a:p>
             <a:fld id="{3E232C92-DF21-4A04-859B-AAF8BD4EC904}" type="datetimeFigureOut">
               <a:rPr lang="en-US" smtClean="0"/>
-              <a:t>11/16/2023</a:t>
+              <a:t>12/27/2023</a:t>
             </a:fld>
             <a:endParaRPr lang="en-US"/>
           </a:p>
@@ -11785,7 +11785,7 @@
           <a:p>
             <a:fld id="{3E232C92-DF21-4A04-859B-AAF8BD4EC904}" type="datetimeFigureOut">
               <a:rPr lang="en-US" smtClean="0"/>
-              <a:t>11/16/2023</a:t>
+              <a:t>12/27/2023</a:t>
             </a:fld>
             <a:endParaRPr lang="en-US"/>
           </a:p>
@@ -12050,7 +12050,7 @@
           <a:p>
             <a:fld id="{3E232C92-DF21-4A04-859B-AAF8BD4EC904}" type="datetimeFigureOut">
               <a:rPr lang="en-US" smtClean="0"/>
-              <a:t>11/16/2023</a:t>
+              <a:t>12/27/2023</a:t>
             </a:fld>
             <a:endParaRPr lang="en-US"/>
           </a:p>
@@ -12462,7 +12462,7 @@
           <a:p>
             <a:fld id="{3E232C92-DF21-4A04-859B-AAF8BD4EC904}" type="datetimeFigureOut">
               <a:rPr lang="en-US" smtClean="0"/>
-              <a:t>11/16/2023</a:t>
+              <a:t>12/27/2023</a:t>
             </a:fld>
             <a:endParaRPr lang="en-US"/>
           </a:p>
@@ -12603,7 +12603,7 @@
           <a:p>
             <a:fld id="{3E232C92-DF21-4A04-859B-AAF8BD4EC904}" type="datetimeFigureOut">
               <a:rPr lang="en-US" smtClean="0"/>
-              <a:t>11/16/2023</a:t>
+              <a:t>12/27/2023</a:t>
             </a:fld>
             <a:endParaRPr lang="en-US"/>
           </a:p>
@@ -12716,7 +12716,7 @@
           <a:p>
             <a:fld id="{3E232C92-DF21-4A04-859B-AAF8BD4EC904}" type="datetimeFigureOut">
               <a:rPr lang="en-US" smtClean="0"/>
-              <a:t>11/16/2023</a:t>
+              <a:t>12/27/2023</a:t>
             </a:fld>
             <a:endParaRPr lang="en-US"/>
           </a:p>
@@ -13027,7 +13027,7 @@
           <a:p>
             <a:fld id="{3E232C92-DF21-4A04-859B-AAF8BD4EC904}" type="datetimeFigureOut">
               <a:rPr lang="en-US" smtClean="0"/>
-              <a:t>11/16/2023</a:t>
+              <a:t>12/27/2023</a:t>
             </a:fld>
             <a:endParaRPr lang="en-US"/>
           </a:p>
@@ -13315,7 +13315,7 @@
           <a:p>
             <a:fld id="{3E232C92-DF21-4A04-859B-AAF8BD4EC904}" type="datetimeFigureOut">
               <a:rPr lang="en-US" smtClean="0"/>
-              <a:t>11/16/2023</a:t>
+              <a:t>12/27/2023</a:t>
             </a:fld>
             <a:endParaRPr lang="en-US"/>
           </a:p>
@@ -13556,7 +13556,7 @@
           <a:p>
             <a:fld id="{3E232C92-DF21-4A04-859B-AAF8BD4EC904}" type="datetimeFigureOut">
               <a:rPr lang="en-US" smtClean="0"/>
-              <a:t>11/16/2023</a:t>
+              <a:t>12/27/2023</a:t>
             </a:fld>
             <a:endParaRPr lang="en-US"/>
           </a:p>
@@ -14184,7 +14184,7 @@
           <a:p>
             <a:fld id="{7CE3BD8C-C39F-4FFF-9CD5-05E4806DBFF3}" type="datetime1">
               <a:rPr lang="en-US" altLang="en-US" smtClean="0"/>
-              <a:t>11/16/2023</a:t>
+              <a:t>12/27/2023</a:t>
             </a:fld>
             <a:endParaRPr lang="en-US" altLang="en-US"/>
           </a:p>
@@ -17024,7 +17024,7 @@
             <a:pPr algn="ctr"/>
             <a:r>
               <a:rPr lang="en-US" sz="1400" dirty="0"/>
-              <a:t>Annotation added to coding gap report</a:t>
+              <a:t>Condition Category Remark  added to coding gap report</a:t>
             </a:r>
           </a:p>
         </p:txBody>
@@ -17738,7 +17738,7 @@
         <p:spPr>
           <a:xfrm>
             <a:off x="7110751" y="2355966"/>
-            <a:ext cx="2170338" cy="307777"/>
+            <a:ext cx="1941109" cy="523220"/>
           </a:xfrm>
           <a:prstGeom prst="rect">
             <a:avLst/>
@@ -17761,40 +17761,9 @@
                   <a:schemeClr val="bg1"/>
                 </a:solidFill>
               </a:rPr>
-              <a:t>Provider makes Annotation</a:t>
-            </a:r>
-          </a:p>
-        </p:txBody>
-      </p:sp>
-      <p:sp>
-        <p:nvSpPr>
-          <p:cNvPr id="32" name="TextBox 31">
-            <a:extLst>
-              <a:ext uri="{FF2B5EF4-FFF2-40B4-BE49-F238E27FC236}">
-                <a16:creationId xmlns:a16="http://schemas.microsoft.com/office/drawing/2014/main" id="{4F21EC11-E5A5-4A0B-8B7B-3F3813B97252}"/>
-              </a:ext>
-            </a:extLst>
-          </p:cNvPr>
-          <p:cNvSpPr txBox="1"/>
-          <p:nvPr/>
-        </p:nvSpPr>
-        <p:spPr>
-          <a:xfrm>
-            <a:off x="4607971" y="5041375"/>
-            <a:ext cx="2694874" cy="307777"/>
-          </a:xfrm>
-          <a:prstGeom prst="rect">
-            <a:avLst/>
-          </a:prstGeom>
-          <a:solidFill>
-            <a:schemeClr val="accent4"/>
-          </a:solidFill>
-        </p:spPr>
-        <p:txBody>
-          <a:bodyPr wrap="square" rtlCol="0">
-            <a:spAutoFit/>
-          </a:bodyPr>
-          <a:lstStyle/>
+              <a:t>Provider adds Condition</a:t>
+            </a:r>
+          </a:p>
           <a:p>
             <a:r>
               <a:rPr lang="en-US" sz="1400" dirty="0">
@@ -17802,7 +17771,48 @@
                   <a:schemeClr val="bg1"/>
                 </a:solidFill>
               </a:rPr>
-              <a:t>Annotated report posted to Payer</a:t>
+              <a:t> Category Remarks</a:t>
+            </a:r>
+          </a:p>
+        </p:txBody>
+      </p:sp>
+      <p:sp>
+        <p:nvSpPr>
+          <p:cNvPr id="32" name="TextBox 31">
+            <a:extLst>
+              <a:ext uri="{FF2B5EF4-FFF2-40B4-BE49-F238E27FC236}">
+                <a16:creationId xmlns:a16="http://schemas.microsoft.com/office/drawing/2014/main" id="{4F21EC11-E5A5-4A0B-8B7B-3F3813B97252}"/>
+              </a:ext>
+            </a:extLst>
+          </p:cNvPr>
+          <p:cNvSpPr txBox="1"/>
+          <p:nvPr/>
+        </p:nvSpPr>
+        <p:spPr>
+          <a:xfrm>
+            <a:off x="4587651" y="4777745"/>
+            <a:ext cx="2694874" cy="523220"/>
+          </a:xfrm>
+          <a:prstGeom prst="rect">
+            <a:avLst/>
+          </a:prstGeom>
+          <a:solidFill>
+            <a:schemeClr val="accent4"/>
+          </a:solidFill>
+        </p:spPr>
+        <p:txBody>
+          <a:bodyPr wrap="square" rtlCol="0">
+            <a:spAutoFit/>
+          </a:bodyPr>
+          <a:lstStyle/>
+          <a:p>
+            <a:r>
+              <a:rPr lang="en-US" sz="1400" dirty="0">
+                <a:solidFill>
+                  <a:schemeClr val="bg1"/>
+                </a:solidFill>
+              </a:rPr>
+              <a:t>Report with Condition Category Remark(s) posted to Payer</a:t>
             </a:r>
           </a:p>
         </p:txBody>

</xml_diff>